<commit_message>
Re #810 fixed test_sqw_pixels
</commit_message>
<xml_diff>
--- a/documentation/presentations/SQW&GenericProjectionDesigh.pptx
+++ b/documentation/presentations/SQW&GenericProjectionDesigh.pptx
@@ -9,12 +9,14 @@
     <p:sldId id="257" r:id="rId3"/>
     <p:sldId id="258" r:id="rId4"/>
     <p:sldId id="259" r:id="rId5"/>
-    <p:sldId id="260" r:id="rId6"/>
-    <p:sldId id="261" r:id="rId7"/>
-    <p:sldId id="262" r:id="rId8"/>
-    <p:sldId id="263" r:id="rId9"/>
-    <p:sldId id="264" r:id="rId10"/>
-    <p:sldId id="265" r:id="rId11"/>
+    <p:sldId id="266" r:id="rId6"/>
+    <p:sldId id="267" r:id="rId7"/>
+    <p:sldId id="260" r:id="rId8"/>
+    <p:sldId id="261" r:id="rId9"/>
+    <p:sldId id="262" r:id="rId10"/>
+    <p:sldId id="263" r:id="rId11"/>
+    <p:sldId id="264" r:id="rId12"/>
+    <p:sldId id="265" r:id="rId13"/>
   </p:sldIdLst>
   <p:sldSz cx="12192000" cy="6858000"/>
   <p:notesSz cx="6858000" cy="9144000"/>
@@ -113,6 +115,11 @@
       </a:defRPr>
     </a:lvl9pPr>
   </p:defaultTextStyle>
+  <p:extLst>
+    <p:ext uri="{EFAFB233-063F-42B5-8137-9DF3F51BA10A}">
+      <p15:sldGuideLst xmlns:p15="http://schemas.microsoft.com/office/powerpoint/2012/main"/>
+    </p:ext>
+  </p:extLst>
 </p:presentation>
 </file>
 
@@ -247,7 +254,7 @@
           <a:p>
             <a:fld id="{9766279D-E452-4D06-95CA-0CC3B438B83F}" type="datetimeFigureOut">
               <a:rPr lang="en-GB" smtClean="0"/>
-              <a:t>19/05/2022</a:t>
+              <a:t>09/08/2022</a:t>
             </a:fld>
             <a:endParaRPr lang="en-GB"/>
           </a:p>
@@ -417,7 +424,7 @@
           <a:p>
             <a:fld id="{9766279D-E452-4D06-95CA-0CC3B438B83F}" type="datetimeFigureOut">
               <a:rPr lang="en-GB" smtClean="0"/>
-              <a:t>19/05/2022</a:t>
+              <a:t>09/08/2022</a:t>
             </a:fld>
             <a:endParaRPr lang="en-GB"/>
           </a:p>
@@ -597,7 +604,7 @@
           <a:p>
             <a:fld id="{9766279D-E452-4D06-95CA-0CC3B438B83F}" type="datetimeFigureOut">
               <a:rPr lang="en-GB" smtClean="0"/>
-              <a:t>19/05/2022</a:t>
+              <a:t>09/08/2022</a:t>
             </a:fld>
             <a:endParaRPr lang="en-GB"/>
           </a:p>
@@ -767,7 +774,7 @@
           <a:p>
             <a:fld id="{9766279D-E452-4D06-95CA-0CC3B438B83F}" type="datetimeFigureOut">
               <a:rPr lang="en-GB" smtClean="0"/>
-              <a:t>19/05/2022</a:t>
+              <a:t>09/08/2022</a:t>
             </a:fld>
             <a:endParaRPr lang="en-GB"/>
           </a:p>
@@ -1013,7 +1020,7 @@
           <a:p>
             <a:fld id="{9766279D-E452-4D06-95CA-0CC3B438B83F}" type="datetimeFigureOut">
               <a:rPr lang="en-GB" smtClean="0"/>
-              <a:t>19/05/2022</a:t>
+              <a:t>09/08/2022</a:t>
             </a:fld>
             <a:endParaRPr lang="en-GB"/>
           </a:p>
@@ -1245,7 +1252,7 @@
           <a:p>
             <a:fld id="{9766279D-E452-4D06-95CA-0CC3B438B83F}" type="datetimeFigureOut">
               <a:rPr lang="en-GB" smtClean="0"/>
-              <a:t>19/05/2022</a:t>
+              <a:t>09/08/2022</a:t>
             </a:fld>
             <a:endParaRPr lang="en-GB"/>
           </a:p>
@@ -1612,7 +1619,7 @@
           <a:p>
             <a:fld id="{9766279D-E452-4D06-95CA-0CC3B438B83F}" type="datetimeFigureOut">
               <a:rPr lang="en-GB" smtClean="0"/>
-              <a:t>19/05/2022</a:t>
+              <a:t>09/08/2022</a:t>
             </a:fld>
             <a:endParaRPr lang="en-GB"/>
           </a:p>
@@ -1730,7 +1737,7 @@
           <a:p>
             <a:fld id="{9766279D-E452-4D06-95CA-0CC3B438B83F}" type="datetimeFigureOut">
               <a:rPr lang="en-GB" smtClean="0"/>
-              <a:t>19/05/2022</a:t>
+              <a:t>09/08/2022</a:t>
             </a:fld>
             <a:endParaRPr lang="en-GB"/>
           </a:p>
@@ -1825,7 +1832,7 @@
           <a:p>
             <a:fld id="{9766279D-E452-4D06-95CA-0CC3B438B83F}" type="datetimeFigureOut">
               <a:rPr lang="en-GB" smtClean="0"/>
-              <a:t>19/05/2022</a:t>
+              <a:t>09/08/2022</a:t>
             </a:fld>
             <a:endParaRPr lang="en-GB"/>
           </a:p>
@@ -2102,7 +2109,7 @@
           <a:p>
             <a:fld id="{9766279D-E452-4D06-95CA-0CC3B438B83F}" type="datetimeFigureOut">
               <a:rPr lang="en-GB" smtClean="0"/>
-              <a:t>19/05/2022</a:t>
+              <a:t>09/08/2022</a:t>
             </a:fld>
             <a:endParaRPr lang="en-GB"/>
           </a:p>
@@ -2355,7 +2362,7 @@
           <a:p>
             <a:fld id="{9766279D-E452-4D06-95CA-0CC3B438B83F}" type="datetimeFigureOut">
               <a:rPr lang="en-GB" smtClean="0"/>
-              <a:t>19/05/2022</a:t>
+              <a:t>09/08/2022</a:t>
             </a:fld>
             <a:endParaRPr lang="en-GB"/>
           </a:p>
@@ -2568,7 +2575,7 @@
           <a:p>
             <a:fld id="{9766279D-E452-4D06-95CA-0CC3B438B83F}" type="datetimeFigureOut">
               <a:rPr lang="en-GB" smtClean="0"/>
-              <a:t>19/05/2022</a:t>
+              <a:t>09/08/2022</a:t>
             </a:fld>
             <a:endParaRPr lang="en-GB"/>
           </a:p>
@@ -3121,6 +3128,533 @@
             <p:ph type="title"/>
           </p:nvPr>
         </p:nvSpPr>
+        <p:spPr/>
+        <p:txBody>
+          <a:bodyPr/>
+          <a:lstStyle/>
+          <a:p>
+            <a:r>
+              <a:rPr lang="en-GB" dirty="0" smtClean="0"/>
+              <a:t>DND object Cut Algorithm: Forthcoming</a:t>
+            </a:r>
+            <a:endParaRPr lang="en-GB" dirty="0"/>
+          </a:p>
+        </p:txBody>
+      </p:sp>
+      <p:sp>
+        <p:nvSpPr>
+          <p:cNvPr id="3" name="TextBox 2"/>
+          <p:cNvSpPr txBox="1"/>
+          <p:nvPr/>
+        </p:nvSpPr>
+        <p:spPr>
+          <a:xfrm>
+            <a:off x="838199" y="1915886"/>
+            <a:ext cx="9546771" cy="3539430"/>
+          </a:xfrm>
+          <a:prstGeom prst="rect">
+            <a:avLst/>
+          </a:prstGeom>
+          <a:noFill/>
+        </p:spPr>
+        <p:txBody>
+          <a:bodyPr wrap="square" rtlCol="0">
+            <a:spAutoFit/>
+          </a:bodyPr>
+          <a:lstStyle/>
+          <a:p>
+            <a:r>
+              <a:rPr lang="en-GB" sz="2800" dirty="0" smtClean="0"/>
+              <a:t>Convert to density; </a:t>
+            </a:r>
+          </a:p>
+          <a:p>
+            <a:endParaRPr lang="en-GB" sz="2800" dirty="0" smtClean="0"/>
+          </a:p>
+          <a:p>
+            <a:r>
+              <a:rPr lang="en-GB" sz="2800" dirty="0" smtClean="0"/>
+              <a:t>Interpolate density in the centres of new grid;</a:t>
+            </a:r>
+          </a:p>
+          <a:p>
+            <a:endParaRPr lang="en-GB" sz="2800" dirty="0" smtClean="0"/>
+          </a:p>
+          <a:p>
+            <a:r>
+              <a:rPr lang="en-GB" sz="2800" dirty="0" smtClean="0"/>
+              <a:t>convert to signal/error/</a:t>
+            </a:r>
+            <a:r>
+              <a:rPr lang="en-GB" sz="2800" dirty="0" err="1" smtClean="0"/>
+              <a:t>npix</a:t>
+            </a:r>
+            <a:r>
+              <a:rPr lang="en-GB" sz="2800" dirty="0" smtClean="0"/>
+              <a:t> on new grid, rebalance </a:t>
+            </a:r>
+            <a:r>
+              <a:rPr lang="en-GB" sz="2800" dirty="0" err="1" smtClean="0"/>
+              <a:t>npix</a:t>
+            </a:r>
+            <a:r>
+              <a:rPr lang="en-GB" sz="2800" dirty="0" smtClean="0"/>
+              <a:t> to be even;</a:t>
+            </a:r>
+          </a:p>
+          <a:p>
+            <a:endParaRPr lang="en-GB" sz="2800" dirty="0" smtClean="0"/>
+          </a:p>
+          <a:p>
+            <a:r>
+              <a:rPr lang="en-GB" sz="2800" dirty="0" smtClean="0"/>
+              <a:t>Sum (integrate) over collapsed dimensions, if this is necessary;</a:t>
+            </a:r>
+            <a:endParaRPr lang="en-GB" sz="2800" dirty="0"/>
+          </a:p>
+        </p:txBody>
+      </p:sp>
+    </p:spTree>
+    <p:extLst>
+      <p:ext uri="{BB962C8B-B14F-4D97-AF65-F5344CB8AC3E}">
+        <p14:creationId xmlns:p14="http://schemas.microsoft.com/office/powerpoint/2010/main" val="3356624891"/>
+      </p:ext>
+    </p:extLst>
+  </p:cSld>
+  <p:clrMapOvr>
+    <a:masterClrMapping/>
+  </p:clrMapOvr>
+  <p:timing>
+    <p:tnLst>
+      <p:par>
+        <p:cTn id="1" dur="indefinite" restart="never" nodeType="tmRoot"/>
+      </p:par>
+    </p:tnLst>
+  </p:timing>
+</p:sld>
+</file>
+
+<file path=ppt/slides/slide11.xml><?xml version="1.0" encoding="utf-8"?>
+<p:sld xmlns:a="http://schemas.openxmlformats.org/drawingml/2006/main" xmlns:r="http://schemas.openxmlformats.org/officeDocument/2006/relationships" xmlns:p="http://schemas.openxmlformats.org/presentationml/2006/main">
+  <p:cSld>
+    <p:spTree>
+      <p:nvGrpSpPr>
+        <p:cNvPr id="1" name=""/>
+        <p:cNvGrpSpPr/>
+        <p:nvPr/>
+      </p:nvGrpSpPr>
+      <p:grpSpPr>
+        <a:xfrm>
+          <a:off x="0" y="0"/>
+          <a:ext cx="0" cy="0"/>
+          <a:chOff x="0" y="0"/>
+          <a:chExt cx="0" cy="0"/>
+        </a:xfrm>
+      </p:grpSpPr>
+      <p:sp>
+        <p:nvSpPr>
+          <p:cNvPr id="2" name="Title 1"/>
+          <p:cNvSpPr>
+            <a:spLocks noGrp="1"/>
+          </p:cNvSpPr>
+          <p:nvPr>
+            <p:ph type="title"/>
+          </p:nvPr>
+        </p:nvSpPr>
+        <p:spPr>
+          <a:xfrm>
+            <a:off x="729342" y="195717"/>
+            <a:ext cx="10515600" cy="825046"/>
+          </a:xfrm>
+        </p:spPr>
+        <p:txBody>
+          <a:bodyPr/>
+          <a:lstStyle/>
+          <a:p>
+            <a:r>
+              <a:rPr lang="en-GB" dirty="0" smtClean="0"/>
+              <a:t>Validation of serializable objects</a:t>
+            </a:r>
+            <a:endParaRPr lang="en-GB" dirty="0"/>
+          </a:p>
+        </p:txBody>
+      </p:sp>
+      <p:sp>
+        <p:nvSpPr>
+          <p:cNvPr id="3" name="TextBox 2"/>
+          <p:cNvSpPr txBox="1"/>
+          <p:nvPr/>
+        </p:nvSpPr>
+        <p:spPr>
+          <a:xfrm>
+            <a:off x="729342" y="931446"/>
+            <a:ext cx="10156371" cy="954107"/>
+          </a:xfrm>
+          <a:prstGeom prst="rect">
+            <a:avLst/>
+          </a:prstGeom>
+          <a:noFill/>
+        </p:spPr>
+        <p:txBody>
+          <a:bodyPr wrap="square" rtlCol="0">
+            <a:spAutoFit/>
+          </a:bodyPr>
+          <a:lstStyle/>
+          <a:p>
+            <a:r>
+              <a:rPr lang="en-GB" sz="2800" dirty="0" smtClean="0">
+                <a:solidFill>
+                  <a:srgbClr val="FF0000"/>
+                </a:solidFill>
+              </a:rPr>
+              <a:t>PROBLEM:</a:t>
+            </a:r>
+          </a:p>
+          <a:p>
+            <a:r>
+              <a:rPr lang="en-GB" sz="2800" dirty="0" smtClean="0">
+                <a:solidFill>
+                  <a:srgbClr val="FF0000"/>
+                </a:solidFill>
+              </a:rPr>
+              <a:t> </a:t>
+            </a:r>
+            <a:r>
+              <a:rPr lang="en-GB" sz="2800" dirty="0" smtClean="0"/>
+              <a:t>Different complex constructors, difficult to comprehend and modify </a:t>
+            </a:r>
+            <a:endParaRPr lang="en-GB" sz="2800" dirty="0"/>
+          </a:p>
+        </p:txBody>
+      </p:sp>
+      <p:sp>
+        <p:nvSpPr>
+          <p:cNvPr id="4" name="TextBox 3"/>
+          <p:cNvSpPr txBox="1"/>
+          <p:nvPr/>
+        </p:nvSpPr>
+        <p:spPr>
+          <a:xfrm>
+            <a:off x="729342" y="1823935"/>
+            <a:ext cx="9656746" cy="1384995"/>
+          </a:xfrm>
+          <a:prstGeom prst="rect">
+            <a:avLst/>
+          </a:prstGeom>
+          <a:noFill/>
+        </p:spPr>
+        <p:txBody>
+          <a:bodyPr wrap="none" rtlCol="0">
+            <a:spAutoFit/>
+          </a:bodyPr>
+          <a:lstStyle/>
+          <a:p>
+            <a:r>
+              <a:rPr lang="en-GB" sz="2800" dirty="0" smtClean="0">
+                <a:solidFill>
+                  <a:srgbClr val="0070C0"/>
+                </a:solidFill>
+              </a:rPr>
+              <a:t>Clue to solution: </a:t>
+            </a:r>
+          </a:p>
+          <a:p>
+            <a:r>
+              <a:rPr lang="en-GB" sz="2800" dirty="0" smtClean="0"/>
+              <a:t>Serializable objects have empty constructor and public interface, </a:t>
+            </a:r>
+          </a:p>
+          <a:p>
+            <a:r>
+              <a:rPr lang="en-GB" sz="2800" dirty="0" smtClean="0"/>
+              <a:t>allowing fully define the object state</a:t>
+            </a:r>
+            <a:endParaRPr lang="en-GB" sz="2800" dirty="0"/>
+          </a:p>
+        </p:txBody>
+      </p:sp>
+      <p:sp>
+        <p:nvSpPr>
+          <p:cNvPr id="5" name="TextBox 4"/>
+          <p:cNvSpPr txBox="1"/>
+          <p:nvPr/>
+        </p:nvSpPr>
+        <p:spPr>
+          <a:xfrm>
+            <a:off x="631371" y="3125953"/>
+            <a:ext cx="6530699" cy="523220"/>
+          </a:xfrm>
+          <a:prstGeom prst="rect">
+            <a:avLst/>
+          </a:prstGeom>
+          <a:noFill/>
+        </p:spPr>
+        <p:txBody>
+          <a:bodyPr wrap="none" rtlCol="0">
+            <a:spAutoFit/>
+          </a:bodyPr>
+          <a:lstStyle/>
+          <a:p>
+            <a:r>
+              <a:rPr lang="en-GB" sz="2800" dirty="0" smtClean="0">
+                <a:solidFill>
+                  <a:srgbClr val="FFC000"/>
+                </a:solidFill>
+              </a:rPr>
+              <a:t>Complication: </a:t>
+            </a:r>
+            <a:r>
+              <a:rPr lang="en-GB" sz="2800" dirty="0" smtClean="0"/>
+              <a:t>Interdependent properties. </a:t>
+            </a:r>
+            <a:endParaRPr lang="en-GB" sz="2800" dirty="0"/>
+          </a:p>
+        </p:txBody>
+      </p:sp>
+      <p:sp>
+        <p:nvSpPr>
+          <p:cNvPr id="6" name="TextBox 5"/>
+          <p:cNvSpPr txBox="1"/>
+          <p:nvPr/>
+        </p:nvSpPr>
+        <p:spPr>
+          <a:xfrm>
+            <a:off x="631371" y="3649173"/>
+            <a:ext cx="11006346" cy="1384995"/>
+          </a:xfrm>
+          <a:prstGeom prst="rect">
+            <a:avLst/>
+          </a:prstGeom>
+          <a:noFill/>
+        </p:spPr>
+        <p:txBody>
+          <a:bodyPr wrap="none" rtlCol="0">
+            <a:spAutoFit/>
+          </a:bodyPr>
+          <a:lstStyle/>
+          <a:p>
+            <a:r>
+              <a:rPr lang="en-GB" sz="2800" dirty="0" smtClean="0">
+                <a:solidFill>
+                  <a:srgbClr val="00B050"/>
+                </a:solidFill>
+              </a:rPr>
+              <a:t>Suggested solution:  </a:t>
+            </a:r>
+            <a:r>
+              <a:rPr lang="en-GB" sz="2800" dirty="0" smtClean="0"/>
+              <a:t>separate specific and interdependent validators. </a:t>
+            </a:r>
+          </a:p>
+          <a:p>
+            <a:r>
+              <a:rPr lang="en-GB" sz="2800" dirty="0" smtClean="0"/>
+              <a:t>Constructors sets up all necessary public properties and then run common</a:t>
+            </a:r>
+          </a:p>
+          <a:p>
+            <a:r>
+              <a:rPr lang="en-GB" sz="2800" dirty="0" smtClean="0"/>
+              <a:t>validator. If common validator fails, throw.</a:t>
+            </a:r>
+            <a:endParaRPr lang="en-GB" sz="2800" dirty="0"/>
+          </a:p>
+        </p:txBody>
+      </p:sp>
+      <p:sp>
+        <p:nvSpPr>
+          <p:cNvPr id="7" name="TextBox 6"/>
+          <p:cNvSpPr txBox="1"/>
+          <p:nvPr/>
+        </p:nvSpPr>
+        <p:spPr>
+          <a:xfrm>
+            <a:off x="569685" y="4997357"/>
+            <a:ext cx="10119052" cy="954107"/>
+          </a:xfrm>
+          <a:prstGeom prst="rect">
+            <a:avLst/>
+          </a:prstGeom>
+          <a:noFill/>
+        </p:spPr>
+        <p:txBody>
+          <a:bodyPr wrap="none" rtlCol="0">
+            <a:spAutoFit/>
+          </a:bodyPr>
+          <a:lstStyle/>
+          <a:p>
+            <a:r>
+              <a:rPr lang="en-GB" sz="2800" dirty="0" smtClean="0">
+                <a:solidFill>
+                  <a:srgbClr val="00B050"/>
+                </a:solidFill>
+              </a:rPr>
+              <a:t>Profit: </a:t>
+            </a:r>
+            <a:r>
+              <a:rPr lang="en-GB" sz="2800" dirty="0" smtClean="0"/>
+              <a:t>generic constructor in the form:</a:t>
+            </a:r>
+          </a:p>
+          <a:p>
+            <a:r>
+              <a:rPr lang="en-GB" sz="2800" b="1" i="1" dirty="0" smtClean="0"/>
+              <a:t> </a:t>
+            </a:r>
+            <a:r>
+              <a:rPr lang="en-GB" sz="2800" b="1" i="1" dirty="0" err="1" smtClean="0"/>
+              <a:t>obj</a:t>
+            </a:r>
+            <a:r>
+              <a:rPr lang="en-GB" sz="2800" b="1" i="1" dirty="0" smtClean="0"/>
+              <a:t>(positional_arg1,positional_arg2…., </a:t>
+            </a:r>
+            <a:r>
+              <a:rPr lang="en-GB" sz="2800" b="1" i="1" dirty="0" err="1" smtClean="0"/>
+              <a:t>keyN,valueN,keyN,valueN</a:t>
+            </a:r>
+            <a:r>
+              <a:rPr lang="en-GB" sz="2800" b="1" i="1" dirty="0" smtClean="0"/>
+              <a:t>)</a:t>
+            </a:r>
+            <a:endParaRPr lang="en-GB" sz="2800" b="1" i="1" dirty="0"/>
+          </a:p>
+        </p:txBody>
+      </p:sp>
+      <p:sp>
+        <p:nvSpPr>
+          <p:cNvPr id="8" name="TextBox 7"/>
+          <p:cNvSpPr txBox="1"/>
+          <p:nvPr/>
+        </p:nvSpPr>
+        <p:spPr>
+          <a:xfrm flipH="1">
+            <a:off x="631371" y="6176441"/>
+            <a:ext cx="10421258" cy="523220"/>
+          </a:xfrm>
+          <a:prstGeom prst="rect">
+            <a:avLst/>
+          </a:prstGeom>
+          <a:noFill/>
+        </p:spPr>
+        <p:txBody>
+          <a:bodyPr wrap="square" rtlCol="0">
+            <a:spAutoFit/>
+          </a:bodyPr>
+          <a:lstStyle/>
+          <a:p>
+            <a:r>
+              <a:rPr lang="en-GB" sz="2800" dirty="0" smtClean="0">
+                <a:solidFill>
+                  <a:srgbClr val="FF0000"/>
+                </a:solidFill>
+              </a:rPr>
+              <a:t>Disadvantage</a:t>
+            </a:r>
+            <a:r>
+              <a:rPr lang="en-GB" sz="2800" dirty="0" smtClean="0"/>
+              <a:t>:  </a:t>
+            </a:r>
+            <a:r>
+              <a:rPr lang="en-GB" sz="2000" dirty="0" smtClean="0"/>
+              <a:t>An incomplete object defined through its public interface may be invalid </a:t>
+            </a:r>
+            <a:endParaRPr lang="en-GB" sz="2000" dirty="0"/>
+          </a:p>
+        </p:txBody>
+      </p:sp>
+      <p:sp>
+        <p:nvSpPr>
+          <p:cNvPr id="9" name="TextBox 8"/>
+          <p:cNvSpPr txBox="1"/>
+          <p:nvPr/>
+        </p:nvSpPr>
+        <p:spPr>
+          <a:xfrm>
+            <a:off x="631371" y="5879287"/>
+            <a:ext cx="9800953" cy="646331"/>
+          </a:xfrm>
+          <a:prstGeom prst="rect">
+            <a:avLst/>
+          </a:prstGeom>
+          <a:noFill/>
+        </p:spPr>
+        <p:txBody>
+          <a:bodyPr wrap="none" rtlCol="0">
+            <a:spAutoFit/>
+          </a:bodyPr>
+          <a:lstStyle/>
+          <a:p>
+            <a:r>
+              <a:rPr lang="en-GB" dirty="0" smtClean="0"/>
+              <a:t>Positional arguments in the order they appear in the list of </a:t>
+            </a:r>
+            <a:r>
+              <a:rPr lang="en-GB" b="1" dirty="0" err="1" smtClean="0"/>
+              <a:t>saveableFields</a:t>
+            </a:r>
+            <a:r>
+              <a:rPr lang="en-GB" b="1" dirty="0" smtClean="0"/>
+              <a:t>; </a:t>
+            </a:r>
+            <a:r>
+              <a:rPr lang="en-GB" dirty="0" smtClean="0"/>
+              <a:t>keys are the property names</a:t>
+            </a:r>
+            <a:endParaRPr lang="en-GB" b="1" dirty="0"/>
+          </a:p>
+          <a:p>
+            <a:endParaRPr lang="en-GB" dirty="0"/>
+          </a:p>
+        </p:txBody>
+      </p:sp>
+    </p:spTree>
+    <p:extLst>
+      <p:ext uri="{BB962C8B-B14F-4D97-AF65-F5344CB8AC3E}">
+        <p14:creationId xmlns:p14="http://schemas.microsoft.com/office/powerpoint/2010/main" val="1521153865"/>
+      </p:ext>
+    </p:extLst>
+  </p:cSld>
+  <p:clrMapOvr>
+    <a:masterClrMapping/>
+  </p:clrMapOvr>
+  <p:timing>
+    <p:tnLst>
+      <p:par>
+        <p:cTn id="1" dur="indefinite" restart="never" nodeType="tmRoot"/>
+      </p:par>
+    </p:tnLst>
+  </p:timing>
+</p:sld>
+</file>
+
+<file path=ppt/slides/slide12.xml><?xml version="1.0" encoding="utf-8"?>
+<p:sld xmlns:a="http://schemas.openxmlformats.org/drawingml/2006/main" xmlns:r="http://schemas.openxmlformats.org/officeDocument/2006/relationships" xmlns:p="http://schemas.openxmlformats.org/presentationml/2006/main">
+  <p:cSld>
+    <p:spTree>
+      <p:nvGrpSpPr>
+        <p:cNvPr id="1" name=""/>
+        <p:cNvGrpSpPr/>
+        <p:nvPr/>
+      </p:nvGrpSpPr>
+      <p:grpSpPr>
+        <a:xfrm>
+          <a:off x="0" y="0"/>
+          <a:ext cx="0" cy="0"/>
+          <a:chOff x="0" y="0"/>
+          <a:chExt cx="0" cy="0"/>
+        </a:xfrm>
+      </p:grpSpPr>
+      <p:sp>
+        <p:nvSpPr>
+          <p:cNvPr id="2" name="Title 1"/>
+          <p:cNvSpPr>
+            <a:spLocks noGrp="1"/>
+          </p:cNvSpPr>
+          <p:nvPr>
+            <p:ph type="title"/>
+          </p:nvPr>
+        </p:nvSpPr>
         <p:spPr>
           <a:xfrm>
             <a:off x="838200" y="365125"/>
@@ -3894,7 +4428,6 @@
               <a:rPr lang="en-GB" sz="2400" dirty="0" smtClean="0"/>
               <a:t> more transformations requested</a:t>
             </a:r>
-            <a:endParaRPr lang="en-GB" sz="2400" dirty="0" smtClean="0"/>
           </a:p>
         </p:txBody>
       </p:sp>
@@ -4560,8 +5093,8 @@
         </p:nvSpPr>
         <p:spPr>
           <a:xfrm>
-            <a:off x="-98001" y="537880"/>
-            <a:ext cx="10515600" cy="1325563"/>
+            <a:off x="838200" y="365125"/>
+            <a:ext cx="10515600" cy="895725"/>
           </a:xfrm>
         </p:spPr>
         <p:txBody>
@@ -4570,7 +5103,7 @@
           <a:p>
             <a:r>
               <a:rPr lang="en-GB" dirty="0" smtClean="0"/>
-              <a:t>SQW and DND objects:</a:t>
+              <a:t>Main Horace’ objects interfaces:</a:t>
             </a:r>
             <a:endParaRPr lang="en-GB" dirty="0"/>
           </a:p>
@@ -4578,7 +5111,7 @@
       </p:sp>
       <p:pic>
         <p:nvPicPr>
-          <p:cNvPr id="5" name="Picture 4"/>
+          <p:cNvPr id="3" name="Picture 2"/>
           <p:cNvPicPr>
             <a:picLocks noChangeAspect="1"/>
           </p:cNvPicPr>
@@ -4598,14 +5131,590 @@
         </p:blipFill>
         <p:spPr>
           <a:xfrm>
-            <a:off x="5406740" y="1011955"/>
-            <a:ext cx="7058025" cy="2962275"/>
+            <a:off x="838200" y="1590675"/>
+            <a:ext cx="8950968" cy="4922420"/>
           </a:xfrm>
           <a:prstGeom prst="rect">
             <a:avLst/>
           </a:prstGeom>
         </p:spPr>
       </p:pic>
+    </p:spTree>
+    <p:extLst>
+      <p:ext uri="{BB962C8B-B14F-4D97-AF65-F5344CB8AC3E}">
+        <p14:creationId xmlns:p14="http://schemas.microsoft.com/office/powerpoint/2010/main" val="3660381104"/>
+      </p:ext>
+    </p:extLst>
+  </p:cSld>
+  <p:clrMapOvr>
+    <a:masterClrMapping/>
+  </p:clrMapOvr>
+  <p:timing>
+    <p:tnLst>
+      <p:par>
+        <p:cTn id="1" dur="indefinite" restart="never" nodeType="tmRoot"/>
+      </p:par>
+    </p:tnLst>
+  </p:timing>
+</p:sld>
+</file>
+
+<file path=ppt/slides/slide6.xml><?xml version="1.0" encoding="utf-8"?>
+<p:sld xmlns:a="http://schemas.openxmlformats.org/drawingml/2006/main" xmlns:r="http://schemas.openxmlformats.org/officeDocument/2006/relationships" xmlns:p="http://schemas.openxmlformats.org/presentationml/2006/main">
+  <p:cSld>
+    <p:spTree>
+      <p:nvGrpSpPr>
+        <p:cNvPr id="1" name=""/>
+        <p:cNvGrpSpPr/>
+        <p:nvPr/>
+      </p:nvGrpSpPr>
+      <p:grpSpPr>
+        <a:xfrm>
+          <a:off x="0" y="0"/>
+          <a:ext cx="0" cy="0"/>
+          <a:chOff x="0" y="0"/>
+          <a:chExt cx="0" cy="0"/>
+        </a:xfrm>
+      </p:grpSpPr>
+      <p:sp>
+        <p:nvSpPr>
+          <p:cNvPr id="2" name="Title 1"/>
+          <p:cNvSpPr>
+            <a:spLocks noGrp="1"/>
+          </p:cNvSpPr>
+          <p:nvPr>
+            <p:ph type="title"/>
+          </p:nvPr>
+        </p:nvSpPr>
+        <p:spPr/>
+        <p:txBody>
+          <a:bodyPr/>
+          <a:lstStyle/>
+          <a:p>
+            <a:r>
+              <a:rPr lang="en-GB" dirty="0" smtClean="0"/>
+              <a:t>New design main features:</a:t>
+            </a:r>
+            <a:endParaRPr lang="en-GB" dirty="0"/>
+          </a:p>
+        </p:txBody>
+      </p:sp>
+      <p:sp>
+        <p:nvSpPr>
+          <p:cNvPr id="3" name="Content Placeholder 2"/>
+          <p:cNvSpPr>
+            <a:spLocks noGrp="1"/>
+          </p:cNvSpPr>
+          <p:nvPr>
+            <p:ph idx="1"/>
+          </p:nvPr>
+        </p:nvSpPr>
+        <p:spPr/>
+        <p:txBody>
+          <a:bodyPr>
+            <a:normAutofit fontScale="92500"/>
+          </a:bodyPr>
+          <a:lstStyle/>
+          <a:p>
+            <a:r>
+              <a:rPr lang="en-GB" dirty="0" err="1" smtClean="0"/>
+              <a:t>DnD</a:t>
+            </a:r>
+            <a:r>
+              <a:rPr lang="en-GB" dirty="0" smtClean="0"/>
+              <a:t> object is serializable and valid on assignment (</a:t>
+            </a:r>
+            <a:r>
+              <a:rPr lang="en-GB" sz="1800" dirty="0" smtClean="0"/>
+              <a:t>a lot of time to fix existing tests</a:t>
+            </a:r>
+            <a:r>
+              <a:rPr lang="en-GB" dirty="0" smtClean="0"/>
+              <a:t>)</a:t>
+            </a:r>
+          </a:p>
+          <a:p>
+            <a:r>
+              <a:rPr lang="en-GB" dirty="0" smtClean="0"/>
+              <a:t>Standard form of object constructor </a:t>
+            </a:r>
+            <a:r>
+              <a:rPr lang="en-GB" sz="2000" dirty="0" smtClean="0"/>
+              <a:t>(properties </a:t>
+            </a:r>
+            <a:r>
+              <a:rPr lang="en-GB" sz="2000" dirty="0"/>
+              <a:t>names </a:t>
+            </a:r>
+            <a:r>
+              <a:rPr lang="en-GB" sz="2000" dirty="0" smtClean="0"/>
+              <a:t>with their values or properties values itself located from the beginning in the order, defined in </a:t>
+            </a:r>
+            <a:r>
+              <a:rPr lang="en-GB" sz="2000" b="1" dirty="0" err="1" smtClean="0"/>
+              <a:t>savebleProperties</a:t>
+            </a:r>
+            <a:r>
+              <a:rPr lang="en-GB" sz="2000" dirty="0" smtClean="0"/>
+              <a:t> method)</a:t>
+            </a:r>
+            <a:endParaRPr lang="en-GB" dirty="0" smtClean="0"/>
+          </a:p>
+          <a:p>
+            <a:r>
+              <a:rPr lang="en-GB" dirty="0" smtClean="0"/>
+              <a:t>Separation between image methods and pixel methods </a:t>
+            </a:r>
+            <a:r>
+              <a:rPr lang="en-GB" sz="1800" dirty="0" smtClean="0"/>
+              <a:t>(mind method location e.g. </a:t>
+            </a:r>
+            <a:r>
+              <a:rPr lang="en-GB" sz="1800" dirty="0" err="1" smtClean="0"/>
+              <a:t>mask_pixels</a:t>
+            </a:r>
+            <a:r>
+              <a:rPr lang="en-GB" sz="1800" dirty="0" smtClean="0"/>
+              <a:t>)</a:t>
+            </a:r>
+          </a:p>
+          <a:p>
+            <a:pPr marL="0" indent="0">
+              <a:buNone/>
+            </a:pPr>
+            <a:r>
+              <a:rPr lang="en-GB" sz="2200" dirty="0"/>
+              <a:t> </a:t>
+            </a:r>
+            <a:r>
+              <a:rPr lang="en-GB" sz="2200" dirty="0" smtClean="0"/>
+              <a:t>    </a:t>
+            </a:r>
+            <a:r>
+              <a:rPr lang="en-GB" sz="1700" dirty="0" smtClean="0"/>
+              <a:t>EG: head:</a:t>
+            </a:r>
+          </a:p>
+          <a:p>
+            <a:endParaRPr lang="en-GB" dirty="0" smtClean="0"/>
+          </a:p>
+          <a:p>
+            <a:pPr marL="0" indent="0">
+              <a:buNone/>
+            </a:pPr>
+            <a:r>
+              <a:rPr lang="en-GB" sz="1900" dirty="0" smtClean="0"/>
+              <a:t>    </a:t>
+            </a:r>
+            <a:r>
+              <a:rPr lang="en-GB" sz="1500" dirty="0" smtClean="0"/>
+              <a:t>EG</a:t>
+            </a:r>
+            <a:r>
+              <a:rPr lang="en-GB" sz="1500" dirty="0"/>
+              <a:t>: </a:t>
+            </a:r>
+            <a:r>
+              <a:rPr lang="en-GB" sz="1500" dirty="0" err="1" smtClean="0"/>
+              <a:t>mask_pixels</a:t>
+            </a:r>
+            <a:r>
+              <a:rPr lang="en-GB" sz="1500" dirty="0" smtClean="0"/>
+              <a:t> -&gt; </a:t>
+            </a:r>
+            <a:r>
+              <a:rPr lang="en-GB" sz="1500" dirty="0" err="1" smtClean="0"/>
+              <a:t>sqw</a:t>
+            </a:r>
+            <a:r>
+              <a:rPr lang="en-GB" sz="1500" dirty="0" smtClean="0"/>
+              <a:t> only:</a:t>
+            </a:r>
+          </a:p>
+          <a:p>
+            <a:endParaRPr lang="en-GB" dirty="0"/>
+          </a:p>
+          <a:p>
+            <a:r>
+              <a:rPr lang="en-GB" dirty="0" smtClean="0"/>
+              <a:t>Prohibit file based constructors (</a:t>
+            </a:r>
+            <a:r>
+              <a:rPr lang="en-GB" sz="1800" dirty="0" smtClean="0"/>
+              <a:t>you mast read object – file IO is always much slower</a:t>
+            </a:r>
+            <a:r>
+              <a:rPr lang="en-GB" dirty="0" smtClean="0"/>
+              <a:t>)?</a:t>
+            </a:r>
+            <a:endParaRPr lang="en-GB" dirty="0"/>
+          </a:p>
+        </p:txBody>
+      </p:sp>
+      <p:sp>
+        <p:nvSpPr>
+          <p:cNvPr id="4" name="Rectangle 3"/>
+          <p:cNvSpPr/>
+          <p:nvPr/>
+        </p:nvSpPr>
+        <p:spPr>
+          <a:xfrm>
+            <a:off x="1257300" y="4119551"/>
+            <a:ext cx="1571625" cy="471486"/>
+          </a:xfrm>
+          <a:prstGeom prst="rect">
+            <a:avLst/>
+          </a:prstGeom>
+        </p:spPr>
+        <p:style>
+          <a:lnRef idx="2">
+            <a:schemeClr val="accent1">
+              <a:shade val="50000"/>
+            </a:schemeClr>
+          </a:lnRef>
+          <a:fillRef idx="1">
+            <a:schemeClr val="accent1"/>
+          </a:fillRef>
+          <a:effectRef idx="0">
+            <a:schemeClr val="accent1"/>
+          </a:effectRef>
+          <a:fontRef idx="minor">
+            <a:schemeClr val="lt1"/>
+          </a:fontRef>
+        </p:style>
+        <p:txBody>
+          <a:bodyPr rtlCol="0" anchor="ctr"/>
+          <a:lstStyle/>
+          <a:p>
+            <a:pPr algn="ctr"/>
+            <a:r>
+              <a:rPr lang="en-GB" dirty="0" smtClean="0"/>
+              <a:t>head (on </a:t>
+            </a:r>
+            <a:r>
+              <a:rPr lang="en-GB" dirty="0" err="1" smtClean="0"/>
+              <a:t>dnd</a:t>
+            </a:r>
+            <a:r>
+              <a:rPr lang="en-GB" dirty="0"/>
+              <a:t>)</a:t>
+            </a:r>
+            <a:endParaRPr lang="en-GB" dirty="0" smtClean="0"/>
+          </a:p>
+          <a:p>
+            <a:pPr algn="ctr"/>
+            <a:r>
+              <a:rPr lang="en-GB" dirty="0" smtClean="0"/>
+              <a:t>(head </a:t>
+            </a:r>
+            <a:r>
+              <a:rPr lang="en-GB" dirty="0" err="1" smtClean="0"/>
+              <a:t>dnd</a:t>
+            </a:r>
+            <a:r>
+              <a:rPr lang="en-GB" dirty="0"/>
+              <a:t>)</a:t>
+            </a:r>
+          </a:p>
+        </p:txBody>
+      </p:sp>
+      <p:sp>
+        <p:nvSpPr>
+          <p:cNvPr id="5" name="Rectangle 4"/>
+          <p:cNvSpPr/>
+          <p:nvPr/>
+        </p:nvSpPr>
+        <p:spPr>
+          <a:xfrm>
+            <a:off x="3352800" y="4119547"/>
+            <a:ext cx="2371717" cy="471486"/>
+          </a:xfrm>
+          <a:prstGeom prst="rect">
+            <a:avLst/>
+          </a:prstGeom>
+        </p:spPr>
+        <p:style>
+          <a:lnRef idx="2">
+            <a:schemeClr val="accent1">
+              <a:shade val="50000"/>
+            </a:schemeClr>
+          </a:lnRef>
+          <a:fillRef idx="1">
+            <a:schemeClr val="accent1"/>
+          </a:fillRef>
+          <a:effectRef idx="0">
+            <a:schemeClr val="accent1"/>
+          </a:effectRef>
+          <a:fontRef idx="minor">
+            <a:schemeClr val="lt1"/>
+          </a:fontRef>
+        </p:style>
+        <p:txBody>
+          <a:bodyPr rtlCol="0" anchor="ctr"/>
+          <a:lstStyle/>
+          <a:p>
+            <a:pPr algn="ctr"/>
+            <a:r>
+              <a:rPr lang="en-GB" dirty="0" smtClean="0"/>
+              <a:t>head  (on </a:t>
+            </a:r>
+            <a:r>
+              <a:rPr lang="en-GB" dirty="0" err="1" smtClean="0"/>
+              <a:t>sqw</a:t>
+            </a:r>
+            <a:r>
+              <a:rPr lang="en-GB" dirty="0" smtClean="0"/>
+              <a:t>)</a:t>
+            </a:r>
+          </a:p>
+          <a:p>
+            <a:pPr algn="ctr"/>
+            <a:r>
+              <a:rPr lang="en-GB" dirty="0" smtClean="0"/>
+              <a:t>(head </a:t>
+            </a:r>
+            <a:r>
+              <a:rPr lang="en-GB" dirty="0" err="1" smtClean="0"/>
+              <a:t>dnd</a:t>
+            </a:r>
+            <a:r>
+              <a:rPr lang="en-GB" dirty="0" smtClean="0"/>
+              <a:t> + </a:t>
+            </a:r>
+            <a:r>
+              <a:rPr lang="en-GB" dirty="0" err="1" smtClean="0"/>
+              <a:t>pix</a:t>
+            </a:r>
+            <a:r>
+              <a:rPr lang="en-GB" dirty="0" smtClean="0"/>
+              <a:t> part)</a:t>
+            </a:r>
+            <a:endParaRPr lang="en-GB" dirty="0"/>
+          </a:p>
+        </p:txBody>
+      </p:sp>
+      <p:sp>
+        <p:nvSpPr>
+          <p:cNvPr id="6" name="Rectangle 5"/>
+          <p:cNvSpPr/>
+          <p:nvPr/>
+        </p:nvSpPr>
+        <p:spPr>
+          <a:xfrm>
+            <a:off x="6324602" y="4114782"/>
+            <a:ext cx="2371717" cy="471486"/>
+          </a:xfrm>
+          <a:prstGeom prst="rect">
+            <a:avLst/>
+          </a:prstGeom>
+        </p:spPr>
+        <p:style>
+          <a:lnRef idx="2">
+            <a:schemeClr val="accent1">
+              <a:shade val="50000"/>
+            </a:schemeClr>
+          </a:lnRef>
+          <a:fillRef idx="1">
+            <a:schemeClr val="accent1"/>
+          </a:fillRef>
+          <a:effectRef idx="0">
+            <a:schemeClr val="accent1"/>
+          </a:effectRef>
+          <a:fontRef idx="minor">
+            <a:schemeClr val="lt1"/>
+          </a:fontRef>
+        </p:style>
+        <p:txBody>
+          <a:bodyPr rtlCol="0" anchor="ctr"/>
+          <a:lstStyle/>
+          <a:p>
+            <a:pPr algn="ctr"/>
+            <a:r>
+              <a:rPr lang="en-GB" dirty="0" smtClean="0"/>
+              <a:t>head  (on file)</a:t>
+            </a:r>
+          </a:p>
+          <a:p>
+            <a:pPr algn="ctr"/>
+            <a:r>
+              <a:rPr lang="en-GB" dirty="0" smtClean="0"/>
+              <a:t>(file </a:t>
+            </a:r>
+            <a:r>
+              <a:rPr lang="en-GB" dirty="0" err="1" smtClean="0"/>
+              <a:t>acessor</a:t>
+            </a:r>
+            <a:r>
+              <a:rPr lang="en-GB" dirty="0" smtClean="0"/>
+              <a:t> + head)</a:t>
+            </a:r>
+            <a:endParaRPr lang="en-GB" dirty="0"/>
+          </a:p>
+        </p:txBody>
+      </p:sp>
+      <p:cxnSp>
+        <p:nvCxnSpPr>
+          <p:cNvPr id="8" name="Straight Arrow Connector 7"/>
+          <p:cNvCxnSpPr>
+            <a:stCxn id="4" idx="3"/>
+            <a:endCxn id="5" idx="1"/>
+          </p:cNvCxnSpPr>
+          <p:nvPr/>
+        </p:nvCxnSpPr>
+        <p:spPr>
+          <a:xfrm flipV="1">
+            <a:off x="2828925" y="4355290"/>
+            <a:ext cx="523875" cy="4"/>
+          </a:xfrm>
+          <a:prstGeom prst="straightConnector1">
+            <a:avLst/>
+          </a:prstGeom>
+          <a:ln>
+            <a:tailEnd type="triangle"/>
+          </a:ln>
+        </p:spPr>
+        <p:style>
+          <a:lnRef idx="1">
+            <a:schemeClr val="accent1"/>
+          </a:lnRef>
+          <a:fillRef idx="0">
+            <a:schemeClr val="accent1"/>
+          </a:fillRef>
+          <a:effectRef idx="0">
+            <a:schemeClr val="accent1"/>
+          </a:effectRef>
+          <a:fontRef idx="minor">
+            <a:schemeClr val="tx1"/>
+          </a:fontRef>
+        </p:style>
+      </p:cxnSp>
+      <p:cxnSp>
+        <p:nvCxnSpPr>
+          <p:cNvPr id="10" name="Straight Arrow Connector 9"/>
+          <p:cNvCxnSpPr>
+            <a:endCxn id="6" idx="1"/>
+          </p:cNvCxnSpPr>
+          <p:nvPr/>
+        </p:nvCxnSpPr>
+        <p:spPr>
+          <a:xfrm>
+            <a:off x="5762625" y="4350525"/>
+            <a:ext cx="561977" cy="0"/>
+          </a:xfrm>
+          <a:prstGeom prst="straightConnector1">
+            <a:avLst/>
+          </a:prstGeom>
+          <a:ln>
+            <a:tailEnd type="triangle"/>
+          </a:ln>
+        </p:spPr>
+        <p:style>
+          <a:lnRef idx="1">
+            <a:schemeClr val="accent1"/>
+          </a:lnRef>
+          <a:fillRef idx="0">
+            <a:schemeClr val="accent1"/>
+          </a:fillRef>
+          <a:effectRef idx="0">
+            <a:schemeClr val="accent1"/>
+          </a:effectRef>
+          <a:fontRef idx="minor">
+            <a:schemeClr val="tx1"/>
+          </a:fontRef>
+        </p:style>
+      </p:cxnSp>
+    </p:spTree>
+    <p:extLst>
+      <p:ext uri="{BB962C8B-B14F-4D97-AF65-F5344CB8AC3E}">
+        <p14:creationId xmlns:p14="http://schemas.microsoft.com/office/powerpoint/2010/main" val="4002919976"/>
+      </p:ext>
+    </p:extLst>
+  </p:cSld>
+  <p:clrMapOvr>
+    <a:masterClrMapping/>
+  </p:clrMapOvr>
+</p:sld>
+</file>
+
+<file path=ppt/slides/slide7.xml><?xml version="1.0" encoding="utf-8"?>
+<p:sld xmlns:a="http://schemas.openxmlformats.org/drawingml/2006/main" xmlns:r="http://schemas.openxmlformats.org/officeDocument/2006/relationships" xmlns:p="http://schemas.openxmlformats.org/presentationml/2006/main">
+  <p:cSld>
+    <p:spTree>
+      <p:nvGrpSpPr>
+        <p:cNvPr id="1" name=""/>
+        <p:cNvGrpSpPr/>
+        <p:nvPr/>
+      </p:nvGrpSpPr>
+      <p:grpSpPr>
+        <a:xfrm>
+          <a:off x="0" y="0"/>
+          <a:ext cx="0" cy="0"/>
+          <a:chOff x="0" y="0"/>
+          <a:chExt cx="0" cy="0"/>
+        </a:xfrm>
+      </p:grpSpPr>
+      <p:pic>
+        <p:nvPicPr>
+          <p:cNvPr id="3" name="Picture 2"/>
+          <p:cNvPicPr>
+            <a:picLocks noChangeAspect="1"/>
+          </p:cNvPicPr>
+          <p:nvPr/>
+        </p:nvPicPr>
+        <p:blipFill>
+          <a:blip r:embed="rId2">
+            <a:extLst>
+              <a:ext uri="{28A0092B-C50C-407E-A947-70E740481C1C}">
+                <a14:useLocalDpi xmlns:a14="http://schemas.microsoft.com/office/drawing/2010/main" val="0"/>
+              </a:ext>
+            </a:extLst>
+          </a:blip>
+          <a:stretch>
+            <a:fillRect/>
+          </a:stretch>
+        </p:blipFill>
+        <p:spPr>
+          <a:xfrm>
+            <a:off x="7448044" y="1204723"/>
+            <a:ext cx="4581525" cy="2962275"/>
+          </a:xfrm>
+          <a:prstGeom prst="rect">
+            <a:avLst/>
+          </a:prstGeom>
+        </p:spPr>
+      </p:pic>
+      <p:sp>
+        <p:nvSpPr>
+          <p:cNvPr id="2" name="Title 1"/>
+          <p:cNvSpPr>
+            <a:spLocks noGrp="1"/>
+          </p:cNvSpPr>
+          <p:nvPr>
+            <p:ph type="title"/>
+          </p:nvPr>
+        </p:nvSpPr>
+        <p:spPr>
+          <a:xfrm>
+            <a:off x="0" y="61477"/>
+            <a:ext cx="10515600" cy="1325563"/>
+          </a:xfrm>
+        </p:spPr>
+        <p:txBody>
+          <a:bodyPr/>
+          <a:lstStyle/>
+          <a:p>
+            <a:r>
+              <a:rPr lang="en-GB" dirty="0" smtClean="0"/>
+              <a:t>SQW and DND </a:t>
+            </a:r>
+            <a:r>
+              <a:rPr lang="en-GB" dirty="0" smtClean="0"/>
+              <a:t>objects. Composition:</a:t>
+            </a:r>
+            <a:endParaRPr lang="en-GB" dirty="0"/>
+          </a:p>
+        </p:txBody>
+      </p:sp>
       <p:pic>
         <p:nvPicPr>
           <p:cNvPr id="4" name="Picture 3"/>
@@ -4693,9 +5802,9 @@
           <p:nvPr/>
         </p:nvSpPr>
         <p:spPr>
-          <a:xfrm rot="18999978">
-            <a:off x="7107456" y="2254552"/>
-            <a:ext cx="664502" cy="738335"/>
+          <a:xfrm rot="1978251">
+            <a:off x="7178415" y="2812984"/>
+            <a:ext cx="404079" cy="738335"/>
           </a:xfrm>
           <a:prstGeom prst="leftArrow">
             <a:avLst/>
@@ -4735,7 +5844,7 @@
         <p:spPr>
           <a:xfrm>
             <a:off x="5330092" y="5816593"/>
-            <a:ext cx="2604624" cy="369332"/>
+            <a:ext cx="2117952" cy="369332"/>
           </a:xfrm>
           <a:prstGeom prst="rect">
             <a:avLst/>
@@ -4754,7 +5863,11 @@
             </a:r>
             <a:r>
               <a:rPr lang="en-GB" dirty="0" smtClean="0"/>
-              <a:t> have gone</a:t>
+              <a:t> </a:t>
+            </a:r>
+            <a:r>
+              <a:rPr lang="en-GB" dirty="0" smtClean="0"/>
+              <a:t>to go</a:t>
             </a:r>
             <a:endParaRPr lang="en-GB" dirty="0"/>
           </a:p>
@@ -4818,7 +5931,7 @@
 </p:sld>
 </file>
 
-<file path=ppt/slides/slide6.xml><?xml version="1.0" encoding="utf-8"?>
+<file path=ppt/slides/slide8.xml><?xml version="1.0" encoding="utf-8"?>
 <p:sld xmlns:a="http://schemas.openxmlformats.org/drawingml/2006/main" xmlns:r="http://schemas.openxmlformats.org/officeDocument/2006/relationships" xmlns:p="http://schemas.openxmlformats.org/presentationml/2006/main">
   <p:cSld>
     <p:spTree>
@@ -4940,949 +6053,6 @@
 </p:sld>
 </file>
 
-<file path=ppt/slides/slide7.xml><?xml version="1.0" encoding="utf-8"?>
-<p:sld xmlns:a="http://schemas.openxmlformats.org/drawingml/2006/main" xmlns:r="http://schemas.openxmlformats.org/officeDocument/2006/relationships" xmlns:p="http://schemas.openxmlformats.org/presentationml/2006/main">
-  <p:cSld>
-    <p:spTree>
-      <p:nvGrpSpPr>
-        <p:cNvPr id="1" name=""/>
-        <p:cNvGrpSpPr/>
-        <p:nvPr/>
-      </p:nvGrpSpPr>
-      <p:grpSpPr>
-        <a:xfrm>
-          <a:off x="0" y="0"/>
-          <a:ext cx="0" cy="0"/>
-          <a:chOff x="0" y="0"/>
-          <a:chExt cx="0" cy="0"/>
-        </a:xfrm>
-      </p:grpSpPr>
-      <p:sp>
-        <p:nvSpPr>
-          <p:cNvPr id="2" name="Title 1"/>
-          <p:cNvSpPr>
-            <a:spLocks noGrp="1"/>
-          </p:cNvSpPr>
-          <p:nvPr>
-            <p:ph type="title"/>
-          </p:nvPr>
-        </p:nvSpPr>
-        <p:spPr>
-          <a:xfrm>
-            <a:off x="838200" y="365126"/>
-            <a:ext cx="10515600" cy="759732"/>
-          </a:xfrm>
-        </p:spPr>
-        <p:txBody>
-          <a:bodyPr/>
-          <a:lstStyle/>
-          <a:p>
-            <a:r>
-              <a:rPr lang="en-GB" dirty="0" smtClean="0"/>
-              <a:t>SQW object Cut Algorithm Implementation:</a:t>
-            </a:r>
-            <a:endParaRPr lang="en-GB" dirty="0"/>
-          </a:p>
-        </p:txBody>
-      </p:sp>
-      <p:sp>
-        <p:nvSpPr>
-          <p:cNvPr id="4" name="Rectangle 3"/>
-          <p:cNvSpPr/>
-          <p:nvPr/>
-        </p:nvSpPr>
-        <p:spPr>
-          <a:xfrm>
-            <a:off x="736598" y="1099854"/>
-            <a:ext cx="10468429" cy="369332"/>
-          </a:xfrm>
-          <a:prstGeom prst="rect">
-            <a:avLst/>
-          </a:prstGeom>
-        </p:spPr>
-        <p:txBody>
-          <a:bodyPr wrap="square">
-            <a:spAutoFit/>
-          </a:bodyPr>
-          <a:lstStyle/>
-          <a:p>
-            <a:r>
-              <a:rPr lang="en-GB" b="1" dirty="0">
-                <a:latin typeface="Menlo"/>
-              </a:rPr>
-              <a:t>[</a:t>
-            </a:r>
-            <a:r>
-              <a:rPr lang="en-GB" b="1" dirty="0" err="1" smtClean="0">
-                <a:latin typeface="Menlo"/>
-              </a:rPr>
-              <a:t>targ_proj,targ_binning</a:t>
-            </a:r>
-            <a:r>
-              <a:rPr lang="en-GB" b="1" dirty="0" smtClean="0">
-                <a:latin typeface="Menlo"/>
-              </a:rPr>
-              <a:t>] = </a:t>
-            </a:r>
-            <a:r>
-              <a:rPr lang="en-GB" b="1" dirty="0" err="1" smtClean="0">
-                <a:latin typeface="Menlo"/>
-              </a:rPr>
-              <a:t>process_and_validate_cut_inputs</a:t>
-            </a:r>
-            <a:r>
-              <a:rPr lang="en-GB" b="1" dirty="0" smtClean="0">
-                <a:latin typeface="Menlo"/>
-              </a:rPr>
-              <a:t>(</a:t>
-            </a:r>
-            <a:r>
-              <a:rPr lang="en-GB" b="1" dirty="0" err="1" smtClean="0">
-                <a:latin typeface="Menlo"/>
-              </a:rPr>
-              <a:t>source_sqw,binning_inputs</a:t>
-            </a:r>
-            <a:r>
-              <a:rPr lang="en-GB" b="1" dirty="0" smtClean="0">
-                <a:latin typeface="Menlo"/>
-              </a:rPr>
-              <a:t>)</a:t>
-            </a:r>
-            <a:endParaRPr lang="en-GB" b="1" dirty="0">
-              <a:latin typeface="Menlo"/>
-            </a:endParaRPr>
-          </a:p>
-        </p:txBody>
-      </p:sp>
-      <p:sp>
-        <p:nvSpPr>
-          <p:cNvPr id="5" name="Rectangle 4"/>
-          <p:cNvSpPr/>
-          <p:nvPr/>
-        </p:nvSpPr>
-        <p:spPr>
-          <a:xfrm>
-            <a:off x="838200" y="1469186"/>
-            <a:ext cx="11676742" cy="4801314"/>
-          </a:xfrm>
-          <a:prstGeom prst="rect">
-            <a:avLst/>
-          </a:prstGeom>
-        </p:spPr>
-        <p:txBody>
-          <a:bodyPr wrap="square">
-            <a:spAutoFit/>
-          </a:bodyPr>
-          <a:lstStyle/>
-          <a:p>
-            <a:r>
-              <a:rPr lang="en-GB" b="1" dirty="0" err="1" smtClean="0">
-                <a:latin typeface="Menlo"/>
-              </a:rPr>
-              <a:t>targ_ax_block</a:t>
-            </a:r>
-            <a:r>
-              <a:rPr lang="en-GB" b="1" dirty="0" smtClean="0">
-                <a:latin typeface="Menlo"/>
-              </a:rPr>
-              <a:t> </a:t>
-            </a:r>
-            <a:r>
-              <a:rPr lang="en-GB" b="1" dirty="0">
-                <a:latin typeface="Menlo"/>
-              </a:rPr>
-              <a:t>= </a:t>
-            </a:r>
-            <a:r>
-              <a:rPr lang="en-GB" b="1" dirty="0" err="1" smtClean="0">
-                <a:latin typeface="Menlo"/>
-              </a:rPr>
-              <a:t>targ_proj.</a:t>
-            </a:r>
-            <a:r>
-              <a:rPr lang="en-GB" b="1" dirty="0" err="1" smtClean="0">
-                <a:solidFill>
-                  <a:srgbClr val="00B050"/>
-                </a:solidFill>
-                <a:latin typeface="Menlo"/>
-              </a:rPr>
-              <a:t>get_proj_axes_block</a:t>
-            </a:r>
-            <a:r>
-              <a:rPr lang="en-GB" b="1" dirty="0">
-                <a:latin typeface="Menlo"/>
-              </a:rPr>
-              <a:t>(</a:t>
-            </a:r>
-            <a:r>
-              <a:rPr lang="en-GB" b="1" dirty="0" err="1" smtClean="0">
-                <a:latin typeface="Menlo"/>
-              </a:rPr>
-              <a:t>targ_binning</a:t>
-            </a:r>
-            <a:r>
-              <a:rPr lang="en-GB" b="1" dirty="0" smtClean="0">
-                <a:latin typeface="Menlo"/>
-              </a:rPr>
-              <a:t>);</a:t>
-            </a:r>
-          </a:p>
-          <a:p>
-            <a:r>
-              <a:rPr lang="en-GB" b="1" dirty="0" smtClean="0">
-                <a:solidFill>
-                  <a:srgbClr val="028009"/>
-                </a:solidFill>
-                <a:latin typeface="Menlo"/>
-              </a:rPr>
-              <a:t>%</a:t>
-            </a:r>
-          </a:p>
-          <a:p>
-            <a:r>
-              <a:rPr lang="en-GB" b="1" dirty="0" smtClean="0"/>
-              <a:t>[</a:t>
-            </a:r>
-            <a:r>
-              <a:rPr lang="en-GB" b="1" dirty="0" err="1" smtClean="0"/>
-              <a:t>pix_starts</a:t>
-            </a:r>
-            <a:r>
-              <a:rPr lang="en-GB" b="1" dirty="0"/>
-              <a:t>, </a:t>
-            </a:r>
-            <a:r>
-              <a:rPr lang="en-GB" b="1" dirty="0" err="1"/>
-              <a:t>block_sizes</a:t>
-            </a:r>
-            <a:r>
-              <a:rPr lang="en-GB" b="1" dirty="0"/>
-              <a:t>] = </a:t>
-            </a:r>
-            <a:r>
-              <a:rPr lang="en-GB" b="1" dirty="0" err="1" smtClean="0">
-                <a:latin typeface="Menlo"/>
-              </a:rPr>
-              <a:t>source_proj</a:t>
-            </a:r>
-            <a:r>
-              <a:rPr lang="en-GB" b="1" dirty="0" err="1" smtClean="0"/>
-              <a:t>.</a:t>
-            </a:r>
-            <a:r>
-              <a:rPr lang="en-GB" b="1" dirty="0" err="1" smtClean="0">
-                <a:solidFill>
-                  <a:srgbClr val="0070C0"/>
-                </a:solidFill>
-              </a:rPr>
-              <a:t>get_nrange</a:t>
-            </a:r>
-            <a:r>
-              <a:rPr lang="en-GB" b="1" dirty="0" smtClean="0"/>
-              <a:t>(</a:t>
-            </a:r>
-            <a:r>
-              <a:rPr lang="en-GB" b="1" dirty="0" err="1" smtClean="0"/>
-              <a:t>npix,source_axes,targ_axes,targ_proj</a:t>
-            </a:r>
-            <a:r>
-              <a:rPr lang="en-GB" b="1" dirty="0" smtClean="0"/>
-              <a:t>);</a:t>
-            </a:r>
-            <a:endParaRPr lang="en-GB" b="1" dirty="0"/>
-          </a:p>
-          <a:p>
-            <a:endParaRPr lang="en-GB" b="1" dirty="0" smtClean="0">
-              <a:latin typeface="Menlo"/>
-            </a:endParaRPr>
-          </a:p>
-          <a:p>
-            <a:r>
-              <a:rPr lang="en-GB" b="1" dirty="0" smtClean="0"/>
-              <a:t>                         </a:t>
-            </a:r>
-            <a:r>
-              <a:rPr lang="en-GB" b="1" dirty="0" err="1" smtClean="0"/>
-              <a:t>ch_cube</a:t>
-            </a:r>
-            <a:r>
-              <a:rPr lang="en-GB" b="1" dirty="0" smtClean="0"/>
-              <a:t> </a:t>
-            </a:r>
-            <a:r>
-              <a:rPr lang="en-GB" b="1" dirty="0"/>
-              <a:t>= </a:t>
-            </a:r>
-            <a:r>
-              <a:rPr lang="en-GB" b="1" dirty="0" err="1"/>
-              <a:t>cur_axes_block.</a:t>
-            </a:r>
-            <a:r>
-              <a:rPr lang="en-GB" b="1" dirty="0" err="1">
-                <a:solidFill>
-                  <a:srgbClr val="00B050"/>
-                </a:solidFill>
-              </a:rPr>
-              <a:t>get_axes_scales</a:t>
-            </a:r>
-            <a:r>
-              <a:rPr lang="en-GB" b="1" dirty="0"/>
-              <a:t>();</a:t>
-            </a:r>
-          </a:p>
-          <a:p>
-            <a:r>
-              <a:rPr lang="en-GB" b="1" dirty="0" smtClean="0"/>
-              <a:t>                         </a:t>
-            </a:r>
-            <a:r>
-              <a:rPr lang="en-GB" b="1" dirty="0" err="1" smtClean="0"/>
-              <a:t>trans_chcube</a:t>
-            </a:r>
-            <a:r>
-              <a:rPr lang="en-GB" b="1" dirty="0" smtClean="0"/>
-              <a:t> </a:t>
-            </a:r>
-            <a:r>
-              <a:rPr lang="en-GB" b="1" dirty="0"/>
-              <a:t>= </a:t>
-            </a:r>
-            <a:r>
-              <a:rPr lang="en-GB" b="1" dirty="0" err="1"/>
-              <a:t>source_proj.</a:t>
-            </a:r>
-            <a:r>
-              <a:rPr lang="en-GB" b="1" dirty="0" err="1">
-                <a:solidFill>
-                  <a:srgbClr val="0070C0"/>
-                </a:solidFill>
-              </a:rPr>
-              <a:t>from_this_to_targ_coord</a:t>
-            </a:r>
-            <a:r>
-              <a:rPr lang="en-GB" b="1" dirty="0"/>
-              <a:t>(</a:t>
-            </a:r>
-            <a:r>
-              <a:rPr lang="en-GB" b="1" dirty="0" err="1"/>
-              <a:t>ch_cube</a:t>
-            </a:r>
-            <a:r>
-              <a:rPr lang="en-GB" b="1" dirty="0" smtClean="0"/>
-              <a:t>)</a:t>
-            </a:r>
-          </a:p>
-          <a:p>
-            <a:r>
-              <a:rPr lang="en-GB" b="1" dirty="0" smtClean="0"/>
-              <a:t>                         </a:t>
-            </a:r>
-            <a:r>
-              <a:rPr lang="en-GB" b="1" dirty="0" err="1" smtClean="0"/>
-              <a:t>bin_nodes</a:t>
-            </a:r>
-            <a:r>
-              <a:rPr lang="en-GB" b="1" dirty="0" smtClean="0"/>
-              <a:t> </a:t>
-            </a:r>
-            <a:r>
-              <a:rPr lang="en-GB" b="1" dirty="0"/>
-              <a:t>= </a:t>
-            </a:r>
-            <a:r>
-              <a:rPr lang="en-GB" b="1" dirty="0" err="1" smtClean="0"/>
-              <a:t>targ_axes_block.</a:t>
-            </a:r>
-            <a:r>
-              <a:rPr lang="en-GB" b="1" dirty="0" err="1" smtClean="0">
-                <a:solidFill>
-                  <a:srgbClr val="0070C0"/>
-                </a:solidFill>
-              </a:rPr>
-              <a:t>get_bin_nodes</a:t>
-            </a:r>
-            <a:r>
-              <a:rPr lang="en-GB" b="1" dirty="0" smtClean="0"/>
-              <a:t>(</a:t>
-            </a:r>
-            <a:r>
-              <a:rPr lang="en-GB" b="1" dirty="0" err="1" smtClean="0"/>
-              <a:t>trans_chcube</a:t>
-            </a:r>
-            <a:r>
-              <a:rPr lang="en-GB" b="1" dirty="0" smtClean="0"/>
-              <a:t>)  </a:t>
-            </a:r>
-            <a:r>
-              <a:rPr lang="en-GB" b="1" dirty="0" smtClean="0">
-                <a:solidFill>
-                  <a:srgbClr val="00B050"/>
-                </a:solidFill>
-              </a:rPr>
-              <a:t>% needs halo</a:t>
-            </a:r>
-          </a:p>
-          <a:p>
-            <a:r>
-              <a:rPr lang="en-GB" b="1" dirty="0" smtClean="0"/>
-              <a:t>                         </a:t>
-            </a:r>
-            <a:r>
-              <a:rPr lang="en-GB" b="1" dirty="0" err="1" smtClean="0"/>
-              <a:t>nodes_here</a:t>
-            </a:r>
-            <a:r>
-              <a:rPr lang="en-GB" b="1" dirty="0" smtClean="0"/>
-              <a:t> </a:t>
-            </a:r>
-            <a:r>
-              <a:rPr lang="en-GB" b="1" dirty="0"/>
-              <a:t>= </a:t>
-            </a:r>
-            <a:r>
-              <a:rPr lang="en-GB" b="1" dirty="0" err="1"/>
-              <a:t>targ_proj.</a:t>
-            </a:r>
-            <a:r>
-              <a:rPr lang="en-GB" b="1" dirty="0" err="1">
-                <a:solidFill>
-                  <a:srgbClr val="0070C0"/>
-                </a:solidFill>
-              </a:rPr>
-              <a:t>from_this_to_targ_coord</a:t>
-            </a:r>
-            <a:r>
-              <a:rPr lang="en-GB" b="1" dirty="0">
-                <a:solidFill>
-                  <a:srgbClr val="0070C0"/>
-                </a:solidFill>
-              </a:rPr>
-              <a:t>(</a:t>
-            </a:r>
-            <a:r>
-              <a:rPr lang="en-GB" b="1" dirty="0" err="1"/>
-              <a:t>bin_nodes</a:t>
-            </a:r>
-            <a:r>
-              <a:rPr lang="en-GB" b="1" dirty="0" smtClean="0"/>
-              <a:t>);</a:t>
-            </a:r>
-            <a:endParaRPr lang="en-GB" b="1" dirty="0"/>
-          </a:p>
-          <a:p>
-            <a:r>
-              <a:rPr lang="en-GB" b="1" dirty="0" smtClean="0"/>
-              <a:t>                         </a:t>
-            </a:r>
-            <a:r>
-              <a:rPr lang="en-GB" b="1" dirty="0" err="1" smtClean="0"/>
-              <a:t>nbin_in_bin</a:t>
-            </a:r>
-            <a:r>
-              <a:rPr lang="en-GB" b="1" dirty="0" smtClean="0"/>
-              <a:t> </a:t>
-            </a:r>
-            <a:r>
-              <a:rPr lang="en-GB" b="1" dirty="0"/>
-              <a:t>= </a:t>
-            </a:r>
-            <a:r>
-              <a:rPr lang="en-GB" b="1" dirty="0" err="1"/>
-              <a:t>cur_axes_block.</a:t>
-            </a:r>
-            <a:r>
-              <a:rPr lang="en-GB" b="1" dirty="0" err="1">
-                <a:solidFill>
-                  <a:srgbClr val="0070C0"/>
-                </a:solidFill>
-              </a:rPr>
-              <a:t>bin_pixels</a:t>
-            </a:r>
-            <a:r>
-              <a:rPr lang="en-GB" b="1" dirty="0"/>
-              <a:t>(</a:t>
-            </a:r>
-            <a:r>
-              <a:rPr lang="en-GB" b="1" dirty="0" err="1"/>
-              <a:t>nodes_here</a:t>
-            </a:r>
-            <a:r>
-              <a:rPr lang="en-GB" b="1" dirty="0"/>
-              <a:t>)</a:t>
-            </a:r>
-          </a:p>
-          <a:p>
-            <a:r>
-              <a:rPr lang="en-GB" b="1" dirty="0" smtClean="0"/>
-              <a:t>                         </a:t>
-            </a:r>
-            <a:r>
-              <a:rPr lang="en-GB" b="1" dirty="0" err="1" smtClean="0"/>
-              <a:t>contrib_ind</a:t>
-            </a:r>
-            <a:r>
-              <a:rPr lang="en-GB" b="1" dirty="0" smtClean="0"/>
-              <a:t> </a:t>
-            </a:r>
-            <a:r>
-              <a:rPr lang="en-GB" b="1" dirty="0"/>
-              <a:t>= find(</a:t>
-            </a:r>
-            <a:r>
-              <a:rPr lang="en-GB" b="1" dirty="0" err="1"/>
-              <a:t>nbin_in_bin</a:t>
-            </a:r>
-            <a:r>
-              <a:rPr lang="en-GB" b="1" dirty="0"/>
-              <a:t>&gt;0</a:t>
-            </a:r>
-            <a:r>
-              <a:rPr lang="en-GB" b="1" dirty="0" smtClean="0"/>
-              <a:t>)</a:t>
-            </a:r>
-          </a:p>
-          <a:p>
-            <a:r>
-              <a:rPr lang="en-GB" dirty="0" smtClean="0"/>
-              <a:t>Find pixel indexes from cell indexes using </a:t>
-            </a:r>
-            <a:r>
-              <a:rPr lang="en-GB" dirty="0" err="1" smtClean="0"/>
-              <a:t>pix</a:t>
-            </a:r>
-            <a:r>
-              <a:rPr lang="en-GB" dirty="0" smtClean="0"/>
-              <a:t> in cell density</a:t>
-            </a:r>
-          </a:p>
-          <a:p>
-            <a:endParaRPr lang="en-GB" b="1" dirty="0" smtClean="0"/>
-          </a:p>
-          <a:p>
-            <a:r>
-              <a:rPr lang="en-GB" b="1" dirty="0" err="1" smtClean="0"/>
-              <a:t>candidate_pix</a:t>
-            </a:r>
-            <a:r>
-              <a:rPr lang="en-GB" b="1" dirty="0" smtClean="0"/>
-              <a:t> </a:t>
-            </a:r>
-            <a:r>
-              <a:rPr lang="en-GB" b="1" dirty="0"/>
-              <a:t>= </a:t>
-            </a:r>
-            <a:r>
-              <a:rPr lang="en-GB" b="1" dirty="0" err="1" smtClean="0"/>
-              <a:t>source_pix.get_pix_in_ranges</a:t>
-            </a:r>
-            <a:r>
-              <a:rPr lang="en-GB" b="1" dirty="0" smtClean="0"/>
-              <a:t>(</a:t>
-            </a:r>
-            <a:r>
-              <a:rPr lang="en-GB" b="1" dirty="0" err="1" smtClean="0"/>
-              <a:t>pix_starts</a:t>
-            </a:r>
-            <a:r>
-              <a:rPr lang="en-GB" b="1" dirty="0" smtClean="0"/>
-              <a:t>, </a:t>
-            </a:r>
-            <a:r>
-              <a:rPr lang="en-GB" b="1" dirty="0" err="1" smtClean="0"/>
-              <a:t>block_sizes</a:t>
-            </a:r>
-            <a:r>
-              <a:rPr lang="en-GB" b="1" dirty="0" smtClean="0"/>
-              <a:t>);</a:t>
-            </a:r>
-          </a:p>
-          <a:p>
-            <a:r>
-              <a:rPr lang="en-GB" b="1" dirty="0" smtClean="0"/>
-              <a:t>[</a:t>
-            </a:r>
-            <a:r>
-              <a:rPr lang="en-GB" b="1" dirty="0" err="1"/>
-              <a:t>npix,s,e,pix_ok,unique_runid</a:t>
-            </a:r>
-            <a:r>
-              <a:rPr lang="en-GB" b="1" dirty="0"/>
-              <a:t>] = </a:t>
-            </a:r>
-            <a:r>
-              <a:rPr lang="en-GB" b="1" dirty="0" err="1" smtClean="0"/>
-              <a:t>targ_proj.</a:t>
-            </a:r>
-            <a:r>
-              <a:rPr lang="en-GB" b="1" dirty="0" err="1" smtClean="0">
-                <a:solidFill>
-                  <a:srgbClr val="0070C0"/>
-                </a:solidFill>
-              </a:rPr>
-              <a:t>bin_pixels</a:t>
-            </a:r>
-            <a:r>
-              <a:rPr lang="en-GB" b="1" dirty="0" smtClean="0"/>
-              <a:t>(</a:t>
-            </a:r>
-            <a:r>
-              <a:rPr lang="en-GB" b="1" dirty="0" err="1" smtClean="0"/>
-              <a:t>targ_axes,candidate_pix</a:t>
-            </a:r>
-            <a:r>
-              <a:rPr lang="en-GB" b="1" dirty="0" smtClean="0"/>
-              <a:t>)</a:t>
-            </a:r>
-            <a:endParaRPr lang="en-GB" b="1" dirty="0"/>
-          </a:p>
-          <a:p>
-            <a:endParaRPr lang="en-GB" b="1" dirty="0"/>
-          </a:p>
-          <a:p>
-            <a:r>
-              <a:rPr lang="en-GB" b="1" dirty="0" smtClean="0">
-                <a:latin typeface="Menlo"/>
-              </a:rPr>
-              <a:t>                </a:t>
-            </a:r>
-            <a:r>
-              <a:rPr lang="en-GB" dirty="0" err="1" smtClean="0">
-                <a:latin typeface="Menlo"/>
-              </a:rPr>
-              <a:t>pix_in_targ_coord_system</a:t>
-            </a:r>
-            <a:r>
-              <a:rPr lang="en-GB" dirty="0" smtClean="0">
-                <a:latin typeface="Menlo"/>
-              </a:rPr>
-              <a:t> </a:t>
-            </a:r>
-            <a:r>
-              <a:rPr lang="en-GB" b="1" dirty="0" smtClean="0">
-                <a:latin typeface="Menlo"/>
-              </a:rPr>
-              <a:t>= </a:t>
-            </a:r>
-            <a:r>
-              <a:rPr lang="en-GB" b="1" dirty="0" err="1" smtClean="0">
-                <a:latin typeface="Menlo"/>
-              </a:rPr>
-              <a:t>targ_proj</a:t>
-            </a:r>
-            <a:r>
-              <a:rPr lang="en-GB" b="1" dirty="0" err="1" smtClean="0">
-                <a:solidFill>
-                  <a:srgbClr val="00B050"/>
-                </a:solidFill>
-                <a:latin typeface="Menlo"/>
-              </a:rPr>
-              <a:t>.from_pix_to_img</a:t>
-            </a:r>
-            <a:r>
-              <a:rPr lang="en-GB" b="1" dirty="0" smtClean="0">
-                <a:latin typeface="Menlo"/>
-              </a:rPr>
-              <a:t>(</a:t>
-            </a:r>
-            <a:r>
-              <a:rPr lang="en-GB" b="1" dirty="0" err="1" smtClean="0"/>
-              <a:t>candidate_pix</a:t>
-            </a:r>
-            <a:r>
-              <a:rPr lang="en-GB" b="1" dirty="0" smtClean="0">
-                <a:latin typeface="Menlo"/>
-              </a:rPr>
-              <a:t>) </a:t>
-            </a:r>
-          </a:p>
-          <a:p>
-            <a:r>
-              <a:rPr lang="en-GB" b="1" dirty="0" smtClean="0">
-                <a:latin typeface="Menlo"/>
-              </a:rPr>
-              <a:t>                </a:t>
-            </a:r>
-            <a:r>
-              <a:rPr lang="en-GB" b="1" dirty="0" smtClean="0"/>
-              <a:t>[</a:t>
-            </a:r>
-            <a:r>
-              <a:rPr lang="en-GB" b="1" dirty="0" err="1" smtClean="0"/>
-              <a:t>npix,s,e,pix_oke_runid</a:t>
-            </a:r>
-            <a:r>
-              <a:rPr lang="en-GB" b="1" dirty="0" smtClean="0"/>
-              <a:t>] = </a:t>
-            </a:r>
-            <a:r>
-              <a:rPr lang="en-GB" b="1" dirty="0" err="1" smtClean="0"/>
-              <a:t>targ_axes_block.</a:t>
-            </a:r>
-            <a:r>
-              <a:rPr lang="en-GB" b="1" dirty="0" err="1" smtClean="0">
-                <a:solidFill>
-                  <a:srgbClr val="0070C0"/>
-                </a:solidFill>
-              </a:rPr>
-              <a:t>bin_pixels</a:t>
-            </a:r>
-            <a:r>
-              <a:rPr lang="en-GB" b="1" dirty="0" smtClean="0"/>
-              <a:t>(</a:t>
-            </a:r>
-            <a:r>
-              <a:rPr lang="en-GB" dirty="0" err="1" smtClean="0">
-                <a:latin typeface="Menlo"/>
-              </a:rPr>
-              <a:t>pix_in_targ_coord_system</a:t>
-            </a:r>
-            <a:r>
-              <a:rPr lang="ru-RU" dirty="0" smtClean="0">
-                <a:latin typeface="Menlo"/>
-              </a:rPr>
-              <a:t>)</a:t>
-            </a:r>
-            <a:endParaRPr lang="en-GB" b="1" dirty="0">
-              <a:latin typeface="Menlo"/>
-            </a:endParaRPr>
-          </a:p>
-        </p:txBody>
-      </p:sp>
-      <p:sp>
-        <p:nvSpPr>
-          <p:cNvPr id="7" name="Right Brace 6"/>
-          <p:cNvSpPr/>
-          <p:nvPr/>
-        </p:nvSpPr>
-        <p:spPr>
-          <a:xfrm rot="5400000">
-            <a:off x="5021944" y="-1930406"/>
-            <a:ext cx="413658" cy="8744859"/>
-          </a:xfrm>
-          <a:prstGeom prst="rightBrace">
-            <a:avLst>
-              <a:gd name="adj1" fmla="val 8333"/>
-              <a:gd name="adj2" fmla="val 49616"/>
-            </a:avLst>
-          </a:prstGeom>
-        </p:spPr>
-        <p:style>
-          <a:lnRef idx="1">
-            <a:schemeClr val="accent1"/>
-          </a:lnRef>
-          <a:fillRef idx="0">
-            <a:schemeClr val="accent1"/>
-          </a:fillRef>
-          <a:effectRef idx="0">
-            <a:schemeClr val="accent1"/>
-          </a:effectRef>
-          <a:fontRef idx="minor">
-            <a:schemeClr val="tx1"/>
-          </a:fontRef>
-        </p:style>
-        <p:txBody>
-          <a:bodyPr rtlCol="0" anchor="ctr"/>
-          <a:lstStyle/>
-          <a:p>
-            <a:pPr algn="ctr"/>
-            <a:endParaRPr lang="en-GB"/>
-          </a:p>
-        </p:txBody>
-      </p:sp>
-      <p:sp>
-        <p:nvSpPr>
-          <p:cNvPr id="8" name="Right Brace 7"/>
-          <p:cNvSpPr/>
-          <p:nvPr/>
-        </p:nvSpPr>
-        <p:spPr>
-          <a:xfrm rot="5400000">
-            <a:off x="4394188" y="1600190"/>
-            <a:ext cx="449965" cy="7525658"/>
-          </a:xfrm>
-          <a:prstGeom prst="rightBrace">
-            <a:avLst>
-              <a:gd name="adj1" fmla="val 8333"/>
-              <a:gd name="adj2" fmla="val 49616"/>
-            </a:avLst>
-          </a:prstGeom>
-        </p:spPr>
-        <p:style>
-          <a:lnRef idx="1">
-            <a:schemeClr val="accent1"/>
-          </a:lnRef>
-          <a:fillRef idx="0">
-            <a:schemeClr val="accent1"/>
-          </a:fillRef>
-          <a:effectRef idx="0">
-            <a:schemeClr val="accent1"/>
-          </a:effectRef>
-          <a:fontRef idx="minor">
-            <a:schemeClr val="tx1"/>
-          </a:fontRef>
-        </p:style>
-        <p:txBody>
-          <a:bodyPr rtlCol="0" anchor="ctr"/>
-          <a:lstStyle/>
-          <a:p>
-            <a:pPr algn="ctr"/>
-            <a:endParaRPr lang="en-GB"/>
-          </a:p>
-        </p:txBody>
-      </p:sp>
-    </p:spTree>
-    <p:extLst>
-      <p:ext uri="{BB962C8B-B14F-4D97-AF65-F5344CB8AC3E}">
-        <p14:creationId xmlns:p14="http://schemas.microsoft.com/office/powerpoint/2010/main" val="1352675182"/>
-      </p:ext>
-    </p:extLst>
-  </p:cSld>
-  <p:clrMapOvr>
-    <a:masterClrMapping/>
-  </p:clrMapOvr>
-  <p:timing>
-    <p:tnLst>
-      <p:par>
-        <p:cTn id="1" dur="indefinite" restart="never" nodeType="tmRoot"/>
-      </p:par>
-    </p:tnLst>
-  </p:timing>
-</p:sld>
-</file>
-
-<file path=ppt/slides/slide8.xml><?xml version="1.0" encoding="utf-8"?>
-<p:sld xmlns:a="http://schemas.openxmlformats.org/drawingml/2006/main" xmlns:r="http://schemas.openxmlformats.org/officeDocument/2006/relationships" xmlns:p="http://schemas.openxmlformats.org/presentationml/2006/main">
-  <p:cSld>
-    <p:spTree>
-      <p:nvGrpSpPr>
-        <p:cNvPr id="1" name=""/>
-        <p:cNvGrpSpPr/>
-        <p:nvPr/>
-      </p:nvGrpSpPr>
-      <p:grpSpPr>
-        <a:xfrm>
-          <a:off x="0" y="0"/>
-          <a:ext cx="0" cy="0"/>
-          <a:chOff x="0" y="0"/>
-          <a:chExt cx="0" cy="0"/>
-        </a:xfrm>
-      </p:grpSpPr>
-      <p:sp>
-        <p:nvSpPr>
-          <p:cNvPr id="2" name="Title 1"/>
-          <p:cNvSpPr>
-            <a:spLocks noGrp="1"/>
-          </p:cNvSpPr>
-          <p:nvPr>
-            <p:ph type="title"/>
-          </p:nvPr>
-        </p:nvSpPr>
-        <p:spPr/>
-        <p:txBody>
-          <a:bodyPr/>
-          <a:lstStyle/>
-          <a:p>
-            <a:r>
-              <a:rPr lang="en-GB" dirty="0" smtClean="0"/>
-              <a:t>DND object Cut Algorithm: Forthcoming</a:t>
-            </a:r>
-            <a:endParaRPr lang="en-GB" dirty="0"/>
-          </a:p>
-        </p:txBody>
-      </p:sp>
-      <p:sp>
-        <p:nvSpPr>
-          <p:cNvPr id="3" name="TextBox 2"/>
-          <p:cNvSpPr txBox="1"/>
-          <p:nvPr/>
-        </p:nvSpPr>
-        <p:spPr>
-          <a:xfrm>
-            <a:off x="838199" y="1915886"/>
-            <a:ext cx="9546771" cy="3539430"/>
-          </a:xfrm>
-          <a:prstGeom prst="rect">
-            <a:avLst/>
-          </a:prstGeom>
-          <a:noFill/>
-        </p:spPr>
-        <p:txBody>
-          <a:bodyPr wrap="square" rtlCol="0">
-            <a:spAutoFit/>
-          </a:bodyPr>
-          <a:lstStyle/>
-          <a:p>
-            <a:r>
-              <a:rPr lang="en-GB" sz="2800" dirty="0" smtClean="0"/>
-              <a:t>Convert to density; </a:t>
-            </a:r>
-          </a:p>
-          <a:p>
-            <a:endParaRPr lang="en-GB" sz="2800" dirty="0" smtClean="0"/>
-          </a:p>
-          <a:p>
-            <a:r>
-              <a:rPr lang="en-GB" sz="2800" dirty="0" smtClean="0"/>
-              <a:t>Interpolate density in the centres of new grid;</a:t>
-            </a:r>
-          </a:p>
-          <a:p>
-            <a:endParaRPr lang="en-GB" sz="2800" dirty="0" smtClean="0"/>
-          </a:p>
-          <a:p>
-            <a:r>
-              <a:rPr lang="en-GB" sz="2800" dirty="0" smtClean="0"/>
-              <a:t>convert to signal/error/</a:t>
-            </a:r>
-            <a:r>
-              <a:rPr lang="en-GB" sz="2800" dirty="0" err="1" smtClean="0"/>
-              <a:t>npix</a:t>
-            </a:r>
-            <a:r>
-              <a:rPr lang="en-GB" sz="2800" dirty="0" smtClean="0"/>
-              <a:t> on new grid, rebalance </a:t>
-            </a:r>
-            <a:r>
-              <a:rPr lang="en-GB" sz="2800" dirty="0" err="1" smtClean="0"/>
-              <a:t>npix</a:t>
-            </a:r>
-            <a:r>
-              <a:rPr lang="en-GB" sz="2800" dirty="0" smtClean="0"/>
-              <a:t> to be even;</a:t>
-            </a:r>
-          </a:p>
-          <a:p>
-            <a:endParaRPr lang="en-GB" sz="2800" dirty="0" smtClean="0"/>
-          </a:p>
-          <a:p>
-            <a:r>
-              <a:rPr lang="en-GB" sz="2800" dirty="0" smtClean="0"/>
-              <a:t>Sum (integrate) over collapsed dimensions, if this is necessary;</a:t>
-            </a:r>
-            <a:endParaRPr lang="en-GB" sz="2800" dirty="0"/>
-          </a:p>
-        </p:txBody>
-      </p:sp>
-    </p:spTree>
-    <p:extLst>
-      <p:ext uri="{BB962C8B-B14F-4D97-AF65-F5344CB8AC3E}">
-        <p14:creationId xmlns:p14="http://schemas.microsoft.com/office/powerpoint/2010/main" val="3356624891"/>
-      </p:ext>
-    </p:extLst>
-  </p:cSld>
-  <p:clrMapOvr>
-    <a:masterClrMapping/>
-  </p:clrMapOvr>
-  <p:timing>
-    <p:tnLst>
-      <p:par>
-        <p:cTn id="1" dur="indefinite" restart="never" nodeType="tmRoot"/>
-      </p:par>
-    </p:tnLst>
-  </p:timing>
-</p:sld>
-</file>
-
 <file path=ppt/slides/slide9.xml><?xml version="1.0" encoding="utf-8"?>
 <p:sld xmlns:a="http://schemas.openxmlformats.org/drawingml/2006/main" xmlns:r="http://schemas.openxmlformats.org/officeDocument/2006/relationships" xmlns:p="http://schemas.openxmlformats.org/presentationml/2006/main">
   <p:cSld>
@@ -5912,8 +6082,8 @@
         </p:nvSpPr>
         <p:spPr>
           <a:xfrm>
-            <a:off x="729342" y="195717"/>
-            <a:ext cx="10515600" cy="825046"/>
+            <a:off x="838200" y="365126"/>
+            <a:ext cx="10515600" cy="759732"/>
           </a:xfrm>
         </p:spPr>
         <p:txBody>
@@ -5922,7 +6092,7 @@
           <a:p>
             <a:r>
               <a:rPr lang="en-GB" dirty="0" smtClean="0"/>
-              <a:t>Validation of serializable objects</a:t>
+              <a:t>SQW object Cut Algorithm Implementation:</a:t>
             </a:r>
             <a:endParaRPr lang="en-GB" dirty="0"/>
           </a:p>
@@ -5930,349 +6100,753 @@
       </p:sp>
       <p:sp>
         <p:nvSpPr>
-          <p:cNvPr id="3" name="TextBox 2"/>
-          <p:cNvSpPr txBox="1"/>
+          <p:cNvPr id="4" name="Rectangle 3"/>
+          <p:cNvSpPr/>
           <p:nvPr/>
         </p:nvSpPr>
         <p:spPr>
           <a:xfrm>
-            <a:off x="729342" y="931446"/>
-            <a:ext cx="10156371" cy="954107"/>
+            <a:off x="736598" y="1099854"/>
+            <a:ext cx="10468429" cy="369332"/>
           </a:xfrm>
           <a:prstGeom prst="rect">
             <a:avLst/>
           </a:prstGeom>
-          <a:noFill/>
-        </p:spPr>
-        <p:txBody>
-          <a:bodyPr wrap="square" rtlCol="0">
+        </p:spPr>
+        <p:txBody>
+          <a:bodyPr wrap="square">
             <a:spAutoFit/>
           </a:bodyPr>
           <a:lstStyle/>
           <a:p>
             <a:r>
-              <a:rPr lang="en-GB" sz="2800" dirty="0" smtClean="0">
-                <a:solidFill>
-                  <a:srgbClr val="FF0000"/>
-                </a:solidFill>
+              <a:rPr lang="en-GB" b="1" dirty="0">
+                <a:latin typeface="Menlo"/>
               </a:rPr>
-              <a:t>PROBLEM:</a:t>
-            </a:r>
-          </a:p>
-          <a:p>
-            <a:r>
-              <a:rPr lang="en-GB" sz="2800" dirty="0" smtClean="0">
-                <a:solidFill>
-                  <a:srgbClr val="FF0000"/>
-                </a:solidFill>
+              <a:t>[</a:t>
+            </a:r>
+            <a:r>
+              <a:rPr lang="en-GB" b="1" dirty="0" err="1" smtClean="0">
+                <a:latin typeface="Menlo"/>
               </a:rPr>
-              <a:t> </a:t>
-            </a:r>
-            <a:r>
-              <a:rPr lang="en-GB" sz="2800" dirty="0" smtClean="0"/>
-              <a:t>Different complex constructors, difficult to comprehend and modify </a:t>
-            </a:r>
-            <a:endParaRPr lang="en-GB" sz="2800" dirty="0"/>
-          </a:p>
-        </p:txBody>
-      </p:sp>
-      <p:sp>
-        <p:nvSpPr>
-          <p:cNvPr id="4" name="TextBox 3"/>
-          <p:cNvSpPr txBox="1"/>
+              <a:t>targ_proj,targ_binning</a:t>
+            </a:r>
+            <a:r>
+              <a:rPr lang="en-GB" b="1" dirty="0" smtClean="0">
+                <a:latin typeface="Menlo"/>
+              </a:rPr>
+              <a:t>] = </a:t>
+            </a:r>
+            <a:r>
+              <a:rPr lang="en-GB" b="1" dirty="0" err="1" smtClean="0">
+                <a:latin typeface="Menlo"/>
+              </a:rPr>
+              <a:t>process_and_validate_cut_inputs</a:t>
+            </a:r>
+            <a:r>
+              <a:rPr lang="en-GB" b="1" dirty="0" smtClean="0">
+                <a:latin typeface="Menlo"/>
+              </a:rPr>
+              <a:t>(</a:t>
+            </a:r>
+            <a:r>
+              <a:rPr lang="en-GB" b="1" dirty="0" err="1" smtClean="0">
+                <a:latin typeface="Menlo"/>
+              </a:rPr>
+              <a:t>source_sqw,binning_inputs</a:t>
+            </a:r>
+            <a:r>
+              <a:rPr lang="en-GB" b="1" dirty="0" smtClean="0">
+                <a:latin typeface="Menlo"/>
+              </a:rPr>
+              <a:t>)</a:t>
+            </a:r>
+            <a:endParaRPr lang="en-GB" b="1" dirty="0">
+              <a:latin typeface="Menlo"/>
+            </a:endParaRPr>
+          </a:p>
+        </p:txBody>
+      </p:sp>
+      <p:sp>
+        <p:nvSpPr>
+          <p:cNvPr id="5" name="Rectangle 4"/>
+          <p:cNvSpPr/>
           <p:nvPr/>
         </p:nvSpPr>
         <p:spPr>
           <a:xfrm>
-            <a:off x="729342" y="1823935"/>
-            <a:ext cx="9656746" cy="1384995"/>
+            <a:off x="838200" y="1469186"/>
+            <a:ext cx="11676742" cy="4801314"/>
           </a:xfrm>
           <a:prstGeom prst="rect">
             <a:avLst/>
           </a:prstGeom>
-          <a:noFill/>
-        </p:spPr>
-        <p:txBody>
-          <a:bodyPr wrap="none" rtlCol="0">
+        </p:spPr>
+        <p:txBody>
+          <a:bodyPr wrap="square">
             <a:spAutoFit/>
           </a:bodyPr>
           <a:lstStyle/>
           <a:p>
             <a:r>
-              <a:rPr lang="en-GB" sz="2800" dirty="0" smtClean="0">
+              <a:rPr lang="en-GB" b="1" dirty="0" err="1" smtClean="0">
+                <a:latin typeface="Menlo"/>
+              </a:rPr>
+              <a:t>targ_ax_block</a:t>
+            </a:r>
+            <a:r>
+              <a:rPr lang="en-GB" b="1" dirty="0" smtClean="0">
+                <a:latin typeface="Menlo"/>
+              </a:rPr>
+              <a:t> </a:t>
+            </a:r>
+            <a:r>
+              <a:rPr lang="en-GB" b="1" dirty="0">
+                <a:latin typeface="Menlo"/>
+              </a:rPr>
+              <a:t>= </a:t>
+            </a:r>
+            <a:r>
+              <a:rPr lang="en-GB" b="1" dirty="0" err="1" smtClean="0">
+                <a:latin typeface="Menlo"/>
+              </a:rPr>
+              <a:t>targ_proj.</a:t>
+            </a:r>
+            <a:r>
+              <a:rPr lang="en-GB" b="1" dirty="0" err="1" smtClean="0">
+                <a:solidFill>
+                  <a:srgbClr val="00B050"/>
+                </a:solidFill>
+                <a:latin typeface="Menlo"/>
+              </a:rPr>
+              <a:t>get_proj_axes_block</a:t>
+            </a:r>
+            <a:r>
+              <a:rPr lang="en-GB" b="1" dirty="0">
+                <a:latin typeface="Menlo"/>
+              </a:rPr>
+              <a:t>(</a:t>
+            </a:r>
+            <a:r>
+              <a:rPr lang="en-GB" b="1" dirty="0" err="1" smtClean="0">
+                <a:latin typeface="Menlo"/>
+              </a:rPr>
+              <a:t>targ_binning</a:t>
+            </a:r>
+            <a:r>
+              <a:rPr lang="en-GB" b="1" dirty="0" smtClean="0">
+                <a:latin typeface="Menlo"/>
+              </a:rPr>
+              <a:t>);</a:t>
+            </a:r>
+          </a:p>
+          <a:p>
+            <a:r>
+              <a:rPr lang="en-GB" b="1" dirty="0" smtClean="0">
+                <a:solidFill>
+                  <a:srgbClr val="028009"/>
+                </a:solidFill>
+                <a:latin typeface="Menlo"/>
+              </a:rPr>
+              <a:t>%</a:t>
+            </a:r>
+          </a:p>
+          <a:p>
+            <a:r>
+              <a:rPr lang="en-GB" b="1" dirty="0" smtClean="0"/>
+              <a:t>[</a:t>
+            </a:r>
+            <a:r>
+              <a:rPr lang="en-GB" b="1" dirty="0" err="1" smtClean="0"/>
+              <a:t>pix_starts</a:t>
+            </a:r>
+            <a:r>
+              <a:rPr lang="en-GB" b="1" dirty="0"/>
+              <a:t>, </a:t>
+            </a:r>
+            <a:r>
+              <a:rPr lang="en-GB" b="1" dirty="0" err="1"/>
+              <a:t>block_sizes</a:t>
+            </a:r>
+            <a:r>
+              <a:rPr lang="en-GB" b="1" dirty="0"/>
+              <a:t>] = </a:t>
+            </a:r>
+            <a:r>
+              <a:rPr lang="en-GB" b="1" dirty="0" err="1" smtClean="0">
+                <a:latin typeface="Menlo"/>
+              </a:rPr>
+              <a:t>source_proj</a:t>
+            </a:r>
+            <a:r>
+              <a:rPr lang="en-GB" b="1" dirty="0" err="1" smtClean="0"/>
+              <a:t>.</a:t>
+            </a:r>
+            <a:r>
+              <a:rPr lang="en-GB" b="1" dirty="0" err="1" smtClean="0">
                 <a:solidFill>
                   <a:srgbClr val="0070C0"/>
                 </a:solidFill>
               </a:rPr>
-              <a:t>Clue to solution: </a:t>
-            </a:r>
-          </a:p>
-          <a:p>
-            <a:r>
-              <a:rPr lang="en-GB" sz="2800" dirty="0" smtClean="0"/>
-              <a:t>Serializable objects have empty constructor and public interface, </a:t>
-            </a:r>
-          </a:p>
-          <a:p>
-            <a:r>
-              <a:rPr lang="en-GB" sz="2800" dirty="0" smtClean="0"/>
-              <a:t>allowing fully define the object state</a:t>
-            </a:r>
-            <a:endParaRPr lang="en-GB" sz="2800" dirty="0"/>
-          </a:p>
-        </p:txBody>
-      </p:sp>
-      <p:sp>
-        <p:nvSpPr>
-          <p:cNvPr id="5" name="TextBox 4"/>
-          <p:cNvSpPr txBox="1"/>
-          <p:nvPr/>
-        </p:nvSpPr>
-        <p:spPr>
-          <a:xfrm>
-            <a:off x="631371" y="3125953"/>
-            <a:ext cx="6530699" cy="523220"/>
-          </a:xfrm>
-          <a:prstGeom prst="rect">
-            <a:avLst/>
-          </a:prstGeom>
-          <a:noFill/>
-        </p:spPr>
-        <p:txBody>
-          <a:bodyPr wrap="none" rtlCol="0">
-            <a:spAutoFit/>
-          </a:bodyPr>
-          <a:lstStyle/>
-          <a:p>
-            <a:r>
-              <a:rPr lang="en-GB" sz="2800" dirty="0" smtClean="0">
-                <a:solidFill>
-                  <a:srgbClr val="FFC000"/>
-                </a:solidFill>
-              </a:rPr>
-              <a:t>Complication: </a:t>
-            </a:r>
-            <a:r>
-              <a:rPr lang="en-GB" sz="2800" dirty="0" smtClean="0"/>
-              <a:t>Interdependent properties. </a:t>
-            </a:r>
-            <a:endParaRPr lang="en-GB" sz="2800" dirty="0"/>
-          </a:p>
-        </p:txBody>
-      </p:sp>
-      <p:sp>
-        <p:nvSpPr>
-          <p:cNvPr id="6" name="TextBox 5"/>
-          <p:cNvSpPr txBox="1"/>
-          <p:nvPr/>
-        </p:nvSpPr>
-        <p:spPr>
-          <a:xfrm>
-            <a:off x="631371" y="3649173"/>
-            <a:ext cx="11006346" cy="1384995"/>
-          </a:xfrm>
-          <a:prstGeom prst="rect">
-            <a:avLst/>
-          </a:prstGeom>
-          <a:noFill/>
-        </p:spPr>
-        <p:txBody>
-          <a:bodyPr wrap="none" rtlCol="0">
-            <a:spAutoFit/>
-          </a:bodyPr>
-          <a:lstStyle/>
-          <a:p>
-            <a:r>
-              <a:rPr lang="en-GB" sz="2800" dirty="0" smtClean="0">
+              <a:t>get_nrange</a:t>
+            </a:r>
+            <a:r>
+              <a:rPr lang="en-GB" b="1" dirty="0" smtClean="0"/>
+              <a:t>(</a:t>
+            </a:r>
+            <a:r>
+              <a:rPr lang="en-GB" b="1" dirty="0" err="1" smtClean="0"/>
+              <a:t>npix,source_axes,targ_axes,targ_proj</a:t>
+            </a:r>
+            <a:r>
+              <a:rPr lang="en-GB" b="1" dirty="0" smtClean="0"/>
+              <a:t>);</a:t>
+            </a:r>
+            <a:endParaRPr lang="en-GB" b="1" dirty="0"/>
+          </a:p>
+          <a:p>
+            <a:endParaRPr lang="en-GB" b="1" dirty="0" smtClean="0">
+              <a:latin typeface="Menlo"/>
+            </a:endParaRPr>
+          </a:p>
+          <a:p>
+            <a:r>
+              <a:rPr lang="en-GB" b="1" dirty="0" smtClean="0"/>
+              <a:t>                         </a:t>
+            </a:r>
+            <a:r>
+              <a:rPr lang="en-GB" b="1" dirty="0" err="1" smtClean="0"/>
+              <a:t>ch_cube</a:t>
+            </a:r>
+            <a:r>
+              <a:rPr lang="en-GB" b="1" dirty="0" smtClean="0"/>
+              <a:t> </a:t>
+            </a:r>
+            <a:r>
+              <a:rPr lang="en-GB" b="1" dirty="0"/>
+              <a:t>= </a:t>
+            </a:r>
+            <a:r>
+              <a:rPr lang="en-GB" b="1" dirty="0" err="1"/>
+              <a:t>cur_axes_block.</a:t>
+            </a:r>
+            <a:r>
+              <a:rPr lang="en-GB" b="1" dirty="0" err="1">
                 <a:solidFill>
                   <a:srgbClr val="00B050"/>
                 </a:solidFill>
               </a:rPr>
-              <a:t>Suggested solution:  </a:t>
-            </a:r>
-            <a:r>
-              <a:rPr lang="en-GB" sz="2800" dirty="0" smtClean="0"/>
-              <a:t>separate specific and interdependent validators.</a:t>
-            </a:r>
-            <a:r>
-              <a:rPr lang="en-GB" sz="2800" dirty="0" smtClean="0"/>
+              <a:t>get_axes_scales</a:t>
+            </a:r>
+            <a:r>
+              <a:rPr lang="en-GB" b="1" dirty="0"/>
+              <a:t>();</a:t>
+            </a:r>
+          </a:p>
+          <a:p>
+            <a:r>
+              <a:rPr lang="en-GB" b="1" dirty="0" smtClean="0"/>
+              <a:t>                         </a:t>
+            </a:r>
+            <a:r>
+              <a:rPr lang="en-GB" b="1" dirty="0" err="1" smtClean="0"/>
+              <a:t>trans_chcube</a:t>
+            </a:r>
+            <a:r>
+              <a:rPr lang="en-GB" b="1" dirty="0" smtClean="0"/>
               <a:t> </a:t>
             </a:r>
-          </a:p>
-          <a:p>
-            <a:r>
-              <a:rPr lang="en-GB" sz="2800" dirty="0" smtClean="0"/>
-              <a:t>Constructors sets up all necessary public </a:t>
-            </a:r>
-            <a:r>
-              <a:rPr lang="en-GB" sz="2800" dirty="0" smtClean="0"/>
-              <a:t>properties and then run common</a:t>
-            </a:r>
-          </a:p>
-          <a:p>
-            <a:r>
-              <a:rPr lang="en-GB" sz="2800" dirty="0" smtClean="0"/>
-              <a:t>validator. </a:t>
-            </a:r>
-            <a:r>
-              <a:rPr lang="en-GB" sz="2800" dirty="0" smtClean="0"/>
-              <a:t>If common validator fails, throw.</a:t>
-            </a:r>
-            <a:endParaRPr lang="en-GB" sz="2800" dirty="0"/>
-          </a:p>
-        </p:txBody>
-      </p:sp>
-      <p:sp>
-        <p:nvSpPr>
-          <p:cNvPr id="7" name="TextBox 6"/>
-          <p:cNvSpPr txBox="1"/>
-          <p:nvPr/>
-        </p:nvSpPr>
-        <p:spPr>
-          <a:xfrm>
-            <a:off x="569685" y="4997357"/>
-            <a:ext cx="10119052" cy="954107"/>
-          </a:xfrm>
-          <a:prstGeom prst="rect">
-            <a:avLst/>
-          </a:prstGeom>
-          <a:noFill/>
-        </p:spPr>
-        <p:txBody>
-          <a:bodyPr wrap="none" rtlCol="0">
-            <a:spAutoFit/>
-          </a:bodyPr>
-          <a:lstStyle/>
-          <a:p>
-            <a:r>
-              <a:rPr lang="en-GB" sz="2800" dirty="0" smtClean="0">
+            <a:r>
+              <a:rPr lang="en-GB" b="1" dirty="0"/>
+              <a:t>= </a:t>
+            </a:r>
+            <a:r>
+              <a:rPr lang="en-GB" b="1" dirty="0" err="1"/>
+              <a:t>source_proj.</a:t>
+            </a:r>
+            <a:r>
+              <a:rPr lang="en-GB" b="1" dirty="0" err="1">
+                <a:solidFill>
+                  <a:srgbClr val="0070C0"/>
+                </a:solidFill>
+              </a:rPr>
+              <a:t>from_this_to_targ_coord</a:t>
+            </a:r>
+            <a:r>
+              <a:rPr lang="en-GB" b="1" dirty="0"/>
+              <a:t>(</a:t>
+            </a:r>
+            <a:r>
+              <a:rPr lang="en-GB" b="1" dirty="0" err="1"/>
+              <a:t>ch_cube</a:t>
+            </a:r>
+            <a:r>
+              <a:rPr lang="en-GB" b="1" dirty="0" smtClean="0"/>
+              <a:t>)</a:t>
+            </a:r>
+          </a:p>
+          <a:p>
+            <a:r>
+              <a:rPr lang="en-GB" b="1" dirty="0" smtClean="0"/>
+              <a:t>                         </a:t>
+            </a:r>
+            <a:r>
+              <a:rPr lang="en-GB" b="1" dirty="0" err="1" smtClean="0"/>
+              <a:t>bin_nodes</a:t>
+            </a:r>
+            <a:r>
+              <a:rPr lang="en-GB" b="1" dirty="0" smtClean="0"/>
+              <a:t> </a:t>
+            </a:r>
+            <a:r>
+              <a:rPr lang="en-GB" b="1" dirty="0"/>
+              <a:t>= </a:t>
+            </a:r>
+            <a:r>
+              <a:rPr lang="en-GB" b="1" dirty="0" err="1" smtClean="0"/>
+              <a:t>targ_axes_block.</a:t>
+            </a:r>
+            <a:r>
+              <a:rPr lang="en-GB" b="1" dirty="0" err="1" smtClean="0">
+                <a:solidFill>
+                  <a:srgbClr val="0070C0"/>
+                </a:solidFill>
+              </a:rPr>
+              <a:t>get_bin_nodes</a:t>
+            </a:r>
+            <a:r>
+              <a:rPr lang="en-GB" b="1" dirty="0" smtClean="0"/>
+              <a:t>(</a:t>
+            </a:r>
+            <a:r>
+              <a:rPr lang="en-GB" b="1" dirty="0" err="1" smtClean="0"/>
+              <a:t>trans_chcube</a:t>
+            </a:r>
+            <a:r>
+              <a:rPr lang="en-GB" b="1" dirty="0" smtClean="0"/>
+              <a:t>)  </a:t>
+            </a:r>
+            <a:r>
+              <a:rPr lang="en-GB" b="1" dirty="0" smtClean="0">
                 <a:solidFill>
                   <a:srgbClr val="00B050"/>
                 </a:solidFill>
               </a:rPr>
-              <a:t>Profit: </a:t>
-            </a:r>
-            <a:r>
-              <a:rPr lang="en-GB" sz="2800" dirty="0" smtClean="0"/>
-              <a:t>generic constructor in the form:</a:t>
-            </a:r>
-          </a:p>
-          <a:p>
-            <a:r>
-              <a:rPr lang="en-GB" sz="2800" b="1" i="1" dirty="0" smtClean="0"/>
+              <a:t>% needs halo</a:t>
+            </a:r>
+          </a:p>
+          <a:p>
+            <a:r>
+              <a:rPr lang="en-GB" b="1" dirty="0" smtClean="0"/>
+              <a:t>                         </a:t>
+            </a:r>
+            <a:r>
+              <a:rPr lang="en-GB" b="1" dirty="0" err="1" smtClean="0"/>
+              <a:t>nodes_here</a:t>
+            </a:r>
+            <a:r>
+              <a:rPr lang="en-GB" b="1" dirty="0" smtClean="0"/>
               <a:t> </a:t>
             </a:r>
             <a:r>
-              <a:rPr lang="en-GB" sz="2800" b="1" i="1" dirty="0" err="1" smtClean="0"/>
-              <a:t>obj</a:t>
-            </a:r>
-            <a:r>
-              <a:rPr lang="en-GB" sz="2800" b="1" i="1" dirty="0" smtClean="0"/>
-              <a:t>(positional_arg1,positional_arg2…., </a:t>
-            </a:r>
-            <a:r>
-              <a:rPr lang="en-GB" sz="2800" b="1" i="1" dirty="0" err="1" smtClean="0"/>
-              <a:t>keyN,valueN,keyN,valueN</a:t>
-            </a:r>
-            <a:r>
-              <a:rPr lang="en-GB" sz="2800" b="1" i="1" dirty="0" smtClean="0"/>
-              <a:t>)</a:t>
-            </a:r>
-            <a:endParaRPr lang="en-GB" sz="2800" b="1" i="1" dirty="0"/>
-          </a:p>
-        </p:txBody>
-      </p:sp>
-      <p:sp>
-        <p:nvSpPr>
-          <p:cNvPr id="8" name="TextBox 7"/>
-          <p:cNvSpPr txBox="1"/>
-          <p:nvPr/>
-        </p:nvSpPr>
-        <p:spPr>
-          <a:xfrm flipH="1">
-            <a:off x="631371" y="6176441"/>
-            <a:ext cx="10421258" cy="523220"/>
-          </a:xfrm>
-          <a:prstGeom prst="rect">
-            <a:avLst/>
-          </a:prstGeom>
-          <a:noFill/>
-        </p:spPr>
-        <p:txBody>
-          <a:bodyPr wrap="square" rtlCol="0">
-            <a:spAutoFit/>
-          </a:bodyPr>
-          <a:lstStyle/>
-          <a:p>
-            <a:r>
-              <a:rPr lang="en-GB" sz="2800" dirty="0" smtClean="0">
+              <a:rPr lang="en-GB" b="1" dirty="0"/>
+              <a:t>= </a:t>
+            </a:r>
+            <a:r>
+              <a:rPr lang="en-GB" b="1" dirty="0" err="1"/>
+              <a:t>targ_proj.</a:t>
+            </a:r>
+            <a:r>
+              <a:rPr lang="en-GB" b="1" dirty="0" err="1">
                 <a:solidFill>
-                  <a:srgbClr val="FF0000"/>
+                  <a:srgbClr val="0070C0"/>
                 </a:solidFill>
               </a:rPr>
-              <a:t>Disadvantage</a:t>
-            </a:r>
-            <a:r>
-              <a:rPr lang="en-GB" sz="2800" dirty="0" smtClean="0"/>
-              <a:t>:  </a:t>
-            </a:r>
-            <a:r>
-              <a:rPr lang="en-GB" sz="2000" dirty="0" smtClean="0"/>
-              <a:t>An incomplete object defined through its public interface may be invalid </a:t>
-            </a:r>
-            <a:endParaRPr lang="en-GB" sz="2000" dirty="0"/>
-          </a:p>
-        </p:txBody>
-      </p:sp>
-      <p:sp>
-        <p:nvSpPr>
-          <p:cNvPr id="9" name="TextBox 8"/>
-          <p:cNvSpPr txBox="1"/>
+              <a:t>from_this_to_targ_coord</a:t>
+            </a:r>
+            <a:r>
+              <a:rPr lang="en-GB" b="1" dirty="0">
+                <a:solidFill>
+                  <a:srgbClr val="0070C0"/>
+                </a:solidFill>
+              </a:rPr>
+              <a:t>(</a:t>
+            </a:r>
+            <a:r>
+              <a:rPr lang="en-GB" b="1" dirty="0" err="1"/>
+              <a:t>bin_nodes</a:t>
+            </a:r>
+            <a:r>
+              <a:rPr lang="en-GB" b="1" dirty="0" smtClean="0"/>
+              <a:t>);</a:t>
+            </a:r>
+            <a:endParaRPr lang="en-GB" b="1" dirty="0"/>
+          </a:p>
+          <a:p>
+            <a:r>
+              <a:rPr lang="en-GB" b="1" dirty="0" smtClean="0"/>
+              <a:t>                         </a:t>
+            </a:r>
+            <a:r>
+              <a:rPr lang="en-GB" b="1" dirty="0" err="1" smtClean="0"/>
+              <a:t>nbin_in_bin</a:t>
+            </a:r>
+            <a:r>
+              <a:rPr lang="en-GB" b="1" dirty="0" smtClean="0"/>
+              <a:t> </a:t>
+            </a:r>
+            <a:r>
+              <a:rPr lang="en-GB" b="1" dirty="0"/>
+              <a:t>= </a:t>
+            </a:r>
+            <a:r>
+              <a:rPr lang="en-GB" b="1" dirty="0" err="1"/>
+              <a:t>cur_axes_block.</a:t>
+            </a:r>
+            <a:r>
+              <a:rPr lang="en-GB" b="1" dirty="0" err="1">
+                <a:solidFill>
+                  <a:srgbClr val="0070C0"/>
+                </a:solidFill>
+              </a:rPr>
+              <a:t>bin_pixels</a:t>
+            </a:r>
+            <a:r>
+              <a:rPr lang="en-GB" b="1" dirty="0"/>
+              <a:t>(</a:t>
+            </a:r>
+            <a:r>
+              <a:rPr lang="en-GB" b="1" dirty="0" err="1"/>
+              <a:t>nodes_here</a:t>
+            </a:r>
+            <a:r>
+              <a:rPr lang="en-GB" b="1" dirty="0"/>
+              <a:t>)</a:t>
+            </a:r>
+          </a:p>
+          <a:p>
+            <a:r>
+              <a:rPr lang="en-GB" b="1" dirty="0" smtClean="0"/>
+              <a:t>                         </a:t>
+            </a:r>
+            <a:r>
+              <a:rPr lang="en-GB" b="1" dirty="0" err="1" smtClean="0"/>
+              <a:t>contrib_ind</a:t>
+            </a:r>
+            <a:r>
+              <a:rPr lang="en-GB" b="1" dirty="0" smtClean="0"/>
+              <a:t> </a:t>
+            </a:r>
+            <a:r>
+              <a:rPr lang="en-GB" b="1" dirty="0"/>
+              <a:t>= find(</a:t>
+            </a:r>
+            <a:r>
+              <a:rPr lang="en-GB" b="1" dirty="0" err="1"/>
+              <a:t>nbin_in_bin</a:t>
+            </a:r>
+            <a:r>
+              <a:rPr lang="en-GB" b="1" dirty="0"/>
+              <a:t>&gt;0</a:t>
+            </a:r>
+            <a:r>
+              <a:rPr lang="en-GB" b="1" dirty="0" smtClean="0"/>
+              <a:t>)</a:t>
+            </a:r>
+          </a:p>
+          <a:p>
+            <a:r>
+              <a:rPr lang="en-GB" dirty="0" smtClean="0"/>
+              <a:t>Find pixel indexes from cell indexes using </a:t>
+            </a:r>
+            <a:r>
+              <a:rPr lang="en-GB" dirty="0" err="1" smtClean="0"/>
+              <a:t>pix</a:t>
+            </a:r>
+            <a:r>
+              <a:rPr lang="en-GB" dirty="0" smtClean="0"/>
+              <a:t> in cell density</a:t>
+            </a:r>
+          </a:p>
+          <a:p>
+            <a:endParaRPr lang="en-GB" b="1" dirty="0" smtClean="0"/>
+          </a:p>
+          <a:p>
+            <a:r>
+              <a:rPr lang="en-GB" b="1" dirty="0" err="1" smtClean="0"/>
+              <a:t>candidate_pix</a:t>
+            </a:r>
+            <a:r>
+              <a:rPr lang="en-GB" b="1" dirty="0" smtClean="0"/>
+              <a:t> </a:t>
+            </a:r>
+            <a:r>
+              <a:rPr lang="en-GB" b="1" dirty="0"/>
+              <a:t>= </a:t>
+            </a:r>
+            <a:r>
+              <a:rPr lang="en-GB" b="1" dirty="0" err="1" smtClean="0"/>
+              <a:t>source_pix.get_pix_in_ranges</a:t>
+            </a:r>
+            <a:r>
+              <a:rPr lang="en-GB" b="1" dirty="0" smtClean="0"/>
+              <a:t>(</a:t>
+            </a:r>
+            <a:r>
+              <a:rPr lang="en-GB" b="1" dirty="0" err="1" smtClean="0"/>
+              <a:t>pix_starts</a:t>
+            </a:r>
+            <a:r>
+              <a:rPr lang="en-GB" b="1" dirty="0" smtClean="0"/>
+              <a:t>, </a:t>
+            </a:r>
+            <a:r>
+              <a:rPr lang="en-GB" b="1" dirty="0" err="1" smtClean="0"/>
+              <a:t>block_sizes</a:t>
+            </a:r>
+            <a:r>
+              <a:rPr lang="en-GB" b="1" dirty="0" smtClean="0"/>
+              <a:t>);</a:t>
+            </a:r>
+          </a:p>
+          <a:p>
+            <a:r>
+              <a:rPr lang="en-GB" b="1" dirty="0" smtClean="0"/>
+              <a:t>[</a:t>
+            </a:r>
+            <a:r>
+              <a:rPr lang="en-GB" b="1" dirty="0" err="1"/>
+              <a:t>npix,s,e,pix_ok,unique_runid</a:t>
+            </a:r>
+            <a:r>
+              <a:rPr lang="en-GB" b="1" dirty="0"/>
+              <a:t>] = </a:t>
+            </a:r>
+            <a:r>
+              <a:rPr lang="en-GB" b="1" dirty="0" err="1" smtClean="0"/>
+              <a:t>targ_proj.</a:t>
+            </a:r>
+            <a:r>
+              <a:rPr lang="en-GB" b="1" dirty="0" err="1" smtClean="0">
+                <a:solidFill>
+                  <a:srgbClr val="0070C0"/>
+                </a:solidFill>
+              </a:rPr>
+              <a:t>bin_pixels</a:t>
+            </a:r>
+            <a:r>
+              <a:rPr lang="en-GB" b="1" dirty="0" smtClean="0"/>
+              <a:t>(</a:t>
+            </a:r>
+            <a:r>
+              <a:rPr lang="en-GB" b="1" dirty="0" err="1" smtClean="0"/>
+              <a:t>targ_axes,candidate_pix</a:t>
+            </a:r>
+            <a:r>
+              <a:rPr lang="en-GB" b="1" dirty="0" smtClean="0"/>
+              <a:t>)</a:t>
+            </a:r>
+            <a:endParaRPr lang="en-GB" b="1" dirty="0"/>
+          </a:p>
+          <a:p>
+            <a:endParaRPr lang="en-GB" b="1" dirty="0"/>
+          </a:p>
+          <a:p>
+            <a:r>
+              <a:rPr lang="en-GB" b="1" dirty="0" smtClean="0">
+                <a:latin typeface="Menlo"/>
+              </a:rPr>
+              <a:t>                </a:t>
+            </a:r>
+            <a:r>
+              <a:rPr lang="en-GB" dirty="0" err="1" smtClean="0">
+                <a:latin typeface="Menlo"/>
+              </a:rPr>
+              <a:t>pix_in_targ_coord_system</a:t>
+            </a:r>
+            <a:r>
+              <a:rPr lang="en-GB" dirty="0" smtClean="0">
+                <a:latin typeface="Menlo"/>
+              </a:rPr>
+              <a:t> </a:t>
+            </a:r>
+            <a:r>
+              <a:rPr lang="en-GB" b="1" dirty="0" smtClean="0">
+                <a:latin typeface="Menlo"/>
+              </a:rPr>
+              <a:t>= </a:t>
+            </a:r>
+            <a:r>
+              <a:rPr lang="en-GB" b="1" dirty="0" err="1" smtClean="0">
+                <a:latin typeface="Menlo"/>
+              </a:rPr>
+              <a:t>targ_proj</a:t>
+            </a:r>
+            <a:r>
+              <a:rPr lang="en-GB" b="1" dirty="0" err="1" smtClean="0">
+                <a:solidFill>
+                  <a:srgbClr val="00B050"/>
+                </a:solidFill>
+                <a:latin typeface="Menlo"/>
+              </a:rPr>
+              <a:t>.from_pix_to_img</a:t>
+            </a:r>
+            <a:r>
+              <a:rPr lang="en-GB" b="1" dirty="0" smtClean="0">
+                <a:latin typeface="Menlo"/>
+              </a:rPr>
+              <a:t>(</a:t>
+            </a:r>
+            <a:r>
+              <a:rPr lang="en-GB" b="1" dirty="0" err="1" smtClean="0"/>
+              <a:t>candidate_pix</a:t>
+            </a:r>
+            <a:r>
+              <a:rPr lang="en-GB" b="1" dirty="0" smtClean="0">
+                <a:latin typeface="Menlo"/>
+              </a:rPr>
+              <a:t>) </a:t>
+            </a:r>
+          </a:p>
+          <a:p>
+            <a:r>
+              <a:rPr lang="en-GB" b="1" dirty="0" smtClean="0">
+                <a:latin typeface="Menlo"/>
+              </a:rPr>
+              <a:t>                </a:t>
+            </a:r>
+            <a:r>
+              <a:rPr lang="en-GB" b="1" dirty="0" smtClean="0"/>
+              <a:t>[</a:t>
+            </a:r>
+            <a:r>
+              <a:rPr lang="en-GB" b="1" dirty="0" err="1" smtClean="0"/>
+              <a:t>npix,s,e,pix_oke_runid</a:t>
+            </a:r>
+            <a:r>
+              <a:rPr lang="en-GB" b="1" dirty="0" smtClean="0"/>
+              <a:t>] = </a:t>
+            </a:r>
+            <a:r>
+              <a:rPr lang="en-GB" b="1" dirty="0" err="1" smtClean="0"/>
+              <a:t>targ_axes_block.</a:t>
+            </a:r>
+            <a:r>
+              <a:rPr lang="en-GB" b="1" dirty="0" err="1" smtClean="0">
+                <a:solidFill>
+                  <a:srgbClr val="0070C0"/>
+                </a:solidFill>
+              </a:rPr>
+              <a:t>bin_pixels</a:t>
+            </a:r>
+            <a:r>
+              <a:rPr lang="en-GB" b="1" dirty="0" smtClean="0"/>
+              <a:t>(</a:t>
+            </a:r>
+            <a:r>
+              <a:rPr lang="en-GB" dirty="0" err="1" smtClean="0">
+                <a:latin typeface="Menlo"/>
+              </a:rPr>
+              <a:t>pix_in_targ_coord_system</a:t>
+            </a:r>
+            <a:r>
+              <a:rPr lang="ru-RU" dirty="0" smtClean="0">
+                <a:latin typeface="Menlo"/>
+              </a:rPr>
+              <a:t>)</a:t>
+            </a:r>
+            <a:endParaRPr lang="en-GB" b="1" dirty="0">
+              <a:latin typeface="Menlo"/>
+            </a:endParaRPr>
+          </a:p>
+        </p:txBody>
+      </p:sp>
+      <p:sp>
+        <p:nvSpPr>
+          <p:cNvPr id="7" name="Right Brace 6"/>
+          <p:cNvSpPr/>
           <p:nvPr/>
         </p:nvSpPr>
         <p:spPr>
-          <a:xfrm>
-            <a:off x="631371" y="5879287"/>
-            <a:ext cx="9800953" cy="646331"/>
-          </a:xfrm>
-          <a:prstGeom prst="rect">
-            <a:avLst/>
+          <a:xfrm rot="5400000">
+            <a:off x="5021944" y="-1930406"/>
+            <a:ext cx="413658" cy="8744859"/>
+          </a:xfrm>
+          <a:prstGeom prst="rightBrace">
+            <a:avLst>
+              <a:gd name="adj1" fmla="val 8333"/>
+              <a:gd name="adj2" fmla="val 49616"/>
+            </a:avLst>
           </a:prstGeom>
-          <a:noFill/>
-        </p:spPr>
-        <p:txBody>
-          <a:bodyPr wrap="none" rtlCol="0">
-            <a:spAutoFit/>
-          </a:bodyPr>
-          <a:lstStyle/>
-          <a:p>
-            <a:r>
-              <a:rPr lang="en-GB" dirty="0" smtClean="0"/>
-              <a:t>Positional arguments in the order they appear in the list of </a:t>
-            </a:r>
-            <a:r>
-              <a:rPr lang="en-GB" b="1" dirty="0" err="1" smtClean="0"/>
-              <a:t>saveableFields</a:t>
-            </a:r>
-            <a:r>
-              <a:rPr lang="en-GB" b="1" dirty="0" smtClean="0"/>
-              <a:t>; </a:t>
-            </a:r>
-            <a:r>
-              <a:rPr lang="en-GB" dirty="0" smtClean="0"/>
-              <a:t>keys are the property names</a:t>
-            </a:r>
-            <a:endParaRPr lang="en-GB" b="1" dirty="0"/>
-          </a:p>
-          <a:p>
-            <a:endParaRPr lang="en-GB" dirty="0"/>
+        </p:spPr>
+        <p:style>
+          <a:lnRef idx="1">
+            <a:schemeClr val="accent1"/>
+          </a:lnRef>
+          <a:fillRef idx="0">
+            <a:schemeClr val="accent1"/>
+          </a:fillRef>
+          <a:effectRef idx="0">
+            <a:schemeClr val="accent1"/>
+          </a:effectRef>
+          <a:fontRef idx="minor">
+            <a:schemeClr val="tx1"/>
+          </a:fontRef>
+        </p:style>
+        <p:txBody>
+          <a:bodyPr rtlCol="0" anchor="ctr"/>
+          <a:lstStyle/>
+          <a:p>
+            <a:pPr algn="ctr"/>
+            <a:endParaRPr lang="en-GB"/>
+          </a:p>
+        </p:txBody>
+      </p:sp>
+      <p:sp>
+        <p:nvSpPr>
+          <p:cNvPr id="8" name="Right Brace 7"/>
+          <p:cNvSpPr/>
+          <p:nvPr/>
+        </p:nvSpPr>
+        <p:spPr>
+          <a:xfrm rot="5400000">
+            <a:off x="4394188" y="1600190"/>
+            <a:ext cx="449965" cy="7525658"/>
+          </a:xfrm>
+          <a:prstGeom prst="rightBrace">
+            <a:avLst>
+              <a:gd name="adj1" fmla="val 8333"/>
+              <a:gd name="adj2" fmla="val 49616"/>
+            </a:avLst>
+          </a:prstGeom>
+        </p:spPr>
+        <p:style>
+          <a:lnRef idx="1">
+            <a:schemeClr val="accent1"/>
+          </a:lnRef>
+          <a:fillRef idx="0">
+            <a:schemeClr val="accent1"/>
+          </a:fillRef>
+          <a:effectRef idx="0">
+            <a:schemeClr val="accent1"/>
+          </a:effectRef>
+          <a:fontRef idx="minor">
+            <a:schemeClr val="tx1"/>
+          </a:fontRef>
+        </p:style>
+        <p:txBody>
+          <a:bodyPr rtlCol="0" anchor="ctr"/>
+          <a:lstStyle/>
+          <a:p>
+            <a:pPr algn="ctr"/>
+            <a:endParaRPr lang="en-GB"/>
           </a:p>
         </p:txBody>
       </p:sp>
     </p:spTree>
     <p:extLst>
       <p:ext uri="{BB962C8B-B14F-4D97-AF65-F5344CB8AC3E}">
-        <p14:creationId xmlns:p14="http://schemas.microsoft.com/office/powerpoint/2010/main" val="1521153865"/>
+        <p14:creationId xmlns:p14="http://schemas.microsoft.com/office/powerpoint/2010/main" val="1352675182"/>
       </p:ext>
     </p:extLst>
   </p:cSld>

</xml_diff>

<commit_message>
Re #810 fixed func_eval tests and number of algorithms tests (except projection)
</commit_message>
<xml_diff>
--- a/documentation/presentations/SQW&GenericProjectionDesigh.pptx
+++ b/documentation/presentations/SQW&GenericProjectionDesigh.pptx
@@ -9,14 +9,15 @@
     <p:sldId id="257" r:id="rId3"/>
     <p:sldId id="258" r:id="rId4"/>
     <p:sldId id="259" r:id="rId5"/>
-    <p:sldId id="266" r:id="rId6"/>
-    <p:sldId id="267" r:id="rId7"/>
-    <p:sldId id="260" r:id="rId8"/>
-    <p:sldId id="261" r:id="rId9"/>
-    <p:sldId id="262" r:id="rId10"/>
-    <p:sldId id="263" r:id="rId11"/>
-    <p:sldId id="264" r:id="rId12"/>
-    <p:sldId id="265" r:id="rId13"/>
+    <p:sldId id="260" r:id="rId6"/>
+    <p:sldId id="266" r:id="rId7"/>
+    <p:sldId id="267" r:id="rId8"/>
+    <p:sldId id="268" r:id="rId9"/>
+    <p:sldId id="261" r:id="rId10"/>
+    <p:sldId id="262" r:id="rId11"/>
+    <p:sldId id="263" r:id="rId12"/>
+    <p:sldId id="264" r:id="rId13"/>
+    <p:sldId id="265" r:id="rId14"/>
   </p:sldIdLst>
   <p:sldSz cx="12192000" cy="6858000"/>
   <p:notesSz cx="6858000" cy="9144000"/>
@@ -3128,14 +3129,19 @@
             <p:ph type="title"/>
           </p:nvPr>
         </p:nvSpPr>
-        <p:spPr/>
+        <p:spPr>
+          <a:xfrm>
+            <a:off x="838200" y="365126"/>
+            <a:ext cx="10515600" cy="759732"/>
+          </a:xfrm>
+        </p:spPr>
         <p:txBody>
           <a:bodyPr/>
           <a:lstStyle/>
           <a:p>
             <a:r>
               <a:rPr lang="en-GB" dirty="0" smtClean="0"/>
-              <a:t>DND object Cut Algorithm: Forthcoming</a:t>
+              <a:t>SQW object Cut Algorithm Implementation:</a:t>
             </a:r>
             <a:endParaRPr lang="en-GB" dirty="0"/>
           </a:p>
@@ -3143,81 +3149,753 @@
       </p:sp>
       <p:sp>
         <p:nvSpPr>
-          <p:cNvPr id="3" name="TextBox 2"/>
-          <p:cNvSpPr txBox="1"/>
+          <p:cNvPr id="4" name="Rectangle 3"/>
+          <p:cNvSpPr/>
           <p:nvPr/>
         </p:nvSpPr>
         <p:spPr>
           <a:xfrm>
-            <a:off x="838199" y="1915886"/>
-            <a:ext cx="9546771" cy="3539430"/>
+            <a:off x="736598" y="1099854"/>
+            <a:ext cx="10468429" cy="369332"/>
           </a:xfrm>
           <a:prstGeom prst="rect">
             <a:avLst/>
           </a:prstGeom>
-          <a:noFill/>
-        </p:spPr>
-        <p:txBody>
-          <a:bodyPr wrap="square" rtlCol="0">
+        </p:spPr>
+        <p:txBody>
+          <a:bodyPr wrap="square">
             <a:spAutoFit/>
           </a:bodyPr>
           <a:lstStyle/>
           <a:p>
             <a:r>
-              <a:rPr lang="en-GB" sz="2800" dirty="0" smtClean="0"/>
-              <a:t>Convert to density; </a:t>
-            </a:r>
-          </a:p>
-          <a:p>
-            <a:endParaRPr lang="en-GB" sz="2800" dirty="0" smtClean="0"/>
-          </a:p>
-          <a:p>
-            <a:r>
-              <a:rPr lang="en-GB" sz="2800" dirty="0" smtClean="0"/>
-              <a:t>Interpolate density in the centres of new grid;</a:t>
-            </a:r>
-          </a:p>
-          <a:p>
-            <a:endParaRPr lang="en-GB" sz="2800" dirty="0" smtClean="0"/>
-          </a:p>
-          <a:p>
-            <a:r>
-              <a:rPr lang="en-GB" sz="2800" dirty="0" smtClean="0"/>
-              <a:t>convert to signal/error/</a:t>
-            </a:r>
-            <a:r>
-              <a:rPr lang="en-GB" sz="2800" dirty="0" err="1" smtClean="0"/>
-              <a:t>npix</a:t>
-            </a:r>
-            <a:r>
-              <a:rPr lang="en-GB" sz="2800" dirty="0" smtClean="0"/>
-              <a:t> on new grid, rebalance </a:t>
-            </a:r>
-            <a:r>
-              <a:rPr lang="en-GB" sz="2800" dirty="0" err="1" smtClean="0"/>
-              <a:t>npix</a:t>
-            </a:r>
-            <a:r>
-              <a:rPr lang="en-GB" sz="2800" dirty="0" smtClean="0"/>
-              <a:t> to be even;</a:t>
-            </a:r>
-          </a:p>
-          <a:p>
-            <a:endParaRPr lang="en-GB" sz="2800" dirty="0" smtClean="0"/>
-          </a:p>
-          <a:p>
-            <a:r>
-              <a:rPr lang="en-GB" sz="2800" dirty="0" smtClean="0"/>
-              <a:t>Sum (integrate) over collapsed dimensions, if this is necessary;</a:t>
-            </a:r>
-            <a:endParaRPr lang="en-GB" sz="2800" dirty="0"/>
+              <a:rPr lang="en-GB" b="1" dirty="0">
+                <a:latin typeface="Menlo"/>
+              </a:rPr>
+              <a:t>[</a:t>
+            </a:r>
+            <a:r>
+              <a:rPr lang="en-GB" b="1" dirty="0" err="1" smtClean="0">
+                <a:latin typeface="Menlo"/>
+              </a:rPr>
+              <a:t>targ_proj,targ_binning</a:t>
+            </a:r>
+            <a:r>
+              <a:rPr lang="en-GB" b="1" dirty="0" smtClean="0">
+                <a:latin typeface="Menlo"/>
+              </a:rPr>
+              <a:t>] = </a:t>
+            </a:r>
+            <a:r>
+              <a:rPr lang="en-GB" b="1" dirty="0" err="1" smtClean="0">
+                <a:latin typeface="Menlo"/>
+              </a:rPr>
+              <a:t>process_and_validate_cut_inputs</a:t>
+            </a:r>
+            <a:r>
+              <a:rPr lang="en-GB" b="1" dirty="0" smtClean="0">
+                <a:latin typeface="Menlo"/>
+              </a:rPr>
+              <a:t>(</a:t>
+            </a:r>
+            <a:r>
+              <a:rPr lang="en-GB" b="1" dirty="0" err="1" smtClean="0">
+                <a:latin typeface="Menlo"/>
+              </a:rPr>
+              <a:t>source_sqw,binning_inputs</a:t>
+            </a:r>
+            <a:r>
+              <a:rPr lang="en-GB" b="1" dirty="0" smtClean="0">
+                <a:latin typeface="Menlo"/>
+              </a:rPr>
+              <a:t>)</a:t>
+            </a:r>
+            <a:endParaRPr lang="en-GB" b="1" dirty="0">
+              <a:latin typeface="Menlo"/>
+            </a:endParaRPr>
+          </a:p>
+        </p:txBody>
+      </p:sp>
+      <p:sp>
+        <p:nvSpPr>
+          <p:cNvPr id="5" name="Rectangle 4"/>
+          <p:cNvSpPr/>
+          <p:nvPr/>
+        </p:nvSpPr>
+        <p:spPr>
+          <a:xfrm>
+            <a:off x="838200" y="1469186"/>
+            <a:ext cx="11676742" cy="4801314"/>
+          </a:xfrm>
+          <a:prstGeom prst="rect">
+            <a:avLst/>
+          </a:prstGeom>
+        </p:spPr>
+        <p:txBody>
+          <a:bodyPr wrap="square">
+            <a:spAutoFit/>
+          </a:bodyPr>
+          <a:lstStyle/>
+          <a:p>
+            <a:r>
+              <a:rPr lang="en-GB" b="1" dirty="0" err="1" smtClean="0">
+                <a:latin typeface="Menlo"/>
+              </a:rPr>
+              <a:t>targ_ax_block</a:t>
+            </a:r>
+            <a:r>
+              <a:rPr lang="en-GB" b="1" dirty="0" smtClean="0">
+                <a:latin typeface="Menlo"/>
+              </a:rPr>
+              <a:t> </a:t>
+            </a:r>
+            <a:r>
+              <a:rPr lang="en-GB" b="1" dirty="0">
+                <a:latin typeface="Menlo"/>
+              </a:rPr>
+              <a:t>= </a:t>
+            </a:r>
+            <a:r>
+              <a:rPr lang="en-GB" b="1" dirty="0" err="1" smtClean="0">
+                <a:latin typeface="Menlo"/>
+              </a:rPr>
+              <a:t>targ_proj.</a:t>
+            </a:r>
+            <a:r>
+              <a:rPr lang="en-GB" b="1" dirty="0" err="1" smtClean="0">
+                <a:solidFill>
+                  <a:srgbClr val="00B050"/>
+                </a:solidFill>
+                <a:latin typeface="Menlo"/>
+              </a:rPr>
+              <a:t>get_proj_axes_block</a:t>
+            </a:r>
+            <a:r>
+              <a:rPr lang="en-GB" b="1" dirty="0">
+                <a:latin typeface="Menlo"/>
+              </a:rPr>
+              <a:t>(</a:t>
+            </a:r>
+            <a:r>
+              <a:rPr lang="en-GB" b="1" dirty="0" err="1" smtClean="0">
+                <a:latin typeface="Menlo"/>
+              </a:rPr>
+              <a:t>targ_binning</a:t>
+            </a:r>
+            <a:r>
+              <a:rPr lang="en-GB" b="1" dirty="0" smtClean="0">
+                <a:latin typeface="Menlo"/>
+              </a:rPr>
+              <a:t>);</a:t>
+            </a:r>
+          </a:p>
+          <a:p>
+            <a:r>
+              <a:rPr lang="en-GB" b="1" dirty="0" smtClean="0">
+                <a:solidFill>
+                  <a:srgbClr val="028009"/>
+                </a:solidFill>
+                <a:latin typeface="Menlo"/>
+              </a:rPr>
+              <a:t>%</a:t>
+            </a:r>
+          </a:p>
+          <a:p>
+            <a:r>
+              <a:rPr lang="en-GB" b="1" dirty="0" smtClean="0"/>
+              <a:t>[</a:t>
+            </a:r>
+            <a:r>
+              <a:rPr lang="en-GB" b="1" dirty="0" err="1" smtClean="0"/>
+              <a:t>pix_starts</a:t>
+            </a:r>
+            <a:r>
+              <a:rPr lang="en-GB" b="1" dirty="0"/>
+              <a:t>, </a:t>
+            </a:r>
+            <a:r>
+              <a:rPr lang="en-GB" b="1" dirty="0" err="1"/>
+              <a:t>block_sizes</a:t>
+            </a:r>
+            <a:r>
+              <a:rPr lang="en-GB" b="1" dirty="0"/>
+              <a:t>] = </a:t>
+            </a:r>
+            <a:r>
+              <a:rPr lang="en-GB" b="1" dirty="0" err="1" smtClean="0">
+                <a:latin typeface="Menlo"/>
+              </a:rPr>
+              <a:t>source_proj</a:t>
+            </a:r>
+            <a:r>
+              <a:rPr lang="en-GB" b="1" dirty="0" err="1" smtClean="0"/>
+              <a:t>.</a:t>
+            </a:r>
+            <a:r>
+              <a:rPr lang="en-GB" b="1" dirty="0" err="1" smtClean="0">
+                <a:solidFill>
+                  <a:srgbClr val="0070C0"/>
+                </a:solidFill>
+              </a:rPr>
+              <a:t>get_nrange</a:t>
+            </a:r>
+            <a:r>
+              <a:rPr lang="en-GB" b="1" dirty="0" smtClean="0"/>
+              <a:t>(</a:t>
+            </a:r>
+            <a:r>
+              <a:rPr lang="en-GB" b="1" dirty="0" err="1" smtClean="0"/>
+              <a:t>npix,source_axes,targ_axes,targ_proj</a:t>
+            </a:r>
+            <a:r>
+              <a:rPr lang="en-GB" b="1" dirty="0" smtClean="0"/>
+              <a:t>);</a:t>
+            </a:r>
+            <a:endParaRPr lang="en-GB" b="1" dirty="0"/>
+          </a:p>
+          <a:p>
+            <a:endParaRPr lang="en-GB" b="1" dirty="0" smtClean="0">
+              <a:latin typeface="Menlo"/>
+            </a:endParaRPr>
+          </a:p>
+          <a:p>
+            <a:r>
+              <a:rPr lang="en-GB" b="1" dirty="0" smtClean="0"/>
+              <a:t>                         </a:t>
+            </a:r>
+            <a:r>
+              <a:rPr lang="en-GB" b="1" dirty="0" err="1" smtClean="0"/>
+              <a:t>ch_cube</a:t>
+            </a:r>
+            <a:r>
+              <a:rPr lang="en-GB" b="1" dirty="0" smtClean="0"/>
+              <a:t> </a:t>
+            </a:r>
+            <a:r>
+              <a:rPr lang="en-GB" b="1" dirty="0"/>
+              <a:t>= </a:t>
+            </a:r>
+            <a:r>
+              <a:rPr lang="en-GB" b="1" dirty="0" err="1"/>
+              <a:t>cur_axes_block.</a:t>
+            </a:r>
+            <a:r>
+              <a:rPr lang="en-GB" b="1" dirty="0" err="1">
+                <a:solidFill>
+                  <a:srgbClr val="00B050"/>
+                </a:solidFill>
+              </a:rPr>
+              <a:t>get_axes_scales</a:t>
+            </a:r>
+            <a:r>
+              <a:rPr lang="en-GB" b="1" dirty="0"/>
+              <a:t>();</a:t>
+            </a:r>
+          </a:p>
+          <a:p>
+            <a:r>
+              <a:rPr lang="en-GB" b="1" dirty="0" smtClean="0"/>
+              <a:t>                         </a:t>
+            </a:r>
+            <a:r>
+              <a:rPr lang="en-GB" b="1" dirty="0" err="1" smtClean="0"/>
+              <a:t>trans_chcube</a:t>
+            </a:r>
+            <a:r>
+              <a:rPr lang="en-GB" b="1" dirty="0" smtClean="0"/>
+              <a:t> </a:t>
+            </a:r>
+            <a:r>
+              <a:rPr lang="en-GB" b="1" dirty="0"/>
+              <a:t>= </a:t>
+            </a:r>
+            <a:r>
+              <a:rPr lang="en-GB" b="1" dirty="0" err="1"/>
+              <a:t>source_proj.</a:t>
+            </a:r>
+            <a:r>
+              <a:rPr lang="en-GB" b="1" dirty="0" err="1">
+                <a:solidFill>
+                  <a:srgbClr val="0070C0"/>
+                </a:solidFill>
+              </a:rPr>
+              <a:t>from_this_to_targ_coord</a:t>
+            </a:r>
+            <a:r>
+              <a:rPr lang="en-GB" b="1" dirty="0"/>
+              <a:t>(</a:t>
+            </a:r>
+            <a:r>
+              <a:rPr lang="en-GB" b="1" dirty="0" err="1"/>
+              <a:t>ch_cube</a:t>
+            </a:r>
+            <a:r>
+              <a:rPr lang="en-GB" b="1" dirty="0" smtClean="0"/>
+              <a:t>)</a:t>
+            </a:r>
+          </a:p>
+          <a:p>
+            <a:r>
+              <a:rPr lang="en-GB" b="1" dirty="0" smtClean="0"/>
+              <a:t>                         </a:t>
+            </a:r>
+            <a:r>
+              <a:rPr lang="en-GB" b="1" dirty="0" err="1" smtClean="0"/>
+              <a:t>bin_nodes</a:t>
+            </a:r>
+            <a:r>
+              <a:rPr lang="en-GB" b="1" dirty="0" smtClean="0"/>
+              <a:t> </a:t>
+            </a:r>
+            <a:r>
+              <a:rPr lang="en-GB" b="1" dirty="0"/>
+              <a:t>= </a:t>
+            </a:r>
+            <a:r>
+              <a:rPr lang="en-GB" b="1" dirty="0" err="1" smtClean="0"/>
+              <a:t>targ_axes_block.</a:t>
+            </a:r>
+            <a:r>
+              <a:rPr lang="en-GB" b="1" dirty="0" err="1" smtClean="0">
+                <a:solidFill>
+                  <a:srgbClr val="0070C0"/>
+                </a:solidFill>
+              </a:rPr>
+              <a:t>get_bin_nodes</a:t>
+            </a:r>
+            <a:r>
+              <a:rPr lang="en-GB" b="1" dirty="0" smtClean="0"/>
+              <a:t>(</a:t>
+            </a:r>
+            <a:r>
+              <a:rPr lang="en-GB" b="1" dirty="0" err="1" smtClean="0"/>
+              <a:t>trans_chcube</a:t>
+            </a:r>
+            <a:r>
+              <a:rPr lang="en-GB" b="1" dirty="0" smtClean="0"/>
+              <a:t>)  </a:t>
+            </a:r>
+            <a:r>
+              <a:rPr lang="en-GB" b="1" dirty="0" smtClean="0">
+                <a:solidFill>
+                  <a:srgbClr val="00B050"/>
+                </a:solidFill>
+              </a:rPr>
+              <a:t>% needs halo</a:t>
+            </a:r>
+          </a:p>
+          <a:p>
+            <a:r>
+              <a:rPr lang="en-GB" b="1" dirty="0" smtClean="0"/>
+              <a:t>                         </a:t>
+            </a:r>
+            <a:r>
+              <a:rPr lang="en-GB" b="1" dirty="0" err="1" smtClean="0"/>
+              <a:t>nodes_here</a:t>
+            </a:r>
+            <a:r>
+              <a:rPr lang="en-GB" b="1" dirty="0" smtClean="0"/>
+              <a:t> </a:t>
+            </a:r>
+            <a:r>
+              <a:rPr lang="en-GB" b="1" dirty="0"/>
+              <a:t>= </a:t>
+            </a:r>
+            <a:r>
+              <a:rPr lang="en-GB" b="1" dirty="0" err="1"/>
+              <a:t>targ_proj.</a:t>
+            </a:r>
+            <a:r>
+              <a:rPr lang="en-GB" b="1" dirty="0" err="1">
+                <a:solidFill>
+                  <a:srgbClr val="0070C0"/>
+                </a:solidFill>
+              </a:rPr>
+              <a:t>from_this_to_targ_coord</a:t>
+            </a:r>
+            <a:r>
+              <a:rPr lang="en-GB" b="1" dirty="0">
+                <a:solidFill>
+                  <a:srgbClr val="0070C0"/>
+                </a:solidFill>
+              </a:rPr>
+              <a:t>(</a:t>
+            </a:r>
+            <a:r>
+              <a:rPr lang="en-GB" b="1" dirty="0" err="1"/>
+              <a:t>bin_nodes</a:t>
+            </a:r>
+            <a:r>
+              <a:rPr lang="en-GB" b="1" dirty="0" smtClean="0"/>
+              <a:t>);</a:t>
+            </a:r>
+            <a:endParaRPr lang="en-GB" b="1" dirty="0"/>
+          </a:p>
+          <a:p>
+            <a:r>
+              <a:rPr lang="en-GB" b="1" dirty="0" smtClean="0"/>
+              <a:t>                         </a:t>
+            </a:r>
+            <a:r>
+              <a:rPr lang="en-GB" b="1" dirty="0" err="1" smtClean="0"/>
+              <a:t>nbin_in_bin</a:t>
+            </a:r>
+            <a:r>
+              <a:rPr lang="en-GB" b="1" dirty="0" smtClean="0"/>
+              <a:t> </a:t>
+            </a:r>
+            <a:r>
+              <a:rPr lang="en-GB" b="1" dirty="0"/>
+              <a:t>= </a:t>
+            </a:r>
+            <a:r>
+              <a:rPr lang="en-GB" b="1" dirty="0" err="1"/>
+              <a:t>cur_axes_block.</a:t>
+            </a:r>
+            <a:r>
+              <a:rPr lang="en-GB" b="1" dirty="0" err="1">
+                <a:solidFill>
+                  <a:srgbClr val="0070C0"/>
+                </a:solidFill>
+              </a:rPr>
+              <a:t>bin_pixels</a:t>
+            </a:r>
+            <a:r>
+              <a:rPr lang="en-GB" b="1" dirty="0"/>
+              <a:t>(</a:t>
+            </a:r>
+            <a:r>
+              <a:rPr lang="en-GB" b="1" dirty="0" err="1"/>
+              <a:t>nodes_here</a:t>
+            </a:r>
+            <a:r>
+              <a:rPr lang="en-GB" b="1" dirty="0"/>
+              <a:t>)</a:t>
+            </a:r>
+          </a:p>
+          <a:p>
+            <a:r>
+              <a:rPr lang="en-GB" b="1" dirty="0" smtClean="0"/>
+              <a:t>                         </a:t>
+            </a:r>
+            <a:r>
+              <a:rPr lang="en-GB" b="1" dirty="0" err="1" smtClean="0"/>
+              <a:t>contrib_ind</a:t>
+            </a:r>
+            <a:r>
+              <a:rPr lang="en-GB" b="1" dirty="0" smtClean="0"/>
+              <a:t> </a:t>
+            </a:r>
+            <a:r>
+              <a:rPr lang="en-GB" b="1" dirty="0"/>
+              <a:t>= find(</a:t>
+            </a:r>
+            <a:r>
+              <a:rPr lang="en-GB" b="1" dirty="0" err="1"/>
+              <a:t>nbin_in_bin</a:t>
+            </a:r>
+            <a:r>
+              <a:rPr lang="en-GB" b="1" dirty="0"/>
+              <a:t>&gt;0</a:t>
+            </a:r>
+            <a:r>
+              <a:rPr lang="en-GB" b="1" dirty="0" smtClean="0"/>
+              <a:t>)</a:t>
+            </a:r>
+          </a:p>
+          <a:p>
+            <a:r>
+              <a:rPr lang="en-GB" dirty="0" smtClean="0"/>
+              <a:t>Find pixel indexes from cell indexes using </a:t>
+            </a:r>
+            <a:r>
+              <a:rPr lang="en-GB" dirty="0" err="1" smtClean="0"/>
+              <a:t>pix</a:t>
+            </a:r>
+            <a:r>
+              <a:rPr lang="en-GB" dirty="0" smtClean="0"/>
+              <a:t> in cell density</a:t>
+            </a:r>
+          </a:p>
+          <a:p>
+            <a:endParaRPr lang="en-GB" b="1" dirty="0" smtClean="0"/>
+          </a:p>
+          <a:p>
+            <a:r>
+              <a:rPr lang="en-GB" b="1" dirty="0" err="1" smtClean="0"/>
+              <a:t>candidate_pix</a:t>
+            </a:r>
+            <a:r>
+              <a:rPr lang="en-GB" b="1" dirty="0" smtClean="0"/>
+              <a:t> </a:t>
+            </a:r>
+            <a:r>
+              <a:rPr lang="en-GB" b="1" dirty="0"/>
+              <a:t>= </a:t>
+            </a:r>
+            <a:r>
+              <a:rPr lang="en-GB" b="1" dirty="0" err="1" smtClean="0"/>
+              <a:t>source_pix.get_pix_in_ranges</a:t>
+            </a:r>
+            <a:r>
+              <a:rPr lang="en-GB" b="1" dirty="0" smtClean="0"/>
+              <a:t>(</a:t>
+            </a:r>
+            <a:r>
+              <a:rPr lang="en-GB" b="1" dirty="0" err="1" smtClean="0"/>
+              <a:t>pix_starts</a:t>
+            </a:r>
+            <a:r>
+              <a:rPr lang="en-GB" b="1" dirty="0" smtClean="0"/>
+              <a:t>, </a:t>
+            </a:r>
+            <a:r>
+              <a:rPr lang="en-GB" b="1" dirty="0" err="1" smtClean="0"/>
+              <a:t>block_sizes</a:t>
+            </a:r>
+            <a:r>
+              <a:rPr lang="en-GB" b="1" dirty="0" smtClean="0"/>
+              <a:t>);</a:t>
+            </a:r>
+          </a:p>
+          <a:p>
+            <a:r>
+              <a:rPr lang="en-GB" b="1" dirty="0" smtClean="0"/>
+              <a:t>[</a:t>
+            </a:r>
+            <a:r>
+              <a:rPr lang="en-GB" b="1" dirty="0" err="1"/>
+              <a:t>npix,s,e,pix_ok,unique_runid</a:t>
+            </a:r>
+            <a:r>
+              <a:rPr lang="en-GB" b="1" dirty="0"/>
+              <a:t>] = </a:t>
+            </a:r>
+            <a:r>
+              <a:rPr lang="en-GB" b="1" dirty="0" err="1" smtClean="0"/>
+              <a:t>targ_proj.</a:t>
+            </a:r>
+            <a:r>
+              <a:rPr lang="en-GB" b="1" dirty="0" err="1" smtClean="0">
+                <a:solidFill>
+                  <a:srgbClr val="0070C0"/>
+                </a:solidFill>
+              </a:rPr>
+              <a:t>bin_pixels</a:t>
+            </a:r>
+            <a:r>
+              <a:rPr lang="en-GB" b="1" dirty="0" smtClean="0"/>
+              <a:t>(</a:t>
+            </a:r>
+            <a:r>
+              <a:rPr lang="en-GB" b="1" dirty="0" err="1" smtClean="0"/>
+              <a:t>targ_axes,candidate_pix</a:t>
+            </a:r>
+            <a:r>
+              <a:rPr lang="en-GB" b="1" dirty="0" smtClean="0"/>
+              <a:t>)</a:t>
+            </a:r>
+            <a:endParaRPr lang="en-GB" b="1" dirty="0"/>
+          </a:p>
+          <a:p>
+            <a:endParaRPr lang="en-GB" b="1" dirty="0"/>
+          </a:p>
+          <a:p>
+            <a:r>
+              <a:rPr lang="en-GB" b="1" dirty="0" smtClean="0">
+                <a:latin typeface="Menlo"/>
+              </a:rPr>
+              <a:t>                </a:t>
+            </a:r>
+            <a:r>
+              <a:rPr lang="en-GB" dirty="0" err="1" smtClean="0">
+                <a:latin typeface="Menlo"/>
+              </a:rPr>
+              <a:t>pix_in_targ_coord_system</a:t>
+            </a:r>
+            <a:r>
+              <a:rPr lang="en-GB" dirty="0" smtClean="0">
+                <a:latin typeface="Menlo"/>
+              </a:rPr>
+              <a:t> </a:t>
+            </a:r>
+            <a:r>
+              <a:rPr lang="en-GB" b="1" dirty="0" smtClean="0">
+                <a:latin typeface="Menlo"/>
+              </a:rPr>
+              <a:t>= </a:t>
+            </a:r>
+            <a:r>
+              <a:rPr lang="en-GB" b="1" dirty="0" err="1" smtClean="0">
+                <a:latin typeface="Menlo"/>
+              </a:rPr>
+              <a:t>targ_proj</a:t>
+            </a:r>
+            <a:r>
+              <a:rPr lang="en-GB" b="1" dirty="0" err="1" smtClean="0">
+                <a:solidFill>
+                  <a:srgbClr val="00B050"/>
+                </a:solidFill>
+                <a:latin typeface="Menlo"/>
+              </a:rPr>
+              <a:t>.from_pix_to_img</a:t>
+            </a:r>
+            <a:r>
+              <a:rPr lang="en-GB" b="1" dirty="0" smtClean="0">
+                <a:latin typeface="Menlo"/>
+              </a:rPr>
+              <a:t>(</a:t>
+            </a:r>
+            <a:r>
+              <a:rPr lang="en-GB" b="1" dirty="0" err="1" smtClean="0"/>
+              <a:t>candidate_pix</a:t>
+            </a:r>
+            <a:r>
+              <a:rPr lang="en-GB" b="1" dirty="0" smtClean="0">
+                <a:latin typeface="Menlo"/>
+              </a:rPr>
+              <a:t>) </a:t>
+            </a:r>
+          </a:p>
+          <a:p>
+            <a:r>
+              <a:rPr lang="en-GB" b="1" dirty="0" smtClean="0">
+                <a:latin typeface="Menlo"/>
+              </a:rPr>
+              <a:t>                </a:t>
+            </a:r>
+            <a:r>
+              <a:rPr lang="en-GB" b="1" dirty="0" smtClean="0"/>
+              <a:t>[</a:t>
+            </a:r>
+            <a:r>
+              <a:rPr lang="en-GB" b="1" dirty="0" err="1" smtClean="0"/>
+              <a:t>npix,s,e,pix_oke_runid</a:t>
+            </a:r>
+            <a:r>
+              <a:rPr lang="en-GB" b="1" dirty="0" smtClean="0"/>
+              <a:t>] = </a:t>
+            </a:r>
+            <a:r>
+              <a:rPr lang="en-GB" b="1" dirty="0" err="1" smtClean="0"/>
+              <a:t>targ_axes_block.</a:t>
+            </a:r>
+            <a:r>
+              <a:rPr lang="en-GB" b="1" dirty="0" err="1" smtClean="0">
+                <a:solidFill>
+                  <a:srgbClr val="0070C0"/>
+                </a:solidFill>
+              </a:rPr>
+              <a:t>bin_pixels</a:t>
+            </a:r>
+            <a:r>
+              <a:rPr lang="en-GB" b="1" dirty="0" smtClean="0"/>
+              <a:t>(</a:t>
+            </a:r>
+            <a:r>
+              <a:rPr lang="en-GB" dirty="0" err="1" smtClean="0">
+                <a:latin typeface="Menlo"/>
+              </a:rPr>
+              <a:t>pix_in_targ_coord_system</a:t>
+            </a:r>
+            <a:r>
+              <a:rPr lang="ru-RU" dirty="0" smtClean="0">
+                <a:latin typeface="Menlo"/>
+              </a:rPr>
+              <a:t>)</a:t>
+            </a:r>
+            <a:endParaRPr lang="en-GB" b="1" dirty="0">
+              <a:latin typeface="Menlo"/>
+            </a:endParaRPr>
+          </a:p>
+        </p:txBody>
+      </p:sp>
+      <p:sp>
+        <p:nvSpPr>
+          <p:cNvPr id="7" name="Right Brace 6"/>
+          <p:cNvSpPr/>
+          <p:nvPr/>
+        </p:nvSpPr>
+        <p:spPr>
+          <a:xfrm rot="5400000">
+            <a:off x="5021944" y="-1930406"/>
+            <a:ext cx="413658" cy="8744859"/>
+          </a:xfrm>
+          <a:prstGeom prst="rightBrace">
+            <a:avLst>
+              <a:gd name="adj1" fmla="val 8333"/>
+              <a:gd name="adj2" fmla="val 49616"/>
+            </a:avLst>
+          </a:prstGeom>
+        </p:spPr>
+        <p:style>
+          <a:lnRef idx="1">
+            <a:schemeClr val="accent1"/>
+          </a:lnRef>
+          <a:fillRef idx="0">
+            <a:schemeClr val="accent1"/>
+          </a:fillRef>
+          <a:effectRef idx="0">
+            <a:schemeClr val="accent1"/>
+          </a:effectRef>
+          <a:fontRef idx="minor">
+            <a:schemeClr val="tx1"/>
+          </a:fontRef>
+        </p:style>
+        <p:txBody>
+          <a:bodyPr rtlCol="0" anchor="ctr"/>
+          <a:lstStyle/>
+          <a:p>
+            <a:pPr algn="ctr"/>
+            <a:endParaRPr lang="en-GB"/>
+          </a:p>
+        </p:txBody>
+      </p:sp>
+      <p:sp>
+        <p:nvSpPr>
+          <p:cNvPr id="8" name="Right Brace 7"/>
+          <p:cNvSpPr/>
+          <p:nvPr/>
+        </p:nvSpPr>
+        <p:spPr>
+          <a:xfrm rot="5400000">
+            <a:off x="4394188" y="1600190"/>
+            <a:ext cx="449965" cy="7525658"/>
+          </a:xfrm>
+          <a:prstGeom prst="rightBrace">
+            <a:avLst>
+              <a:gd name="adj1" fmla="val 8333"/>
+              <a:gd name="adj2" fmla="val 49616"/>
+            </a:avLst>
+          </a:prstGeom>
+        </p:spPr>
+        <p:style>
+          <a:lnRef idx="1">
+            <a:schemeClr val="accent1"/>
+          </a:lnRef>
+          <a:fillRef idx="0">
+            <a:schemeClr val="accent1"/>
+          </a:fillRef>
+          <a:effectRef idx="0">
+            <a:schemeClr val="accent1"/>
+          </a:effectRef>
+          <a:fontRef idx="minor">
+            <a:schemeClr val="tx1"/>
+          </a:fontRef>
+        </p:style>
+        <p:txBody>
+          <a:bodyPr rtlCol="0" anchor="ctr"/>
+          <a:lstStyle/>
+          <a:p>
+            <a:pPr algn="ctr"/>
+            <a:endParaRPr lang="en-GB"/>
           </a:p>
         </p:txBody>
       </p:sp>
     </p:spTree>
     <p:extLst>
       <p:ext uri="{BB962C8B-B14F-4D97-AF65-F5344CB8AC3E}">
-        <p14:creationId xmlns:p14="http://schemas.microsoft.com/office/powerpoint/2010/main" val="3356624891"/>
+        <p14:creationId xmlns:p14="http://schemas.microsoft.com/office/powerpoint/2010/main" val="1352675182"/>
       </p:ext>
     </p:extLst>
   </p:cSld>
@@ -3261,6 +3939,139 @@
             <p:ph type="title"/>
           </p:nvPr>
         </p:nvSpPr>
+        <p:spPr/>
+        <p:txBody>
+          <a:bodyPr/>
+          <a:lstStyle/>
+          <a:p>
+            <a:r>
+              <a:rPr lang="en-GB" dirty="0" smtClean="0"/>
+              <a:t>DND object Cut Algorithm: Forthcoming</a:t>
+            </a:r>
+            <a:endParaRPr lang="en-GB" dirty="0"/>
+          </a:p>
+        </p:txBody>
+      </p:sp>
+      <p:sp>
+        <p:nvSpPr>
+          <p:cNvPr id="3" name="TextBox 2"/>
+          <p:cNvSpPr txBox="1"/>
+          <p:nvPr/>
+        </p:nvSpPr>
+        <p:spPr>
+          <a:xfrm>
+            <a:off x="838199" y="1915886"/>
+            <a:ext cx="9546771" cy="3539430"/>
+          </a:xfrm>
+          <a:prstGeom prst="rect">
+            <a:avLst/>
+          </a:prstGeom>
+          <a:noFill/>
+        </p:spPr>
+        <p:txBody>
+          <a:bodyPr wrap="square" rtlCol="0">
+            <a:spAutoFit/>
+          </a:bodyPr>
+          <a:lstStyle/>
+          <a:p>
+            <a:r>
+              <a:rPr lang="en-GB" sz="2800" dirty="0" smtClean="0"/>
+              <a:t>Convert to density; </a:t>
+            </a:r>
+          </a:p>
+          <a:p>
+            <a:endParaRPr lang="en-GB" sz="2800" dirty="0" smtClean="0"/>
+          </a:p>
+          <a:p>
+            <a:r>
+              <a:rPr lang="en-GB" sz="2800" dirty="0" smtClean="0"/>
+              <a:t>Interpolate density in the centres of new grid;</a:t>
+            </a:r>
+          </a:p>
+          <a:p>
+            <a:endParaRPr lang="en-GB" sz="2800" dirty="0" smtClean="0"/>
+          </a:p>
+          <a:p>
+            <a:r>
+              <a:rPr lang="en-GB" sz="2800" dirty="0" smtClean="0"/>
+              <a:t>convert to signal/error/</a:t>
+            </a:r>
+            <a:r>
+              <a:rPr lang="en-GB" sz="2800" dirty="0" err="1" smtClean="0"/>
+              <a:t>npix</a:t>
+            </a:r>
+            <a:r>
+              <a:rPr lang="en-GB" sz="2800" dirty="0" smtClean="0"/>
+              <a:t> on new grid, rebalance </a:t>
+            </a:r>
+            <a:r>
+              <a:rPr lang="en-GB" sz="2800" dirty="0" err="1" smtClean="0"/>
+              <a:t>npix</a:t>
+            </a:r>
+            <a:r>
+              <a:rPr lang="en-GB" sz="2800" dirty="0" smtClean="0"/>
+              <a:t> to be even;</a:t>
+            </a:r>
+          </a:p>
+          <a:p>
+            <a:endParaRPr lang="en-GB" sz="2800" dirty="0" smtClean="0"/>
+          </a:p>
+          <a:p>
+            <a:r>
+              <a:rPr lang="en-GB" sz="2800" dirty="0" smtClean="0"/>
+              <a:t>Sum (integrate) over collapsed dimensions, if this is necessary;</a:t>
+            </a:r>
+            <a:endParaRPr lang="en-GB" sz="2800" dirty="0"/>
+          </a:p>
+        </p:txBody>
+      </p:sp>
+    </p:spTree>
+    <p:extLst>
+      <p:ext uri="{BB962C8B-B14F-4D97-AF65-F5344CB8AC3E}">
+        <p14:creationId xmlns:p14="http://schemas.microsoft.com/office/powerpoint/2010/main" val="3356624891"/>
+      </p:ext>
+    </p:extLst>
+  </p:cSld>
+  <p:clrMapOvr>
+    <a:masterClrMapping/>
+  </p:clrMapOvr>
+  <p:timing>
+    <p:tnLst>
+      <p:par>
+        <p:cTn id="1" dur="indefinite" restart="never" nodeType="tmRoot"/>
+      </p:par>
+    </p:tnLst>
+  </p:timing>
+</p:sld>
+</file>
+
+<file path=ppt/slides/slide12.xml><?xml version="1.0" encoding="utf-8"?>
+<p:sld xmlns:a="http://schemas.openxmlformats.org/drawingml/2006/main" xmlns:r="http://schemas.openxmlformats.org/officeDocument/2006/relationships" xmlns:p="http://schemas.openxmlformats.org/presentationml/2006/main">
+  <p:cSld>
+    <p:spTree>
+      <p:nvGrpSpPr>
+        <p:cNvPr id="1" name=""/>
+        <p:cNvGrpSpPr/>
+        <p:nvPr/>
+      </p:nvGrpSpPr>
+      <p:grpSpPr>
+        <a:xfrm>
+          <a:off x="0" y="0"/>
+          <a:ext cx="0" cy="0"/>
+          <a:chOff x="0" y="0"/>
+          <a:chExt cx="0" cy="0"/>
+        </a:xfrm>
+      </p:grpSpPr>
+      <p:sp>
+        <p:nvSpPr>
+          <p:cNvPr id="2" name="Title 1"/>
+          <p:cNvSpPr>
+            <a:spLocks noGrp="1"/>
+          </p:cNvSpPr>
+          <p:nvPr>
+            <p:ph type="title"/>
+          </p:nvPr>
+        </p:nvSpPr>
         <p:spPr>
           <a:xfrm>
             <a:off x="729342" y="195717"/>
@@ -3628,7 +4439,7 @@
 </p:sld>
 </file>
 
-<file path=ppt/slides/slide12.xml><?xml version="1.0" encoding="utf-8"?>
+<file path=ppt/slides/slide13.xml><?xml version="1.0" encoding="utf-8"?>
 <p:sld xmlns:a="http://schemas.openxmlformats.org/drawingml/2006/main" xmlns:r="http://schemas.openxmlformats.org/officeDocument/2006/relationships" xmlns:p="http://schemas.openxmlformats.org/presentationml/2006/main">
   <p:cSld>
     <p:spTree>
@@ -5081,578 +5892,6 @@
           <a:chExt cx="0" cy="0"/>
         </a:xfrm>
       </p:grpSpPr>
-      <p:sp>
-        <p:nvSpPr>
-          <p:cNvPr id="2" name="Title 1"/>
-          <p:cNvSpPr>
-            <a:spLocks noGrp="1"/>
-          </p:cNvSpPr>
-          <p:nvPr>
-            <p:ph type="title"/>
-          </p:nvPr>
-        </p:nvSpPr>
-        <p:spPr>
-          <a:xfrm>
-            <a:off x="838200" y="365125"/>
-            <a:ext cx="10515600" cy="895725"/>
-          </a:xfrm>
-        </p:spPr>
-        <p:txBody>
-          <a:bodyPr/>
-          <a:lstStyle/>
-          <a:p>
-            <a:r>
-              <a:rPr lang="en-GB" dirty="0" smtClean="0"/>
-              <a:t>Main Horace’ objects interfaces:</a:t>
-            </a:r>
-            <a:endParaRPr lang="en-GB" dirty="0"/>
-          </a:p>
-        </p:txBody>
-      </p:sp>
-      <p:pic>
-        <p:nvPicPr>
-          <p:cNvPr id="3" name="Picture 2"/>
-          <p:cNvPicPr>
-            <a:picLocks noChangeAspect="1"/>
-          </p:cNvPicPr>
-          <p:nvPr/>
-        </p:nvPicPr>
-        <p:blipFill>
-          <a:blip r:embed="rId2">
-            <a:extLst>
-              <a:ext uri="{28A0092B-C50C-407E-A947-70E740481C1C}">
-                <a14:useLocalDpi xmlns:a14="http://schemas.microsoft.com/office/drawing/2010/main" val="0"/>
-              </a:ext>
-            </a:extLst>
-          </a:blip>
-          <a:stretch>
-            <a:fillRect/>
-          </a:stretch>
-        </p:blipFill>
-        <p:spPr>
-          <a:xfrm>
-            <a:off x="838200" y="1590675"/>
-            <a:ext cx="8950968" cy="4922420"/>
-          </a:xfrm>
-          <a:prstGeom prst="rect">
-            <a:avLst/>
-          </a:prstGeom>
-        </p:spPr>
-      </p:pic>
-    </p:spTree>
-    <p:extLst>
-      <p:ext uri="{BB962C8B-B14F-4D97-AF65-F5344CB8AC3E}">
-        <p14:creationId xmlns:p14="http://schemas.microsoft.com/office/powerpoint/2010/main" val="3660381104"/>
-      </p:ext>
-    </p:extLst>
-  </p:cSld>
-  <p:clrMapOvr>
-    <a:masterClrMapping/>
-  </p:clrMapOvr>
-  <p:timing>
-    <p:tnLst>
-      <p:par>
-        <p:cTn id="1" dur="indefinite" restart="never" nodeType="tmRoot"/>
-      </p:par>
-    </p:tnLst>
-  </p:timing>
-</p:sld>
-</file>
-
-<file path=ppt/slides/slide6.xml><?xml version="1.0" encoding="utf-8"?>
-<p:sld xmlns:a="http://schemas.openxmlformats.org/drawingml/2006/main" xmlns:r="http://schemas.openxmlformats.org/officeDocument/2006/relationships" xmlns:p="http://schemas.openxmlformats.org/presentationml/2006/main">
-  <p:cSld>
-    <p:spTree>
-      <p:nvGrpSpPr>
-        <p:cNvPr id="1" name=""/>
-        <p:cNvGrpSpPr/>
-        <p:nvPr/>
-      </p:nvGrpSpPr>
-      <p:grpSpPr>
-        <a:xfrm>
-          <a:off x="0" y="0"/>
-          <a:ext cx="0" cy="0"/>
-          <a:chOff x="0" y="0"/>
-          <a:chExt cx="0" cy="0"/>
-        </a:xfrm>
-      </p:grpSpPr>
-      <p:sp>
-        <p:nvSpPr>
-          <p:cNvPr id="2" name="Title 1"/>
-          <p:cNvSpPr>
-            <a:spLocks noGrp="1"/>
-          </p:cNvSpPr>
-          <p:nvPr>
-            <p:ph type="title"/>
-          </p:nvPr>
-        </p:nvSpPr>
-        <p:spPr/>
-        <p:txBody>
-          <a:bodyPr/>
-          <a:lstStyle/>
-          <a:p>
-            <a:r>
-              <a:rPr lang="en-GB" dirty="0" smtClean="0"/>
-              <a:t>New design main features:</a:t>
-            </a:r>
-            <a:endParaRPr lang="en-GB" dirty="0"/>
-          </a:p>
-        </p:txBody>
-      </p:sp>
-      <p:sp>
-        <p:nvSpPr>
-          <p:cNvPr id="3" name="Content Placeholder 2"/>
-          <p:cNvSpPr>
-            <a:spLocks noGrp="1"/>
-          </p:cNvSpPr>
-          <p:nvPr>
-            <p:ph idx="1"/>
-          </p:nvPr>
-        </p:nvSpPr>
-        <p:spPr/>
-        <p:txBody>
-          <a:bodyPr>
-            <a:normAutofit fontScale="92500"/>
-          </a:bodyPr>
-          <a:lstStyle/>
-          <a:p>
-            <a:r>
-              <a:rPr lang="en-GB" dirty="0" err="1" smtClean="0"/>
-              <a:t>DnD</a:t>
-            </a:r>
-            <a:r>
-              <a:rPr lang="en-GB" dirty="0" smtClean="0"/>
-              <a:t> object is serializable and valid on assignment (</a:t>
-            </a:r>
-            <a:r>
-              <a:rPr lang="en-GB" sz="1800" dirty="0" smtClean="0"/>
-              <a:t>a lot of time to fix existing tests</a:t>
-            </a:r>
-            <a:r>
-              <a:rPr lang="en-GB" dirty="0" smtClean="0"/>
-              <a:t>)</a:t>
-            </a:r>
-          </a:p>
-          <a:p>
-            <a:r>
-              <a:rPr lang="en-GB" dirty="0" smtClean="0"/>
-              <a:t>Standard form of object constructor </a:t>
-            </a:r>
-            <a:r>
-              <a:rPr lang="en-GB" sz="2000" dirty="0" smtClean="0"/>
-              <a:t>(properties </a:t>
-            </a:r>
-            <a:r>
-              <a:rPr lang="en-GB" sz="2000" dirty="0"/>
-              <a:t>names </a:t>
-            </a:r>
-            <a:r>
-              <a:rPr lang="en-GB" sz="2000" dirty="0" smtClean="0"/>
-              <a:t>with their values or properties values itself located from the beginning in the order, defined in </a:t>
-            </a:r>
-            <a:r>
-              <a:rPr lang="en-GB" sz="2000" b="1" dirty="0" err="1" smtClean="0"/>
-              <a:t>savebleProperties</a:t>
-            </a:r>
-            <a:r>
-              <a:rPr lang="en-GB" sz="2000" dirty="0" smtClean="0"/>
-              <a:t> method)</a:t>
-            </a:r>
-            <a:endParaRPr lang="en-GB" dirty="0" smtClean="0"/>
-          </a:p>
-          <a:p>
-            <a:r>
-              <a:rPr lang="en-GB" dirty="0" smtClean="0"/>
-              <a:t>Separation between image methods and pixel methods </a:t>
-            </a:r>
-            <a:r>
-              <a:rPr lang="en-GB" sz="1800" dirty="0" smtClean="0"/>
-              <a:t>(mind method location e.g. </a:t>
-            </a:r>
-            <a:r>
-              <a:rPr lang="en-GB" sz="1800" dirty="0" err="1" smtClean="0"/>
-              <a:t>mask_pixels</a:t>
-            </a:r>
-            <a:r>
-              <a:rPr lang="en-GB" sz="1800" dirty="0" smtClean="0"/>
-              <a:t>)</a:t>
-            </a:r>
-          </a:p>
-          <a:p>
-            <a:pPr marL="0" indent="0">
-              <a:buNone/>
-            </a:pPr>
-            <a:r>
-              <a:rPr lang="en-GB" sz="2200" dirty="0"/>
-              <a:t> </a:t>
-            </a:r>
-            <a:r>
-              <a:rPr lang="en-GB" sz="2200" dirty="0" smtClean="0"/>
-              <a:t>    </a:t>
-            </a:r>
-            <a:r>
-              <a:rPr lang="en-GB" sz="1700" dirty="0" smtClean="0"/>
-              <a:t>EG: head:</a:t>
-            </a:r>
-          </a:p>
-          <a:p>
-            <a:endParaRPr lang="en-GB" dirty="0" smtClean="0"/>
-          </a:p>
-          <a:p>
-            <a:pPr marL="0" indent="0">
-              <a:buNone/>
-            </a:pPr>
-            <a:r>
-              <a:rPr lang="en-GB" sz="1900" dirty="0" smtClean="0"/>
-              <a:t>    </a:t>
-            </a:r>
-            <a:r>
-              <a:rPr lang="en-GB" sz="1500" dirty="0" smtClean="0"/>
-              <a:t>EG</a:t>
-            </a:r>
-            <a:r>
-              <a:rPr lang="en-GB" sz="1500" dirty="0"/>
-              <a:t>: </a:t>
-            </a:r>
-            <a:r>
-              <a:rPr lang="en-GB" sz="1500" dirty="0" err="1" smtClean="0"/>
-              <a:t>mask_pixels</a:t>
-            </a:r>
-            <a:r>
-              <a:rPr lang="en-GB" sz="1500" dirty="0" smtClean="0"/>
-              <a:t> -&gt; </a:t>
-            </a:r>
-            <a:r>
-              <a:rPr lang="en-GB" sz="1500" dirty="0" err="1" smtClean="0"/>
-              <a:t>sqw</a:t>
-            </a:r>
-            <a:r>
-              <a:rPr lang="en-GB" sz="1500" dirty="0" smtClean="0"/>
-              <a:t> only:</a:t>
-            </a:r>
-          </a:p>
-          <a:p>
-            <a:endParaRPr lang="en-GB" dirty="0"/>
-          </a:p>
-          <a:p>
-            <a:r>
-              <a:rPr lang="en-GB" dirty="0" smtClean="0"/>
-              <a:t>Prohibit file based constructors (</a:t>
-            </a:r>
-            <a:r>
-              <a:rPr lang="en-GB" sz="1800" dirty="0" smtClean="0"/>
-              <a:t>you mast read object – file IO is always much slower</a:t>
-            </a:r>
-            <a:r>
-              <a:rPr lang="en-GB" dirty="0" smtClean="0"/>
-              <a:t>)?</a:t>
-            </a:r>
-            <a:endParaRPr lang="en-GB" dirty="0"/>
-          </a:p>
-        </p:txBody>
-      </p:sp>
-      <p:sp>
-        <p:nvSpPr>
-          <p:cNvPr id="4" name="Rectangle 3"/>
-          <p:cNvSpPr/>
-          <p:nvPr/>
-        </p:nvSpPr>
-        <p:spPr>
-          <a:xfrm>
-            <a:off x="1257300" y="4119551"/>
-            <a:ext cx="1571625" cy="471486"/>
-          </a:xfrm>
-          <a:prstGeom prst="rect">
-            <a:avLst/>
-          </a:prstGeom>
-        </p:spPr>
-        <p:style>
-          <a:lnRef idx="2">
-            <a:schemeClr val="accent1">
-              <a:shade val="50000"/>
-            </a:schemeClr>
-          </a:lnRef>
-          <a:fillRef idx="1">
-            <a:schemeClr val="accent1"/>
-          </a:fillRef>
-          <a:effectRef idx="0">
-            <a:schemeClr val="accent1"/>
-          </a:effectRef>
-          <a:fontRef idx="minor">
-            <a:schemeClr val="lt1"/>
-          </a:fontRef>
-        </p:style>
-        <p:txBody>
-          <a:bodyPr rtlCol="0" anchor="ctr"/>
-          <a:lstStyle/>
-          <a:p>
-            <a:pPr algn="ctr"/>
-            <a:r>
-              <a:rPr lang="en-GB" dirty="0" smtClean="0"/>
-              <a:t>head (on </a:t>
-            </a:r>
-            <a:r>
-              <a:rPr lang="en-GB" dirty="0" err="1" smtClean="0"/>
-              <a:t>dnd</a:t>
-            </a:r>
-            <a:r>
-              <a:rPr lang="en-GB" dirty="0"/>
-              <a:t>)</a:t>
-            </a:r>
-            <a:endParaRPr lang="en-GB" dirty="0" smtClean="0"/>
-          </a:p>
-          <a:p>
-            <a:pPr algn="ctr"/>
-            <a:r>
-              <a:rPr lang="en-GB" dirty="0" smtClean="0"/>
-              <a:t>(head </a:t>
-            </a:r>
-            <a:r>
-              <a:rPr lang="en-GB" dirty="0" err="1" smtClean="0"/>
-              <a:t>dnd</a:t>
-            </a:r>
-            <a:r>
-              <a:rPr lang="en-GB" dirty="0"/>
-              <a:t>)</a:t>
-            </a:r>
-          </a:p>
-        </p:txBody>
-      </p:sp>
-      <p:sp>
-        <p:nvSpPr>
-          <p:cNvPr id="5" name="Rectangle 4"/>
-          <p:cNvSpPr/>
-          <p:nvPr/>
-        </p:nvSpPr>
-        <p:spPr>
-          <a:xfrm>
-            <a:off x="3352800" y="4119547"/>
-            <a:ext cx="2371717" cy="471486"/>
-          </a:xfrm>
-          <a:prstGeom prst="rect">
-            <a:avLst/>
-          </a:prstGeom>
-        </p:spPr>
-        <p:style>
-          <a:lnRef idx="2">
-            <a:schemeClr val="accent1">
-              <a:shade val="50000"/>
-            </a:schemeClr>
-          </a:lnRef>
-          <a:fillRef idx="1">
-            <a:schemeClr val="accent1"/>
-          </a:fillRef>
-          <a:effectRef idx="0">
-            <a:schemeClr val="accent1"/>
-          </a:effectRef>
-          <a:fontRef idx="minor">
-            <a:schemeClr val="lt1"/>
-          </a:fontRef>
-        </p:style>
-        <p:txBody>
-          <a:bodyPr rtlCol="0" anchor="ctr"/>
-          <a:lstStyle/>
-          <a:p>
-            <a:pPr algn="ctr"/>
-            <a:r>
-              <a:rPr lang="en-GB" dirty="0" smtClean="0"/>
-              <a:t>head  (on </a:t>
-            </a:r>
-            <a:r>
-              <a:rPr lang="en-GB" dirty="0" err="1" smtClean="0"/>
-              <a:t>sqw</a:t>
-            </a:r>
-            <a:r>
-              <a:rPr lang="en-GB" dirty="0" smtClean="0"/>
-              <a:t>)</a:t>
-            </a:r>
-          </a:p>
-          <a:p>
-            <a:pPr algn="ctr"/>
-            <a:r>
-              <a:rPr lang="en-GB" dirty="0" smtClean="0"/>
-              <a:t>(head </a:t>
-            </a:r>
-            <a:r>
-              <a:rPr lang="en-GB" dirty="0" err="1" smtClean="0"/>
-              <a:t>dnd</a:t>
-            </a:r>
-            <a:r>
-              <a:rPr lang="en-GB" dirty="0" smtClean="0"/>
-              <a:t> + </a:t>
-            </a:r>
-            <a:r>
-              <a:rPr lang="en-GB" dirty="0" err="1" smtClean="0"/>
-              <a:t>pix</a:t>
-            </a:r>
-            <a:r>
-              <a:rPr lang="en-GB" dirty="0" smtClean="0"/>
-              <a:t> part)</a:t>
-            </a:r>
-            <a:endParaRPr lang="en-GB" dirty="0"/>
-          </a:p>
-        </p:txBody>
-      </p:sp>
-      <p:sp>
-        <p:nvSpPr>
-          <p:cNvPr id="6" name="Rectangle 5"/>
-          <p:cNvSpPr/>
-          <p:nvPr/>
-        </p:nvSpPr>
-        <p:spPr>
-          <a:xfrm>
-            <a:off x="6324602" y="4114782"/>
-            <a:ext cx="2371717" cy="471486"/>
-          </a:xfrm>
-          <a:prstGeom prst="rect">
-            <a:avLst/>
-          </a:prstGeom>
-        </p:spPr>
-        <p:style>
-          <a:lnRef idx="2">
-            <a:schemeClr val="accent1">
-              <a:shade val="50000"/>
-            </a:schemeClr>
-          </a:lnRef>
-          <a:fillRef idx="1">
-            <a:schemeClr val="accent1"/>
-          </a:fillRef>
-          <a:effectRef idx="0">
-            <a:schemeClr val="accent1"/>
-          </a:effectRef>
-          <a:fontRef idx="minor">
-            <a:schemeClr val="lt1"/>
-          </a:fontRef>
-        </p:style>
-        <p:txBody>
-          <a:bodyPr rtlCol="0" anchor="ctr"/>
-          <a:lstStyle/>
-          <a:p>
-            <a:pPr algn="ctr"/>
-            <a:r>
-              <a:rPr lang="en-GB" dirty="0" smtClean="0"/>
-              <a:t>head  (on file)</a:t>
-            </a:r>
-          </a:p>
-          <a:p>
-            <a:pPr algn="ctr"/>
-            <a:r>
-              <a:rPr lang="en-GB" dirty="0" smtClean="0"/>
-              <a:t>(file </a:t>
-            </a:r>
-            <a:r>
-              <a:rPr lang="en-GB" dirty="0" err="1" smtClean="0"/>
-              <a:t>acessor</a:t>
-            </a:r>
-            <a:r>
-              <a:rPr lang="en-GB" dirty="0" smtClean="0"/>
-              <a:t> + head)</a:t>
-            </a:r>
-            <a:endParaRPr lang="en-GB" dirty="0"/>
-          </a:p>
-        </p:txBody>
-      </p:sp>
-      <p:cxnSp>
-        <p:nvCxnSpPr>
-          <p:cNvPr id="8" name="Straight Arrow Connector 7"/>
-          <p:cNvCxnSpPr>
-            <a:stCxn id="4" idx="3"/>
-            <a:endCxn id="5" idx="1"/>
-          </p:cNvCxnSpPr>
-          <p:nvPr/>
-        </p:nvCxnSpPr>
-        <p:spPr>
-          <a:xfrm flipV="1">
-            <a:off x="2828925" y="4355290"/>
-            <a:ext cx="523875" cy="4"/>
-          </a:xfrm>
-          <a:prstGeom prst="straightConnector1">
-            <a:avLst/>
-          </a:prstGeom>
-          <a:ln>
-            <a:tailEnd type="triangle"/>
-          </a:ln>
-        </p:spPr>
-        <p:style>
-          <a:lnRef idx="1">
-            <a:schemeClr val="accent1"/>
-          </a:lnRef>
-          <a:fillRef idx="0">
-            <a:schemeClr val="accent1"/>
-          </a:fillRef>
-          <a:effectRef idx="0">
-            <a:schemeClr val="accent1"/>
-          </a:effectRef>
-          <a:fontRef idx="minor">
-            <a:schemeClr val="tx1"/>
-          </a:fontRef>
-        </p:style>
-      </p:cxnSp>
-      <p:cxnSp>
-        <p:nvCxnSpPr>
-          <p:cNvPr id="10" name="Straight Arrow Connector 9"/>
-          <p:cNvCxnSpPr>
-            <a:endCxn id="6" idx="1"/>
-          </p:cNvCxnSpPr>
-          <p:nvPr/>
-        </p:nvCxnSpPr>
-        <p:spPr>
-          <a:xfrm>
-            <a:off x="5762625" y="4350525"/>
-            <a:ext cx="561977" cy="0"/>
-          </a:xfrm>
-          <a:prstGeom prst="straightConnector1">
-            <a:avLst/>
-          </a:prstGeom>
-          <a:ln>
-            <a:tailEnd type="triangle"/>
-          </a:ln>
-        </p:spPr>
-        <p:style>
-          <a:lnRef idx="1">
-            <a:schemeClr val="accent1"/>
-          </a:lnRef>
-          <a:fillRef idx="0">
-            <a:schemeClr val="accent1"/>
-          </a:fillRef>
-          <a:effectRef idx="0">
-            <a:schemeClr val="accent1"/>
-          </a:effectRef>
-          <a:fontRef idx="minor">
-            <a:schemeClr val="tx1"/>
-          </a:fontRef>
-        </p:style>
-      </p:cxnSp>
-    </p:spTree>
-    <p:extLst>
-      <p:ext uri="{BB962C8B-B14F-4D97-AF65-F5344CB8AC3E}">
-        <p14:creationId xmlns:p14="http://schemas.microsoft.com/office/powerpoint/2010/main" val="4002919976"/>
-      </p:ext>
-    </p:extLst>
-  </p:cSld>
-  <p:clrMapOvr>
-    <a:masterClrMapping/>
-  </p:clrMapOvr>
-</p:sld>
-</file>
-
-<file path=ppt/slides/slide7.xml><?xml version="1.0" encoding="utf-8"?>
-<p:sld xmlns:a="http://schemas.openxmlformats.org/drawingml/2006/main" xmlns:r="http://schemas.openxmlformats.org/officeDocument/2006/relationships" xmlns:p="http://schemas.openxmlformats.org/presentationml/2006/main">
-  <p:cSld>
-    <p:spTree>
-      <p:nvGrpSpPr>
-        <p:cNvPr id="1" name=""/>
-        <p:cNvGrpSpPr/>
-        <p:nvPr/>
-      </p:nvGrpSpPr>
-      <p:grpSpPr>
-        <a:xfrm>
-          <a:off x="0" y="0"/>
-          <a:ext cx="0" cy="0"/>
-          <a:chOff x="0" y="0"/>
-          <a:chExt cx="0" cy="0"/>
-        </a:xfrm>
-      </p:grpSpPr>
       <p:pic>
         <p:nvPicPr>
           <p:cNvPr id="3" name="Picture 2"/>
@@ -5931,7 +6170,7 @@
 </p:sld>
 </file>
 
-<file path=ppt/slides/slide8.xml><?xml version="1.0" encoding="utf-8"?>
+<file path=ppt/slides/slide6.xml><?xml version="1.0" encoding="utf-8"?>
 <p:sld xmlns:a="http://schemas.openxmlformats.org/drawingml/2006/main" xmlns:r="http://schemas.openxmlformats.org/officeDocument/2006/relationships" xmlns:p="http://schemas.openxmlformats.org/presentationml/2006/main">
   <p:cSld>
     <p:spTree>
@@ -5958,14 +6197,19 @@
             <p:ph type="title"/>
           </p:nvPr>
         </p:nvSpPr>
-        <p:spPr/>
+        <p:spPr>
+          <a:xfrm>
+            <a:off x="838200" y="365125"/>
+            <a:ext cx="10515600" cy="895725"/>
+          </a:xfrm>
+        </p:spPr>
         <p:txBody>
           <a:bodyPr/>
           <a:lstStyle/>
           <a:p>
             <a:r>
               <a:rPr lang="en-GB" dirty="0" smtClean="0"/>
-              <a:t>SQW object Cut Algorithm. Principles</a:t>
+              <a:t>Main Horace’ objects interfaces:</a:t>
             </a:r>
             <a:endParaRPr lang="en-GB" dirty="0"/>
           </a:p>
@@ -5973,48 +6217,500 @@
       </p:sp>
       <p:pic>
         <p:nvPicPr>
-          <p:cNvPr id="4" name="Content Placeholder 3"/>
+          <p:cNvPr id="3" name="Picture 2"/>
           <p:cNvPicPr>
-            <a:picLocks noGrp="1" noChangeAspect="1"/>
+            <a:picLocks noChangeAspect="1"/>
           </p:cNvPicPr>
-          <p:nvPr>
-            <p:ph idx="1"/>
-          </p:nvPr>
+          <p:nvPr/>
         </p:nvPicPr>
         <p:blipFill>
-          <a:blip r:embed="rId2"/>
+          <a:blip r:embed="rId2">
+            <a:extLst>
+              <a:ext uri="{28A0092B-C50C-407E-A947-70E740481C1C}">
+                <a14:useLocalDpi xmlns:a14="http://schemas.microsoft.com/office/drawing/2010/main" val="0"/>
+              </a:ext>
+            </a:extLst>
+          </a:blip>
           <a:stretch>
             <a:fillRect/>
           </a:stretch>
         </p:blipFill>
         <p:spPr>
           <a:xfrm>
-            <a:off x="1205474" y="1825625"/>
-            <a:ext cx="9781051" cy="4351338"/>
+            <a:off x="838200" y="1590675"/>
+            <a:ext cx="8950968" cy="4922420"/>
           </a:xfrm>
           <a:prstGeom prst="rect">
             <a:avLst/>
           </a:prstGeom>
         </p:spPr>
       </p:pic>
+    </p:spTree>
+    <p:extLst>
+      <p:ext uri="{BB962C8B-B14F-4D97-AF65-F5344CB8AC3E}">
+        <p14:creationId xmlns:p14="http://schemas.microsoft.com/office/powerpoint/2010/main" val="3660381104"/>
+      </p:ext>
+    </p:extLst>
+  </p:cSld>
+  <p:clrMapOvr>
+    <a:masterClrMapping/>
+  </p:clrMapOvr>
+  <p:timing>
+    <p:tnLst>
+      <p:par>
+        <p:cTn id="1" dur="indefinite" restart="never" nodeType="tmRoot"/>
+      </p:par>
+    </p:tnLst>
+  </p:timing>
+</p:sld>
+</file>
+
+<file path=ppt/slides/slide7.xml><?xml version="1.0" encoding="utf-8"?>
+<p:sld xmlns:a="http://schemas.openxmlformats.org/drawingml/2006/main" xmlns:r="http://schemas.openxmlformats.org/officeDocument/2006/relationships" xmlns:p="http://schemas.openxmlformats.org/presentationml/2006/main">
+  <p:cSld>
+    <p:spTree>
+      <p:nvGrpSpPr>
+        <p:cNvPr id="1" name=""/>
+        <p:cNvGrpSpPr/>
+        <p:nvPr/>
+      </p:nvGrpSpPr>
+      <p:grpSpPr>
+        <a:xfrm>
+          <a:off x="0" y="0"/>
+          <a:ext cx="0" cy="0"/>
+          <a:chOff x="0" y="0"/>
+          <a:chExt cx="0" cy="0"/>
+        </a:xfrm>
+      </p:grpSpPr>
+      <p:sp>
+        <p:nvSpPr>
+          <p:cNvPr id="2" name="Title 1"/>
+          <p:cNvSpPr>
+            <a:spLocks noGrp="1"/>
+          </p:cNvSpPr>
+          <p:nvPr>
+            <p:ph type="title"/>
+          </p:nvPr>
+        </p:nvSpPr>
+        <p:spPr/>
+        <p:txBody>
+          <a:bodyPr/>
+          <a:lstStyle/>
+          <a:p>
+            <a:r>
+              <a:rPr lang="en-GB" dirty="0" smtClean="0"/>
+              <a:t>New design main features:</a:t>
+            </a:r>
+            <a:endParaRPr lang="en-GB" dirty="0"/>
+          </a:p>
+        </p:txBody>
+      </p:sp>
+      <p:sp>
+        <p:nvSpPr>
+          <p:cNvPr id="3" name="Content Placeholder 2"/>
+          <p:cNvSpPr>
+            <a:spLocks noGrp="1"/>
+          </p:cNvSpPr>
+          <p:nvPr>
+            <p:ph idx="1"/>
+          </p:nvPr>
+        </p:nvSpPr>
+        <p:spPr/>
+        <p:txBody>
+          <a:bodyPr>
+            <a:normAutofit fontScale="92500"/>
+          </a:bodyPr>
+          <a:lstStyle/>
+          <a:p>
+            <a:r>
+              <a:rPr lang="en-GB" dirty="0" err="1" smtClean="0"/>
+              <a:t>DnD</a:t>
+            </a:r>
+            <a:r>
+              <a:rPr lang="en-GB" dirty="0" smtClean="0"/>
+              <a:t> object is serializable and valid on assignment (</a:t>
+            </a:r>
+            <a:r>
+              <a:rPr lang="en-GB" sz="1800" dirty="0" smtClean="0"/>
+              <a:t>a lot of time to fix existing tests</a:t>
+            </a:r>
+            <a:r>
+              <a:rPr lang="en-GB" dirty="0" smtClean="0"/>
+              <a:t>)</a:t>
+            </a:r>
+          </a:p>
+          <a:p>
+            <a:r>
+              <a:rPr lang="en-GB" dirty="0" smtClean="0"/>
+              <a:t>Standard form of object constructor </a:t>
+            </a:r>
+            <a:r>
+              <a:rPr lang="en-GB" sz="2000" dirty="0" smtClean="0"/>
+              <a:t>(properties </a:t>
+            </a:r>
+            <a:r>
+              <a:rPr lang="en-GB" sz="2000" dirty="0"/>
+              <a:t>names </a:t>
+            </a:r>
+            <a:r>
+              <a:rPr lang="en-GB" sz="2000" dirty="0" smtClean="0"/>
+              <a:t>with their values or properties values itself located from the beginning in the order, defined in </a:t>
+            </a:r>
+            <a:r>
+              <a:rPr lang="en-GB" sz="2000" b="1" dirty="0" err="1" smtClean="0"/>
+              <a:t>savebleProperties</a:t>
+            </a:r>
+            <a:r>
+              <a:rPr lang="en-GB" sz="2000" dirty="0" smtClean="0"/>
+              <a:t> method)</a:t>
+            </a:r>
+            <a:endParaRPr lang="en-GB" dirty="0" smtClean="0"/>
+          </a:p>
+          <a:p>
+            <a:r>
+              <a:rPr lang="en-GB" dirty="0" smtClean="0"/>
+              <a:t>Separation between image methods and pixel methods </a:t>
+            </a:r>
+            <a:r>
+              <a:rPr lang="en-GB" sz="1800" dirty="0" smtClean="0"/>
+              <a:t>(mind method location e.g. </a:t>
+            </a:r>
+            <a:r>
+              <a:rPr lang="en-GB" sz="1800" dirty="0" err="1" smtClean="0"/>
+              <a:t>mask_pixels</a:t>
+            </a:r>
+            <a:r>
+              <a:rPr lang="en-GB" sz="1800" dirty="0" smtClean="0"/>
+              <a:t>)</a:t>
+            </a:r>
+          </a:p>
+          <a:p>
+            <a:pPr marL="0" indent="0">
+              <a:buNone/>
+            </a:pPr>
+            <a:r>
+              <a:rPr lang="en-GB" sz="2200" dirty="0"/>
+              <a:t> </a:t>
+            </a:r>
+            <a:r>
+              <a:rPr lang="en-GB" sz="2200" dirty="0" smtClean="0"/>
+              <a:t>    </a:t>
+            </a:r>
+            <a:r>
+              <a:rPr lang="en-GB" sz="1700" dirty="0" smtClean="0"/>
+              <a:t>EG: head:</a:t>
+            </a:r>
+          </a:p>
+          <a:p>
+            <a:endParaRPr lang="en-GB" dirty="0" smtClean="0"/>
+          </a:p>
+          <a:p>
+            <a:pPr marL="0" indent="0">
+              <a:buNone/>
+            </a:pPr>
+            <a:r>
+              <a:rPr lang="en-GB" sz="1900" dirty="0" smtClean="0"/>
+              <a:t>    </a:t>
+            </a:r>
+            <a:r>
+              <a:rPr lang="en-GB" sz="1500" dirty="0" smtClean="0"/>
+              <a:t>EG</a:t>
+            </a:r>
+            <a:r>
+              <a:rPr lang="en-GB" sz="1500" dirty="0"/>
+              <a:t>: </a:t>
+            </a:r>
+            <a:r>
+              <a:rPr lang="en-GB" sz="1500" dirty="0" err="1" smtClean="0"/>
+              <a:t>mask_pixels</a:t>
+            </a:r>
+            <a:r>
+              <a:rPr lang="en-GB" sz="1500" dirty="0" smtClean="0"/>
+              <a:t> -&gt; </a:t>
+            </a:r>
+            <a:r>
+              <a:rPr lang="en-GB" sz="1500" dirty="0" err="1" smtClean="0"/>
+              <a:t>sqw</a:t>
+            </a:r>
+            <a:r>
+              <a:rPr lang="en-GB" sz="1500" dirty="0" smtClean="0"/>
+              <a:t> only:</a:t>
+            </a:r>
+          </a:p>
+          <a:p>
+            <a:endParaRPr lang="en-GB" dirty="0"/>
+          </a:p>
+          <a:p>
+            <a:r>
+              <a:rPr lang="en-GB" dirty="0" smtClean="0"/>
+              <a:t>Prohibit file based constructors (</a:t>
+            </a:r>
+            <a:r>
+              <a:rPr lang="en-GB" sz="1800" dirty="0" smtClean="0"/>
+              <a:t>you mast read object – file IO is always much slower</a:t>
+            </a:r>
+            <a:r>
+              <a:rPr lang="en-GB" dirty="0" smtClean="0"/>
+              <a:t>)?</a:t>
+            </a:r>
+            <a:endParaRPr lang="en-GB" dirty="0"/>
+          </a:p>
+        </p:txBody>
+      </p:sp>
+      <p:sp>
+        <p:nvSpPr>
+          <p:cNvPr id="4" name="Rectangle 3"/>
+          <p:cNvSpPr/>
+          <p:nvPr/>
+        </p:nvSpPr>
+        <p:spPr>
+          <a:xfrm>
+            <a:off x="1257300" y="4119551"/>
+            <a:ext cx="1571625" cy="471486"/>
+          </a:xfrm>
+          <a:prstGeom prst="rect">
+            <a:avLst/>
+          </a:prstGeom>
+        </p:spPr>
+        <p:style>
+          <a:lnRef idx="2">
+            <a:schemeClr val="accent1">
+              <a:shade val="50000"/>
+            </a:schemeClr>
+          </a:lnRef>
+          <a:fillRef idx="1">
+            <a:schemeClr val="accent1"/>
+          </a:fillRef>
+          <a:effectRef idx="0">
+            <a:schemeClr val="accent1"/>
+          </a:effectRef>
+          <a:fontRef idx="minor">
+            <a:schemeClr val="lt1"/>
+          </a:fontRef>
+        </p:style>
+        <p:txBody>
+          <a:bodyPr rtlCol="0" anchor="ctr"/>
+          <a:lstStyle/>
+          <a:p>
+            <a:pPr algn="ctr"/>
+            <a:r>
+              <a:rPr lang="en-GB" dirty="0" smtClean="0"/>
+              <a:t>head (on </a:t>
+            </a:r>
+            <a:r>
+              <a:rPr lang="en-GB" dirty="0" err="1" smtClean="0"/>
+              <a:t>dnd</a:t>
+            </a:r>
+            <a:r>
+              <a:rPr lang="en-GB" dirty="0"/>
+              <a:t>)</a:t>
+            </a:r>
+            <a:endParaRPr lang="en-GB" dirty="0" smtClean="0"/>
+          </a:p>
+          <a:p>
+            <a:pPr algn="ctr"/>
+            <a:r>
+              <a:rPr lang="en-GB" dirty="0" smtClean="0"/>
+              <a:t>(head </a:t>
+            </a:r>
+            <a:r>
+              <a:rPr lang="en-GB" dirty="0" err="1" smtClean="0"/>
+              <a:t>dnd</a:t>
+            </a:r>
+            <a:r>
+              <a:rPr lang="en-GB" dirty="0"/>
+              <a:t>)</a:t>
+            </a:r>
+          </a:p>
+        </p:txBody>
+      </p:sp>
+      <p:sp>
+        <p:nvSpPr>
+          <p:cNvPr id="5" name="Rectangle 4"/>
+          <p:cNvSpPr/>
+          <p:nvPr/>
+        </p:nvSpPr>
+        <p:spPr>
+          <a:xfrm>
+            <a:off x="3352800" y="4119547"/>
+            <a:ext cx="2371717" cy="471486"/>
+          </a:xfrm>
+          <a:prstGeom prst="rect">
+            <a:avLst/>
+          </a:prstGeom>
+        </p:spPr>
+        <p:style>
+          <a:lnRef idx="2">
+            <a:schemeClr val="accent1">
+              <a:shade val="50000"/>
+            </a:schemeClr>
+          </a:lnRef>
+          <a:fillRef idx="1">
+            <a:schemeClr val="accent1"/>
+          </a:fillRef>
+          <a:effectRef idx="0">
+            <a:schemeClr val="accent1"/>
+          </a:effectRef>
+          <a:fontRef idx="minor">
+            <a:schemeClr val="lt1"/>
+          </a:fontRef>
+        </p:style>
+        <p:txBody>
+          <a:bodyPr rtlCol="0" anchor="ctr"/>
+          <a:lstStyle/>
+          <a:p>
+            <a:pPr algn="ctr"/>
+            <a:r>
+              <a:rPr lang="en-GB" dirty="0" smtClean="0"/>
+              <a:t>head  (on </a:t>
+            </a:r>
+            <a:r>
+              <a:rPr lang="en-GB" dirty="0" err="1" smtClean="0"/>
+              <a:t>sqw</a:t>
+            </a:r>
+            <a:r>
+              <a:rPr lang="en-GB" dirty="0" smtClean="0"/>
+              <a:t>)</a:t>
+            </a:r>
+          </a:p>
+          <a:p>
+            <a:pPr algn="ctr"/>
+            <a:r>
+              <a:rPr lang="en-GB" dirty="0" smtClean="0"/>
+              <a:t>(head </a:t>
+            </a:r>
+            <a:r>
+              <a:rPr lang="en-GB" dirty="0" err="1" smtClean="0"/>
+              <a:t>dnd</a:t>
+            </a:r>
+            <a:r>
+              <a:rPr lang="en-GB" dirty="0" smtClean="0"/>
+              <a:t> + </a:t>
+            </a:r>
+            <a:r>
+              <a:rPr lang="en-GB" dirty="0" err="1" smtClean="0"/>
+              <a:t>pix</a:t>
+            </a:r>
+            <a:r>
+              <a:rPr lang="en-GB" dirty="0" smtClean="0"/>
+              <a:t> part)</a:t>
+            </a:r>
+            <a:endParaRPr lang="en-GB" dirty="0"/>
+          </a:p>
+        </p:txBody>
+      </p:sp>
+      <p:sp>
+        <p:nvSpPr>
+          <p:cNvPr id="6" name="Rectangle 5"/>
+          <p:cNvSpPr/>
+          <p:nvPr/>
+        </p:nvSpPr>
+        <p:spPr>
+          <a:xfrm>
+            <a:off x="6324602" y="4114782"/>
+            <a:ext cx="2371717" cy="471486"/>
+          </a:xfrm>
+          <a:prstGeom prst="rect">
+            <a:avLst/>
+          </a:prstGeom>
+        </p:spPr>
+        <p:style>
+          <a:lnRef idx="2">
+            <a:schemeClr val="accent1">
+              <a:shade val="50000"/>
+            </a:schemeClr>
+          </a:lnRef>
+          <a:fillRef idx="1">
+            <a:schemeClr val="accent1"/>
+          </a:fillRef>
+          <a:effectRef idx="0">
+            <a:schemeClr val="accent1"/>
+          </a:effectRef>
+          <a:fontRef idx="minor">
+            <a:schemeClr val="lt1"/>
+          </a:fontRef>
+        </p:style>
+        <p:txBody>
+          <a:bodyPr rtlCol="0" anchor="ctr"/>
+          <a:lstStyle/>
+          <a:p>
+            <a:pPr algn="ctr"/>
+            <a:r>
+              <a:rPr lang="en-GB" dirty="0" smtClean="0"/>
+              <a:t>head  (on file)</a:t>
+            </a:r>
+          </a:p>
+          <a:p>
+            <a:pPr algn="ctr"/>
+            <a:r>
+              <a:rPr lang="en-GB" dirty="0" smtClean="0"/>
+              <a:t>(file </a:t>
+            </a:r>
+            <a:r>
+              <a:rPr lang="en-GB" dirty="0" err="1" smtClean="0"/>
+              <a:t>accessor</a:t>
+            </a:r>
+            <a:r>
+              <a:rPr lang="en-GB" dirty="0" smtClean="0"/>
+              <a:t> + head)</a:t>
+            </a:r>
+            <a:endParaRPr lang="en-GB" dirty="0"/>
+          </a:p>
+        </p:txBody>
+      </p:sp>
       <p:cxnSp>
         <p:nvCxnSpPr>
-          <p:cNvPr id="6" name="Straight Arrow Connector 5"/>
-          <p:cNvCxnSpPr/>
+          <p:cNvPr id="8" name="Straight Arrow Connector 7"/>
+          <p:cNvCxnSpPr>
+            <a:stCxn id="4" idx="3"/>
+            <a:endCxn id="5" idx="1"/>
+          </p:cNvCxnSpPr>
           <p:nvPr/>
         </p:nvCxnSpPr>
         <p:spPr>
-          <a:xfrm>
-            <a:off x="1205474" y="5259220"/>
-            <a:ext cx="487018" cy="5679"/>
+          <a:xfrm flipV="1">
+            <a:off x="2828925" y="4355290"/>
+            <a:ext cx="523875" cy="4"/>
           </a:xfrm>
           <a:prstGeom prst="straightConnector1">
             <a:avLst/>
           </a:prstGeom>
-          <a:ln w="12700">
-            <a:solidFill>
-              <a:schemeClr val="tx1"/>
-            </a:solidFill>
+          <a:ln>
+            <a:tailEnd type="triangle"/>
+          </a:ln>
+        </p:spPr>
+        <p:style>
+          <a:lnRef idx="1">
+            <a:schemeClr val="accent1"/>
+          </a:lnRef>
+          <a:fillRef idx="0">
+            <a:schemeClr val="accent1"/>
+          </a:fillRef>
+          <a:effectRef idx="0">
+            <a:schemeClr val="accent1"/>
+          </a:effectRef>
+          <a:fontRef idx="minor">
+            <a:schemeClr val="tx1"/>
+          </a:fontRef>
+        </p:style>
+      </p:cxnSp>
+      <p:cxnSp>
+        <p:nvCxnSpPr>
+          <p:cNvPr id="10" name="Straight Arrow Connector 9"/>
+          <p:cNvCxnSpPr>
+            <a:endCxn id="6" idx="1"/>
+          </p:cNvCxnSpPr>
+          <p:nvPr/>
+        </p:nvCxnSpPr>
+        <p:spPr>
+          <a:xfrm>
+            <a:off x="5762625" y="4350525"/>
+            <a:ext cx="561977" cy="0"/>
+          </a:xfrm>
+          <a:prstGeom prst="straightConnector1">
+            <a:avLst/>
+          </a:prstGeom>
+          <a:ln>
             <a:tailEnd type="triangle"/>
           </a:ln>
         </p:spPr>
@@ -6036,20 +6732,95 @@
     </p:spTree>
     <p:extLst>
       <p:ext uri="{BB962C8B-B14F-4D97-AF65-F5344CB8AC3E}">
-        <p14:creationId xmlns:p14="http://schemas.microsoft.com/office/powerpoint/2010/main" val="1856731541"/>
+        <p14:creationId xmlns:p14="http://schemas.microsoft.com/office/powerpoint/2010/main" val="4002919976"/>
       </p:ext>
     </p:extLst>
   </p:cSld>
   <p:clrMapOvr>
     <a:masterClrMapping/>
   </p:clrMapOvr>
-  <p:timing>
-    <p:tnLst>
-      <p:par>
-        <p:cTn id="1" dur="indefinite" restart="never" nodeType="tmRoot"/>
-      </p:par>
-    </p:tnLst>
-  </p:timing>
+</p:sld>
+</file>
+
+<file path=ppt/slides/slide8.xml><?xml version="1.0" encoding="utf-8"?>
+<p:sld xmlns:a="http://schemas.openxmlformats.org/drawingml/2006/main" xmlns:r="http://schemas.openxmlformats.org/officeDocument/2006/relationships" xmlns:p="http://schemas.openxmlformats.org/presentationml/2006/main">
+  <p:cSld>
+    <p:spTree>
+      <p:nvGrpSpPr>
+        <p:cNvPr id="1" name=""/>
+        <p:cNvGrpSpPr/>
+        <p:nvPr/>
+      </p:nvGrpSpPr>
+      <p:grpSpPr>
+        <a:xfrm>
+          <a:off x="0" y="0"/>
+          <a:ext cx="0" cy="0"/>
+          <a:chOff x="0" y="0"/>
+          <a:chExt cx="0" cy="0"/>
+        </a:xfrm>
+      </p:grpSpPr>
+      <p:sp>
+        <p:nvSpPr>
+          <p:cNvPr id="2" name="Title 1"/>
+          <p:cNvSpPr>
+            <a:spLocks noGrp="1"/>
+          </p:cNvSpPr>
+          <p:nvPr>
+            <p:ph type="title"/>
+          </p:nvPr>
+        </p:nvSpPr>
+        <p:spPr/>
+        <p:txBody>
+          <a:bodyPr/>
+          <a:lstStyle/>
+          <a:p>
+            <a:r>
+              <a:rPr lang="en-GB" dirty="0" smtClean="0"/>
+              <a:t>Plot interface:</a:t>
+            </a:r>
+            <a:endParaRPr lang="en-GB" dirty="0"/>
+          </a:p>
+        </p:txBody>
+      </p:sp>
+      <p:pic>
+        <p:nvPicPr>
+          <p:cNvPr id="4" name="Content Placeholder 3"/>
+          <p:cNvPicPr>
+            <a:picLocks noGrp="1" noChangeAspect="1"/>
+          </p:cNvPicPr>
+          <p:nvPr>
+            <p:ph idx="1"/>
+          </p:nvPr>
+        </p:nvPicPr>
+        <p:blipFill>
+          <a:blip r:embed="rId2">
+            <a:extLst>
+              <a:ext uri="{28A0092B-C50C-407E-A947-70E740481C1C}">
+                <a14:useLocalDpi xmlns:a14="http://schemas.microsoft.com/office/drawing/2010/main" val="0"/>
+              </a:ext>
+            </a:extLst>
+          </a:blip>
+          <a:stretch>
+            <a:fillRect/>
+          </a:stretch>
+        </p:blipFill>
+        <p:spPr>
+          <a:xfrm>
+            <a:off x="1576387" y="1558925"/>
+            <a:ext cx="7643287" cy="4351338"/>
+          </a:xfrm>
+        </p:spPr>
+      </p:pic>
+    </p:spTree>
+    <p:extLst>
+      <p:ext uri="{BB962C8B-B14F-4D97-AF65-F5344CB8AC3E}">
+        <p14:creationId xmlns:p14="http://schemas.microsoft.com/office/powerpoint/2010/main" val="2239088337"/>
+      </p:ext>
+    </p:extLst>
+  </p:cSld>
+  <p:clrMapOvr>
+    <a:masterClrMapping/>
+  </p:clrMapOvr>
 </p:sld>
 </file>
 
@@ -6080,704 +6851,65 @@
             <p:ph type="title"/>
           </p:nvPr>
         </p:nvSpPr>
+        <p:spPr/>
+        <p:txBody>
+          <a:bodyPr/>
+          <a:lstStyle/>
+          <a:p>
+            <a:r>
+              <a:rPr lang="en-GB" dirty="0" smtClean="0"/>
+              <a:t>SQW object Cut Algorithm. Principles</a:t>
+            </a:r>
+            <a:endParaRPr lang="en-GB" dirty="0"/>
+          </a:p>
+        </p:txBody>
+      </p:sp>
+      <p:pic>
+        <p:nvPicPr>
+          <p:cNvPr id="4" name="Content Placeholder 3"/>
+          <p:cNvPicPr>
+            <a:picLocks noGrp="1" noChangeAspect="1"/>
+          </p:cNvPicPr>
+          <p:nvPr>
+            <p:ph idx="1"/>
+          </p:nvPr>
+        </p:nvPicPr>
+        <p:blipFill>
+          <a:blip r:embed="rId2"/>
+          <a:stretch>
+            <a:fillRect/>
+          </a:stretch>
+        </p:blipFill>
         <p:spPr>
           <a:xfrm>
-            <a:off x="838200" y="365126"/>
-            <a:ext cx="10515600" cy="759732"/>
-          </a:xfrm>
-        </p:spPr>
-        <p:txBody>
-          <a:bodyPr/>
-          <a:lstStyle/>
-          <a:p>
-            <a:r>
-              <a:rPr lang="en-GB" dirty="0" smtClean="0"/>
-              <a:t>SQW object Cut Algorithm Implementation:</a:t>
-            </a:r>
-            <a:endParaRPr lang="en-GB" dirty="0"/>
-          </a:p>
-        </p:txBody>
-      </p:sp>
-      <p:sp>
-        <p:nvSpPr>
-          <p:cNvPr id="4" name="Rectangle 3"/>
-          <p:cNvSpPr/>
-          <p:nvPr/>
-        </p:nvSpPr>
-        <p:spPr>
-          <a:xfrm>
-            <a:off x="736598" y="1099854"/>
-            <a:ext cx="10468429" cy="369332"/>
+            <a:off x="1205474" y="1825625"/>
+            <a:ext cx="9781051" cy="4351338"/>
           </a:xfrm>
           <a:prstGeom prst="rect">
             <a:avLst/>
           </a:prstGeom>
         </p:spPr>
-        <p:txBody>
-          <a:bodyPr wrap="square">
-            <a:spAutoFit/>
-          </a:bodyPr>
-          <a:lstStyle/>
-          <a:p>
-            <a:r>
-              <a:rPr lang="en-GB" b="1" dirty="0">
-                <a:latin typeface="Menlo"/>
-              </a:rPr>
-              <a:t>[</a:t>
-            </a:r>
-            <a:r>
-              <a:rPr lang="en-GB" b="1" dirty="0" err="1" smtClean="0">
-                <a:latin typeface="Menlo"/>
-              </a:rPr>
-              <a:t>targ_proj,targ_binning</a:t>
-            </a:r>
-            <a:r>
-              <a:rPr lang="en-GB" b="1" dirty="0" smtClean="0">
-                <a:latin typeface="Menlo"/>
-              </a:rPr>
-              <a:t>] = </a:t>
-            </a:r>
-            <a:r>
-              <a:rPr lang="en-GB" b="1" dirty="0" err="1" smtClean="0">
-                <a:latin typeface="Menlo"/>
-              </a:rPr>
-              <a:t>process_and_validate_cut_inputs</a:t>
-            </a:r>
-            <a:r>
-              <a:rPr lang="en-GB" b="1" dirty="0" smtClean="0">
-                <a:latin typeface="Menlo"/>
-              </a:rPr>
-              <a:t>(</a:t>
-            </a:r>
-            <a:r>
-              <a:rPr lang="en-GB" b="1" dirty="0" err="1" smtClean="0">
-                <a:latin typeface="Menlo"/>
-              </a:rPr>
-              <a:t>source_sqw,binning_inputs</a:t>
-            </a:r>
-            <a:r>
-              <a:rPr lang="en-GB" b="1" dirty="0" smtClean="0">
-                <a:latin typeface="Menlo"/>
-              </a:rPr>
-              <a:t>)</a:t>
-            </a:r>
-            <a:endParaRPr lang="en-GB" b="1" dirty="0">
-              <a:latin typeface="Menlo"/>
-            </a:endParaRPr>
-          </a:p>
-        </p:txBody>
-      </p:sp>
-      <p:sp>
-        <p:nvSpPr>
-          <p:cNvPr id="5" name="Rectangle 4"/>
-          <p:cNvSpPr/>
+      </p:pic>
+      <p:cxnSp>
+        <p:nvCxnSpPr>
+          <p:cNvPr id="6" name="Straight Arrow Connector 5"/>
+          <p:cNvCxnSpPr/>
           <p:nvPr/>
-        </p:nvSpPr>
+        </p:nvCxnSpPr>
         <p:spPr>
           <a:xfrm>
-            <a:off x="838200" y="1469186"/>
-            <a:ext cx="11676742" cy="4801314"/>
-          </a:xfrm>
-          <a:prstGeom prst="rect">
+            <a:off x="1205474" y="5259220"/>
+            <a:ext cx="487018" cy="5679"/>
+          </a:xfrm>
+          <a:prstGeom prst="straightConnector1">
             <a:avLst/>
           </a:prstGeom>
-        </p:spPr>
-        <p:txBody>
-          <a:bodyPr wrap="square">
-            <a:spAutoFit/>
-          </a:bodyPr>
-          <a:lstStyle/>
-          <a:p>
-            <a:r>
-              <a:rPr lang="en-GB" b="1" dirty="0" err="1" smtClean="0">
-                <a:latin typeface="Menlo"/>
-              </a:rPr>
-              <a:t>targ_ax_block</a:t>
-            </a:r>
-            <a:r>
-              <a:rPr lang="en-GB" b="1" dirty="0" smtClean="0">
-                <a:latin typeface="Menlo"/>
-              </a:rPr>
-              <a:t> </a:t>
-            </a:r>
-            <a:r>
-              <a:rPr lang="en-GB" b="1" dirty="0">
-                <a:latin typeface="Menlo"/>
-              </a:rPr>
-              <a:t>= </a:t>
-            </a:r>
-            <a:r>
-              <a:rPr lang="en-GB" b="1" dirty="0" err="1" smtClean="0">
-                <a:latin typeface="Menlo"/>
-              </a:rPr>
-              <a:t>targ_proj.</a:t>
-            </a:r>
-            <a:r>
-              <a:rPr lang="en-GB" b="1" dirty="0" err="1" smtClean="0">
-                <a:solidFill>
-                  <a:srgbClr val="00B050"/>
-                </a:solidFill>
-                <a:latin typeface="Menlo"/>
-              </a:rPr>
-              <a:t>get_proj_axes_block</a:t>
-            </a:r>
-            <a:r>
-              <a:rPr lang="en-GB" b="1" dirty="0">
-                <a:latin typeface="Menlo"/>
-              </a:rPr>
-              <a:t>(</a:t>
-            </a:r>
-            <a:r>
-              <a:rPr lang="en-GB" b="1" dirty="0" err="1" smtClean="0">
-                <a:latin typeface="Menlo"/>
-              </a:rPr>
-              <a:t>targ_binning</a:t>
-            </a:r>
-            <a:r>
-              <a:rPr lang="en-GB" b="1" dirty="0" smtClean="0">
-                <a:latin typeface="Menlo"/>
-              </a:rPr>
-              <a:t>);</a:t>
-            </a:r>
-          </a:p>
-          <a:p>
-            <a:r>
-              <a:rPr lang="en-GB" b="1" dirty="0" smtClean="0">
-                <a:solidFill>
-                  <a:srgbClr val="028009"/>
-                </a:solidFill>
-                <a:latin typeface="Menlo"/>
-              </a:rPr>
-              <a:t>%</a:t>
-            </a:r>
-          </a:p>
-          <a:p>
-            <a:r>
-              <a:rPr lang="en-GB" b="1" dirty="0" smtClean="0"/>
-              <a:t>[</a:t>
-            </a:r>
-            <a:r>
-              <a:rPr lang="en-GB" b="1" dirty="0" err="1" smtClean="0"/>
-              <a:t>pix_starts</a:t>
-            </a:r>
-            <a:r>
-              <a:rPr lang="en-GB" b="1" dirty="0"/>
-              <a:t>, </a:t>
-            </a:r>
-            <a:r>
-              <a:rPr lang="en-GB" b="1" dirty="0" err="1"/>
-              <a:t>block_sizes</a:t>
-            </a:r>
-            <a:r>
-              <a:rPr lang="en-GB" b="1" dirty="0"/>
-              <a:t>] = </a:t>
-            </a:r>
-            <a:r>
-              <a:rPr lang="en-GB" b="1" dirty="0" err="1" smtClean="0">
-                <a:latin typeface="Menlo"/>
-              </a:rPr>
-              <a:t>source_proj</a:t>
-            </a:r>
-            <a:r>
-              <a:rPr lang="en-GB" b="1" dirty="0" err="1" smtClean="0"/>
-              <a:t>.</a:t>
-            </a:r>
-            <a:r>
-              <a:rPr lang="en-GB" b="1" dirty="0" err="1" smtClean="0">
-                <a:solidFill>
-                  <a:srgbClr val="0070C0"/>
-                </a:solidFill>
-              </a:rPr>
-              <a:t>get_nrange</a:t>
-            </a:r>
-            <a:r>
-              <a:rPr lang="en-GB" b="1" dirty="0" smtClean="0"/>
-              <a:t>(</a:t>
-            </a:r>
-            <a:r>
-              <a:rPr lang="en-GB" b="1" dirty="0" err="1" smtClean="0"/>
-              <a:t>npix,source_axes,targ_axes,targ_proj</a:t>
-            </a:r>
-            <a:r>
-              <a:rPr lang="en-GB" b="1" dirty="0" smtClean="0"/>
-              <a:t>);</a:t>
-            </a:r>
-            <a:endParaRPr lang="en-GB" b="1" dirty="0"/>
-          </a:p>
-          <a:p>
-            <a:endParaRPr lang="en-GB" b="1" dirty="0" smtClean="0">
-              <a:latin typeface="Menlo"/>
-            </a:endParaRPr>
-          </a:p>
-          <a:p>
-            <a:r>
-              <a:rPr lang="en-GB" b="1" dirty="0" smtClean="0"/>
-              <a:t>                         </a:t>
-            </a:r>
-            <a:r>
-              <a:rPr lang="en-GB" b="1" dirty="0" err="1" smtClean="0"/>
-              <a:t>ch_cube</a:t>
-            </a:r>
-            <a:r>
-              <a:rPr lang="en-GB" b="1" dirty="0" smtClean="0"/>
-              <a:t> </a:t>
-            </a:r>
-            <a:r>
-              <a:rPr lang="en-GB" b="1" dirty="0"/>
-              <a:t>= </a:t>
-            </a:r>
-            <a:r>
-              <a:rPr lang="en-GB" b="1" dirty="0" err="1"/>
-              <a:t>cur_axes_block.</a:t>
-            </a:r>
-            <a:r>
-              <a:rPr lang="en-GB" b="1" dirty="0" err="1">
-                <a:solidFill>
-                  <a:srgbClr val="00B050"/>
-                </a:solidFill>
-              </a:rPr>
-              <a:t>get_axes_scales</a:t>
-            </a:r>
-            <a:r>
-              <a:rPr lang="en-GB" b="1" dirty="0"/>
-              <a:t>();</a:t>
-            </a:r>
-          </a:p>
-          <a:p>
-            <a:r>
-              <a:rPr lang="en-GB" b="1" dirty="0" smtClean="0"/>
-              <a:t>                         </a:t>
-            </a:r>
-            <a:r>
-              <a:rPr lang="en-GB" b="1" dirty="0" err="1" smtClean="0"/>
-              <a:t>trans_chcube</a:t>
-            </a:r>
-            <a:r>
-              <a:rPr lang="en-GB" b="1" dirty="0" smtClean="0"/>
-              <a:t> </a:t>
-            </a:r>
-            <a:r>
-              <a:rPr lang="en-GB" b="1" dirty="0"/>
-              <a:t>= </a:t>
-            </a:r>
-            <a:r>
-              <a:rPr lang="en-GB" b="1" dirty="0" err="1"/>
-              <a:t>source_proj.</a:t>
-            </a:r>
-            <a:r>
-              <a:rPr lang="en-GB" b="1" dirty="0" err="1">
-                <a:solidFill>
-                  <a:srgbClr val="0070C0"/>
-                </a:solidFill>
-              </a:rPr>
-              <a:t>from_this_to_targ_coord</a:t>
-            </a:r>
-            <a:r>
-              <a:rPr lang="en-GB" b="1" dirty="0"/>
-              <a:t>(</a:t>
-            </a:r>
-            <a:r>
-              <a:rPr lang="en-GB" b="1" dirty="0" err="1"/>
-              <a:t>ch_cube</a:t>
-            </a:r>
-            <a:r>
-              <a:rPr lang="en-GB" b="1" dirty="0" smtClean="0"/>
-              <a:t>)</a:t>
-            </a:r>
-          </a:p>
-          <a:p>
-            <a:r>
-              <a:rPr lang="en-GB" b="1" dirty="0" smtClean="0"/>
-              <a:t>                         </a:t>
-            </a:r>
-            <a:r>
-              <a:rPr lang="en-GB" b="1" dirty="0" err="1" smtClean="0"/>
-              <a:t>bin_nodes</a:t>
-            </a:r>
-            <a:r>
-              <a:rPr lang="en-GB" b="1" dirty="0" smtClean="0"/>
-              <a:t> </a:t>
-            </a:r>
-            <a:r>
-              <a:rPr lang="en-GB" b="1" dirty="0"/>
-              <a:t>= </a:t>
-            </a:r>
-            <a:r>
-              <a:rPr lang="en-GB" b="1" dirty="0" err="1" smtClean="0"/>
-              <a:t>targ_axes_block.</a:t>
-            </a:r>
-            <a:r>
-              <a:rPr lang="en-GB" b="1" dirty="0" err="1" smtClean="0">
-                <a:solidFill>
-                  <a:srgbClr val="0070C0"/>
-                </a:solidFill>
-              </a:rPr>
-              <a:t>get_bin_nodes</a:t>
-            </a:r>
-            <a:r>
-              <a:rPr lang="en-GB" b="1" dirty="0" smtClean="0"/>
-              <a:t>(</a:t>
-            </a:r>
-            <a:r>
-              <a:rPr lang="en-GB" b="1" dirty="0" err="1" smtClean="0"/>
-              <a:t>trans_chcube</a:t>
-            </a:r>
-            <a:r>
-              <a:rPr lang="en-GB" b="1" dirty="0" smtClean="0"/>
-              <a:t>)  </a:t>
-            </a:r>
-            <a:r>
-              <a:rPr lang="en-GB" b="1" dirty="0" smtClean="0">
-                <a:solidFill>
-                  <a:srgbClr val="00B050"/>
-                </a:solidFill>
-              </a:rPr>
-              <a:t>% needs halo</a:t>
-            </a:r>
-          </a:p>
-          <a:p>
-            <a:r>
-              <a:rPr lang="en-GB" b="1" dirty="0" smtClean="0"/>
-              <a:t>                         </a:t>
-            </a:r>
-            <a:r>
-              <a:rPr lang="en-GB" b="1" dirty="0" err="1" smtClean="0"/>
-              <a:t>nodes_here</a:t>
-            </a:r>
-            <a:r>
-              <a:rPr lang="en-GB" b="1" dirty="0" smtClean="0"/>
-              <a:t> </a:t>
-            </a:r>
-            <a:r>
-              <a:rPr lang="en-GB" b="1" dirty="0"/>
-              <a:t>= </a:t>
-            </a:r>
-            <a:r>
-              <a:rPr lang="en-GB" b="1" dirty="0" err="1"/>
-              <a:t>targ_proj.</a:t>
-            </a:r>
-            <a:r>
-              <a:rPr lang="en-GB" b="1" dirty="0" err="1">
-                <a:solidFill>
-                  <a:srgbClr val="0070C0"/>
-                </a:solidFill>
-              </a:rPr>
-              <a:t>from_this_to_targ_coord</a:t>
-            </a:r>
-            <a:r>
-              <a:rPr lang="en-GB" b="1" dirty="0">
-                <a:solidFill>
-                  <a:srgbClr val="0070C0"/>
-                </a:solidFill>
-              </a:rPr>
-              <a:t>(</a:t>
-            </a:r>
-            <a:r>
-              <a:rPr lang="en-GB" b="1" dirty="0" err="1"/>
-              <a:t>bin_nodes</a:t>
-            </a:r>
-            <a:r>
-              <a:rPr lang="en-GB" b="1" dirty="0" smtClean="0"/>
-              <a:t>);</a:t>
-            </a:r>
-            <a:endParaRPr lang="en-GB" b="1" dirty="0"/>
-          </a:p>
-          <a:p>
-            <a:r>
-              <a:rPr lang="en-GB" b="1" dirty="0" smtClean="0"/>
-              <a:t>                         </a:t>
-            </a:r>
-            <a:r>
-              <a:rPr lang="en-GB" b="1" dirty="0" err="1" smtClean="0"/>
-              <a:t>nbin_in_bin</a:t>
-            </a:r>
-            <a:r>
-              <a:rPr lang="en-GB" b="1" dirty="0" smtClean="0"/>
-              <a:t> </a:t>
-            </a:r>
-            <a:r>
-              <a:rPr lang="en-GB" b="1" dirty="0"/>
-              <a:t>= </a:t>
-            </a:r>
-            <a:r>
-              <a:rPr lang="en-GB" b="1" dirty="0" err="1"/>
-              <a:t>cur_axes_block.</a:t>
-            </a:r>
-            <a:r>
-              <a:rPr lang="en-GB" b="1" dirty="0" err="1">
-                <a:solidFill>
-                  <a:srgbClr val="0070C0"/>
-                </a:solidFill>
-              </a:rPr>
-              <a:t>bin_pixels</a:t>
-            </a:r>
-            <a:r>
-              <a:rPr lang="en-GB" b="1" dirty="0"/>
-              <a:t>(</a:t>
-            </a:r>
-            <a:r>
-              <a:rPr lang="en-GB" b="1" dirty="0" err="1"/>
-              <a:t>nodes_here</a:t>
-            </a:r>
-            <a:r>
-              <a:rPr lang="en-GB" b="1" dirty="0"/>
-              <a:t>)</a:t>
-            </a:r>
-          </a:p>
-          <a:p>
-            <a:r>
-              <a:rPr lang="en-GB" b="1" dirty="0" smtClean="0"/>
-              <a:t>                         </a:t>
-            </a:r>
-            <a:r>
-              <a:rPr lang="en-GB" b="1" dirty="0" err="1" smtClean="0"/>
-              <a:t>contrib_ind</a:t>
-            </a:r>
-            <a:r>
-              <a:rPr lang="en-GB" b="1" dirty="0" smtClean="0"/>
-              <a:t> </a:t>
-            </a:r>
-            <a:r>
-              <a:rPr lang="en-GB" b="1" dirty="0"/>
-              <a:t>= find(</a:t>
-            </a:r>
-            <a:r>
-              <a:rPr lang="en-GB" b="1" dirty="0" err="1"/>
-              <a:t>nbin_in_bin</a:t>
-            </a:r>
-            <a:r>
-              <a:rPr lang="en-GB" b="1" dirty="0"/>
-              <a:t>&gt;0</a:t>
-            </a:r>
-            <a:r>
-              <a:rPr lang="en-GB" b="1" dirty="0" smtClean="0"/>
-              <a:t>)</a:t>
-            </a:r>
-          </a:p>
-          <a:p>
-            <a:r>
-              <a:rPr lang="en-GB" dirty="0" smtClean="0"/>
-              <a:t>Find pixel indexes from cell indexes using </a:t>
-            </a:r>
-            <a:r>
-              <a:rPr lang="en-GB" dirty="0" err="1" smtClean="0"/>
-              <a:t>pix</a:t>
-            </a:r>
-            <a:r>
-              <a:rPr lang="en-GB" dirty="0" smtClean="0"/>
-              <a:t> in cell density</a:t>
-            </a:r>
-          </a:p>
-          <a:p>
-            <a:endParaRPr lang="en-GB" b="1" dirty="0" smtClean="0"/>
-          </a:p>
-          <a:p>
-            <a:r>
-              <a:rPr lang="en-GB" b="1" dirty="0" err="1" smtClean="0"/>
-              <a:t>candidate_pix</a:t>
-            </a:r>
-            <a:r>
-              <a:rPr lang="en-GB" b="1" dirty="0" smtClean="0"/>
-              <a:t> </a:t>
-            </a:r>
-            <a:r>
-              <a:rPr lang="en-GB" b="1" dirty="0"/>
-              <a:t>= </a:t>
-            </a:r>
-            <a:r>
-              <a:rPr lang="en-GB" b="1" dirty="0" err="1" smtClean="0"/>
-              <a:t>source_pix.get_pix_in_ranges</a:t>
-            </a:r>
-            <a:r>
-              <a:rPr lang="en-GB" b="1" dirty="0" smtClean="0"/>
-              <a:t>(</a:t>
-            </a:r>
-            <a:r>
-              <a:rPr lang="en-GB" b="1" dirty="0" err="1" smtClean="0"/>
-              <a:t>pix_starts</a:t>
-            </a:r>
-            <a:r>
-              <a:rPr lang="en-GB" b="1" dirty="0" smtClean="0"/>
-              <a:t>, </a:t>
-            </a:r>
-            <a:r>
-              <a:rPr lang="en-GB" b="1" dirty="0" err="1" smtClean="0"/>
-              <a:t>block_sizes</a:t>
-            </a:r>
-            <a:r>
-              <a:rPr lang="en-GB" b="1" dirty="0" smtClean="0"/>
-              <a:t>);</a:t>
-            </a:r>
-          </a:p>
-          <a:p>
-            <a:r>
-              <a:rPr lang="en-GB" b="1" dirty="0" smtClean="0"/>
-              <a:t>[</a:t>
-            </a:r>
-            <a:r>
-              <a:rPr lang="en-GB" b="1" dirty="0" err="1"/>
-              <a:t>npix,s,e,pix_ok,unique_runid</a:t>
-            </a:r>
-            <a:r>
-              <a:rPr lang="en-GB" b="1" dirty="0"/>
-              <a:t>] = </a:t>
-            </a:r>
-            <a:r>
-              <a:rPr lang="en-GB" b="1" dirty="0" err="1" smtClean="0"/>
-              <a:t>targ_proj.</a:t>
-            </a:r>
-            <a:r>
-              <a:rPr lang="en-GB" b="1" dirty="0" err="1" smtClean="0">
-                <a:solidFill>
-                  <a:srgbClr val="0070C0"/>
-                </a:solidFill>
-              </a:rPr>
-              <a:t>bin_pixels</a:t>
-            </a:r>
-            <a:r>
-              <a:rPr lang="en-GB" b="1" dirty="0" smtClean="0"/>
-              <a:t>(</a:t>
-            </a:r>
-            <a:r>
-              <a:rPr lang="en-GB" b="1" dirty="0" err="1" smtClean="0"/>
-              <a:t>targ_axes,candidate_pix</a:t>
-            </a:r>
-            <a:r>
-              <a:rPr lang="en-GB" b="1" dirty="0" smtClean="0"/>
-              <a:t>)</a:t>
-            </a:r>
-            <a:endParaRPr lang="en-GB" b="1" dirty="0"/>
-          </a:p>
-          <a:p>
-            <a:endParaRPr lang="en-GB" b="1" dirty="0"/>
-          </a:p>
-          <a:p>
-            <a:r>
-              <a:rPr lang="en-GB" b="1" dirty="0" smtClean="0">
-                <a:latin typeface="Menlo"/>
-              </a:rPr>
-              <a:t>                </a:t>
-            </a:r>
-            <a:r>
-              <a:rPr lang="en-GB" dirty="0" err="1" smtClean="0">
-                <a:latin typeface="Menlo"/>
-              </a:rPr>
-              <a:t>pix_in_targ_coord_system</a:t>
-            </a:r>
-            <a:r>
-              <a:rPr lang="en-GB" dirty="0" smtClean="0">
-                <a:latin typeface="Menlo"/>
-              </a:rPr>
-              <a:t> </a:t>
-            </a:r>
-            <a:r>
-              <a:rPr lang="en-GB" b="1" dirty="0" smtClean="0">
-                <a:latin typeface="Menlo"/>
-              </a:rPr>
-              <a:t>= </a:t>
-            </a:r>
-            <a:r>
-              <a:rPr lang="en-GB" b="1" dirty="0" err="1" smtClean="0">
-                <a:latin typeface="Menlo"/>
-              </a:rPr>
-              <a:t>targ_proj</a:t>
-            </a:r>
-            <a:r>
-              <a:rPr lang="en-GB" b="1" dirty="0" err="1" smtClean="0">
-                <a:solidFill>
-                  <a:srgbClr val="00B050"/>
-                </a:solidFill>
-                <a:latin typeface="Menlo"/>
-              </a:rPr>
-              <a:t>.from_pix_to_img</a:t>
-            </a:r>
-            <a:r>
-              <a:rPr lang="en-GB" b="1" dirty="0" smtClean="0">
-                <a:latin typeface="Menlo"/>
-              </a:rPr>
-              <a:t>(</a:t>
-            </a:r>
-            <a:r>
-              <a:rPr lang="en-GB" b="1" dirty="0" err="1" smtClean="0"/>
-              <a:t>candidate_pix</a:t>
-            </a:r>
-            <a:r>
-              <a:rPr lang="en-GB" b="1" dirty="0" smtClean="0">
-                <a:latin typeface="Menlo"/>
-              </a:rPr>
-              <a:t>) </a:t>
-            </a:r>
-          </a:p>
-          <a:p>
-            <a:r>
-              <a:rPr lang="en-GB" b="1" dirty="0" smtClean="0">
-                <a:latin typeface="Menlo"/>
-              </a:rPr>
-              <a:t>                </a:t>
-            </a:r>
-            <a:r>
-              <a:rPr lang="en-GB" b="1" dirty="0" smtClean="0"/>
-              <a:t>[</a:t>
-            </a:r>
-            <a:r>
-              <a:rPr lang="en-GB" b="1" dirty="0" err="1" smtClean="0"/>
-              <a:t>npix,s,e,pix_oke_runid</a:t>
-            </a:r>
-            <a:r>
-              <a:rPr lang="en-GB" b="1" dirty="0" smtClean="0"/>
-              <a:t>] = </a:t>
-            </a:r>
-            <a:r>
-              <a:rPr lang="en-GB" b="1" dirty="0" err="1" smtClean="0"/>
-              <a:t>targ_axes_block.</a:t>
-            </a:r>
-            <a:r>
-              <a:rPr lang="en-GB" b="1" dirty="0" err="1" smtClean="0">
-                <a:solidFill>
-                  <a:srgbClr val="0070C0"/>
-                </a:solidFill>
-              </a:rPr>
-              <a:t>bin_pixels</a:t>
-            </a:r>
-            <a:r>
-              <a:rPr lang="en-GB" b="1" dirty="0" smtClean="0"/>
-              <a:t>(</a:t>
-            </a:r>
-            <a:r>
-              <a:rPr lang="en-GB" dirty="0" err="1" smtClean="0">
-                <a:latin typeface="Menlo"/>
-              </a:rPr>
-              <a:t>pix_in_targ_coord_system</a:t>
-            </a:r>
-            <a:r>
-              <a:rPr lang="ru-RU" dirty="0" smtClean="0">
-                <a:latin typeface="Menlo"/>
-              </a:rPr>
-              <a:t>)</a:t>
-            </a:r>
-            <a:endParaRPr lang="en-GB" b="1" dirty="0">
-              <a:latin typeface="Menlo"/>
-            </a:endParaRPr>
-          </a:p>
-        </p:txBody>
-      </p:sp>
-      <p:sp>
-        <p:nvSpPr>
-          <p:cNvPr id="7" name="Right Brace 6"/>
-          <p:cNvSpPr/>
-          <p:nvPr/>
-        </p:nvSpPr>
-        <p:spPr>
-          <a:xfrm rot="5400000">
-            <a:off x="5021944" y="-1930406"/>
-            <a:ext cx="413658" cy="8744859"/>
-          </a:xfrm>
-          <a:prstGeom prst="rightBrace">
-            <a:avLst>
-              <a:gd name="adj1" fmla="val 8333"/>
-              <a:gd name="adj2" fmla="val 49616"/>
-            </a:avLst>
-          </a:prstGeom>
+          <a:ln w="12700">
+            <a:solidFill>
+              <a:schemeClr val="tx1"/>
+            </a:solidFill>
+            <a:tailEnd type="triangle"/>
+          </a:ln>
         </p:spPr>
         <p:style>
           <a:lnRef idx="1">
@@ -6793,60 +6925,11 @@
             <a:schemeClr val="tx1"/>
           </a:fontRef>
         </p:style>
-        <p:txBody>
-          <a:bodyPr rtlCol="0" anchor="ctr"/>
-          <a:lstStyle/>
-          <a:p>
-            <a:pPr algn="ctr"/>
-            <a:endParaRPr lang="en-GB"/>
-          </a:p>
-        </p:txBody>
-      </p:sp>
-      <p:sp>
-        <p:nvSpPr>
-          <p:cNvPr id="8" name="Right Brace 7"/>
-          <p:cNvSpPr/>
-          <p:nvPr/>
-        </p:nvSpPr>
-        <p:spPr>
-          <a:xfrm rot="5400000">
-            <a:off x="4394188" y="1600190"/>
-            <a:ext cx="449965" cy="7525658"/>
-          </a:xfrm>
-          <a:prstGeom prst="rightBrace">
-            <a:avLst>
-              <a:gd name="adj1" fmla="val 8333"/>
-              <a:gd name="adj2" fmla="val 49616"/>
-            </a:avLst>
-          </a:prstGeom>
-        </p:spPr>
-        <p:style>
-          <a:lnRef idx="1">
-            <a:schemeClr val="accent1"/>
-          </a:lnRef>
-          <a:fillRef idx="0">
-            <a:schemeClr val="accent1"/>
-          </a:fillRef>
-          <a:effectRef idx="0">
-            <a:schemeClr val="accent1"/>
-          </a:effectRef>
-          <a:fontRef idx="minor">
-            <a:schemeClr val="tx1"/>
-          </a:fontRef>
-        </p:style>
-        <p:txBody>
-          <a:bodyPr rtlCol="0" anchor="ctr"/>
-          <a:lstStyle/>
-          <a:p>
-            <a:pPr algn="ctr"/>
-            <a:endParaRPr lang="en-GB"/>
-          </a:p>
-        </p:txBody>
-      </p:sp>
+      </p:cxnSp>
     </p:spTree>
     <p:extLst>
       <p:ext uri="{BB962C8B-B14F-4D97-AF65-F5344CB8AC3E}">
-        <p14:creationId xmlns:p14="http://schemas.microsoft.com/office/powerpoint/2010/main" val="1352675182"/>
+        <p14:creationId xmlns:p14="http://schemas.microsoft.com/office/powerpoint/2010/main" val="1856731541"/>
       </p:ext>
     </p:extLst>
   </p:cSld>

</xml_diff>

<commit_message>
Re #810 fixed combine_pow and crash in combining files together
</commit_message>
<xml_diff>
--- a/documentation/presentations/SQW&GenericProjectionDesigh.pptx
+++ b/documentation/presentations/SQW&GenericProjectionDesigh.pptx
@@ -9,8 +9,8 @@
     <p:sldId id="257" r:id="rId3"/>
     <p:sldId id="258" r:id="rId4"/>
     <p:sldId id="259" r:id="rId5"/>
-    <p:sldId id="260" r:id="rId6"/>
-    <p:sldId id="266" r:id="rId7"/>
+    <p:sldId id="266" r:id="rId6"/>
+    <p:sldId id="260" r:id="rId7"/>
     <p:sldId id="267" r:id="rId8"/>
     <p:sldId id="268" r:id="rId9"/>
     <p:sldId id="261" r:id="rId10"/>
@@ -5892,6 +5892,34 @@
           <a:chExt cx="0" cy="0"/>
         </a:xfrm>
       </p:grpSpPr>
+      <p:sp>
+        <p:nvSpPr>
+          <p:cNvPr id="2" name="Title 1"/>
+          <p:cNvSpPr>
+            <a:spLocks noGrp="1"/>
+          </p:cNvSpPr>
+          <p:nvPr>
+            <p:ph type="title"/>
+          </p:nvPr>
+        </p:nvSpPr>
+        <p:spPr>
+          <a:xfrm>
+            <a:off x="838200" y="365125"/>
+            <a:ext cx="10515600" cy="895725"/>
+          </a:xfrm>
+        </p:spPr>
+        <p:txBody>
+          <a:bodyPr/>
+          <a:lstStyle/>
+          <a:p>
+            <a:r>
+              <a:rPr lang="en-GB" dirty="0" smtClean="0"/>
+              <a:t>Main Horace’ objects interfaces:</a:t>
+            </a:r>
+            <a:endParaRPr lang="en-GB" dirty="0"/>
+          </a:p>
+        </p:txBody>
+      </p:sp>
       <p:pic>
         <p:nvPicPr>
           <p:cNvPr id="3" name="Picture 2"/>
@@ -5914,246 +5942,18 @@
         </p:blipFill>
         <p:spPr>
           <a:xfrm>
-            <a:off x="7448044" y="1204723"/>
-            <a:ext cx="4581525" cy="2962275"/>
+            <a:off x="838200" y="1590675"/>
+            <a:ext cx="8950968" cy="4922420"/>
           </a:xfrm>
           <a:prstGeom prst="rect">
             <a:avLst/>
           </a:prstGeom>
         </p:spPr>
       </p:pic>
-      <p:sp>
-        <p:nvSpPr>
-          <p:cNvPr id="2" name="Title 1"/>
-          <p:cNvSpPr>
-            <a:spLocks noGrp="1"/>
-          </p:cNvSpPr>
-          <p:nvPr>
-            <p:ph type="title"/>
-          </p:nvPr>
-        </p:nvSpPr>
-        <p:spPr>
-          <a:xfrm>
-            <a:off x="0" y="61477"/>
-            <a:ext cx="10515600" cy="1325563"/>
-          </a:xfrm>
-        </p:spPr>
-        <p:txBody>
-          <a:bodyPr/>
-          <a:lstStyle/>
-          <a:p>
-            <a:r>
-              <a:rPr lang="en-GB" dirty="0" smtClean="0"/>
-              <a:t>SQW and DND </a:t>
-            </a:r>
-            <a:r>
-              <a:rPr lang="en-GB" dirty="0" smtClean="0"/>
-              <a:t>objects. Composition:</a:t>
-            </a:r>
-            <a:endParaRPr lang="en-GB" dirty="0"/>
-          </a:p>
-        </p:txBody>
-      </p:sp>
-      <p:pic>
-        <p:nvPicPr>
-          <p:cNvPr id="4" name="Picture 3"/>
-          <p:cNvPicPr>
-            <a:picLocks noChangeAspect="1"/>
-          </p:cNvPicPr>
-          <p:nvPr/>
-        </p:nvPicPr>
-        <p:blipFill>
-          <a:blip r:embed="rId3">
-            <a:extLst>
-              <a:ext uri="{28A0092B-C50C-407E-A947-70E740481C1C}">
-                <a14:useLocalDpi xmlns:a14="http://schemas.microsoft.com/office/drawing/2010/main" val="0"/>
-              </a:ext>
-            </a:extLst>
-          </a:blip>
-          <a:stretch>
-            <a:fillRect/>
-          </a:stretch>
-        </p:blipFill>
-        <p:spPr>
-          <a:xfrm>
-            <a:off x="292937" y="1762125"/>
-            <a:ext cx="6867525" cy="4181475"/>
-          </a:xfrm>
-          <a:prstGeom prst="rect">
-            <a:avLst/>
-          </a:prstGeom>
-        </p:spPr>
-      </p:pic>
-      <p:sp>
-        <p:nvSpPr>
-          <p:cNvPr id="6" name="Oval 5"/>
-          <p:cNvSpPr/>
-          <p:nvPr/>
-        </p:nvSpPr>
-        <p:spPr>
-          <a:xfrm>
-            <a:off x="2113652" y="5495701"/>
-            <a:ext cx="2442186" cy="641784"/>
-          </a:xfrm>
-          <a:prstGeom prst="ellipse">
-            <a:avLst/>
-          </a:prstGeom>
-          <a:solidFill>
-            <a:schemeClr val="bg1">
-              <a:alpha val="0"/>
-            </a:schemeClr>
-          </a:solidFill>
-          <a:ln w="25400">
-            <a:solidFill>
-              <a:srgbClr val="FF0000"/>
-            </a:solidFill>
-          </a:ln>
-        </p:spPr>
-        <p:style>
-          <a:lnRef idx="2">
-            <a:schemeClr val="accent1">
-              <a:shade val="50000"/>
-            </a:schemeClr>
-          </a:lnRef>
-          <a:fillRef idx="1">
-            <a:schemeClr val="accent1"/>
-          </a:fillRef>
-          <a:effectRef idx="0">
-            <a:schemeClr val="accent1"/>
-          </a:effectRef>
-          <a:fontRef idx="minor">
-            <a:schemeClr val="lt1"/>
-          </a:fontRef>
-        </p:style>
-        <p:txBody>
-          <a:bodyPr rtlCol="0" anchor="ctr"/>
-          <a:lstStyle/>
-          <a:p>
-            <a:pPr algn="ctr"/>
-            <a:endParaRPr lang="en-GB"/>
-          </a:p>
-        </p:txBody>
-      </p:sp>
-      <p:sp>
-        <p:nvSpPr>
-          <p:cNvPr id="7" name="Left Arrow 6"/>
-          <p:cNvSpPr/>
-          <p:nvPr/>
-        </p:nvSpPr>
-        <p:spPr>
-          <a:xfrm rot="1978251">
-            <a:off x="7178415" y="2812984"/>
-            <a:ext cx="404079" cy="738335"/>
-          </a:xfrm>
-          <a:prstGeom prst="leftArrow">
-            <a:avLst/>
-          </a:prstGeom>
-        </p:spPr>
-        <p:style>
-          <a:lnRef idx="2">
-            <a:schemeClr val="accent1">
-              <a:shade val="50000"/>
-            </a:schemeClr>
-          </a:lnRef>
-          <a:fillRef idx="1">
-            <a:schemeClr val="accent1"/>
-          </a:fillRef>
-          <a:effectRef idx="0">
-            <a:schemeClr val="accent1"/>
-          </a:effectRef>
-          <a:fontRef idx="minor">
-            <a:schemeClr val="lt1"/>
-          </a:fontRef>
-        </p:style>
-        <p:txBody>
-          <a:bodyPr rtlCol="0" anchor="ctr"/>
-          <a:lstStyle/>
-          <a:p>
-            <a:pPr algn="ctr"/>
-            <a:endParaRPr lang="en-GB"/>
-          </a:p>
-        </p:txBody>
-      </p:sp>
-      <p:sp>
-        <p:nvSpPr>
-          <p:cNvPr id="8" name="TextBox 7"/>
-          <p:cNvSpPr txBox="1"/>
-          <p:nvPr/>
-        </p:nvSpPr>
-        <p:spPr>
-          <a:xfrm>
-            <a:off x="5330092" y="5816593"/>
-            <a:ext cx="2117952" cy="369332"/>
-          </a:xfrm>
-          <a:prstGeom prst="rect">
-            <a:avLst/>
-          </a:prstGeom>
-          <a:noFill/>
-        </p:spPr>
-        <p:txBody>
-          <a:bodyPr wrap="none" rtlCol="0">
-            <a:spAutoFit/>
-          </a:bodyPr>
-          <a:lstStyle/>
-          <a:p>
-            <a:r>
-              <a:rPr lang="en-GB" b="1" dirty="0" err="1" smtClean="0"/>
-              <a:t>IX_experiment</a:t>
-            </a:r>
-            <a:r>
-              <a:rPr lang="en-GB" dirty="0" smtClean="0"/>
-              <a:t> </a:t>
-            </a:r>
-            <a:r>
-              <a:rPr lang="en-GB" dirty="0" smtClean="0"/>
-              <a:t>to go</a:t>
-            </a:r>
-            <a:endParaRPr lang="en-GB" dirty="0"/>
-          </a:p>
-        </p:txBody>
-      </p:sp>
-      <p:cxnSp>
-        <p:nvCxnSpPr>
-          <p:cNvPr id="10" name="Straight Arrow Connector 9"/>
-          <p:cNvCxnSpPr>
-            <a:endCxn id="6" idx="6"/>
-          </p:cNvCxnSpPr>
-          <p:nvPr/>
-        </p:nvCxnSpPr>
-        <p:spPr>
-          <a:xfrm flipH="1" flipV="1">
-            <a:off x="4555838" y="5816593"/>
-            <a:ext cx="616196" cy="65314"/>
-          </a:xfrm>
-          <a:prstGeom prst="straightConnector1">
-            <a:avLst/>
-          </a:prstGeom>
-          <a:ln w="12700">
-            <a:solidFill>
-              <a:srgbClr val="FF0000"/>
-            </a:solidFill>
-            <a:tailEnd type="triangle"/>
-          </a:ln>
-        </p:spPr>
-        <p:style>
-          <a:lnRef idx="1">
-            <a:schemeClr val="accent1"/>
-          </a:lnRef>
-          <a:fillRef idx="0">
-            <a:schemeClr val="accent1"/>
-          </a:fillRef>
-          <a:effectRef idx="0">
-            <a:schemeClr val="accent1"/>
-          </a:effectRef>
-          <a:fontRef idx="minor">
-            <a:schemeClr val="tx1"/>
-          </a:fontRef>
-        </p:style>
-      </p:cxnSp>
     </p:spTree>
     <p:extLst>
       <p:ext uri="{BB962C8B-B14F-4D97-AF65-F5344CB8AC3E}">
-        <p14:creationId xmlns:p14="http://schemas.microsoft.com/office/powerpoint/2010/main" val="2259158507"/>
+        <p14:creationId xmlns:p14="http://schemas.microsoft.com/office/powerpoint/2010/main" val="3660381104"/>
       </p:ext>
     </p:extLst>
   </p:cSld>
@@ -6187,34 +5987,6 @@
           <a:chExt cx="0" cy="0"/>
         </a:xfrm>
       </p:grpSpPr>
-      <p:sp>
-        <p:nvSpPr>
-          <p:cNvPr id="2" name="Title 1"/>
-          <p:cNvSpPr>
-            <a:spLocks noGrp="1"/>
-          </p:cNvSpPr>
-          <p:nvPr>
-            <p:ph type="title"/>
-          </p:nvPr>
-        </p:nvSpPr>
-        <p:spPr>
-          <a:xfrm>
-            <a:off x="838200" y="365125"/>
-            <a:ext cx="10515600" cy="895725"/>
-          </a:xfrm>
-        </p:spPr>
-        <p:txBody>
-          <a:bodyPr/>
-          <a:lstStyle/>
-          <a:p>
-            <a:r>
-              <a:rPr lang="en-GB" dirty="0" smtClean="0"/>
-              <a:t>Main Horace’ objects interfaces:</a:t>
-            </a:r>
-            <a:endParaRPr lang="en-GB" dirty="0"/>
-          </a:p>
-        </p:txBody>
-      </p:sp>
       <p:pic>
         <p:nvPicPr>
           <p:cNvPr id="3" name="Picture 2"/>
@@ -6237,18 +6009,246 @@
         </p:blipFill>
         <p:spPr>
           <a:xfrm>
-            <a:off x="838200" y="1590675"/>
-            <a:ext cx="8950968" cy="4922420"/>
+            <a:off x="7448044" y="1204723"/>
+            <a:ext cx="4581525" cy="2962275"/>
           </a:xfrm>
           <a:prstGeom prst="rect">
             <a:avLst/>
           </a:prstGeom>
         </p:spPr>
       </p:pic>
+      <p:sp>
+        <p:nvSpPr>
+          <p:cNvPr id="2" name="Title 1"/>
+          <p:cNvSpPr>
+            <a:spLocks noGrp="1"/>
+          </p:cNvSpPr>
+          <p:nvPr>
+            <p:ph type="title"/>
+          </p:nvPr>
+        </p:nvSpPr>
+        <p:spPr>
+          <a:xfrm>
+            <a:off x="0" y="61477"/>
+            <a:ext cx="10515600" cy="1325563"/>
+          </a:xfrm>
+        </p:spPr>
+        <p:txBody>
+          <a:bodyPr/>
+          <a:lstStyle/>
+          <a:p>
+            <a:r>
+              <a:rPr lang="en-GB" dirty="0" smtClean="0"/>
+              <a:t>SQW and DND </a:t>
+            </a:r>
+            <a:r>
+              <a:rPr lang="en-GB" dirty="0" smtClean="0"/>
+              <a:t>objects. Composition:</a:t>
+            </a:r>
+            <a:endParaRPr lang="en-GB" dirty="0"/>
+          </a:p>
+        </p:txBody>
+      </p:sp>
+      <p:pic>
+        <p:nvPicPr>
+          <p:cNvPr id="4" name="Picture 3"/>
+          <p:cNvPicPr>
+            <a:picLocks noChangeAspect="1"/>
+          </p:cNvPicPr>
+          <p:nvPr/>
+        </p:nvPicPr>
+        <p:blipFill>
+          <a:blip r:embed="rId3">
+            <a:extLst>
+              <a:ext uri="{28A0092B-C50C-407E-A947-70E740481C1C}">
+                <a14:useLocalDpi xmlns:a14="http://schemas.microsoft.com/office/drawing/2010/main" val="0"/>
+              </a:ext>
+            </a:extLst>
+          </a:blip>
+          <a:stretch>
+            <a:fillRect/>
+          </a:stretch>
+        </p:blipFill>
+        <p:spPr>
+          <a:xfrm>
+            <a:off x="292937" y="1762125"/>
+            <a:ext cx="6867525" cy="4181475"/>
+          </a:xfrm>
+          <a:prstGeom prst="rect">
+            <a:avLst/>
+          </a:prstGeom>
+        </p:spPr>
+      </p:pic>
+      <p:sp>
+        <p:nvSpPr>
+          <p:cNvPr id="6" name="Oval 5"/>
+          <p:cNvSpPr/>
+          <p:nvPr/>
+        </p:nvSpPr>
+        <p:spPr>
+          <a:xfrm>
+            <a:off x="2113652" y="5495701"/>
+            <a:ext cx="2442186" cy="641784"/>
+          </a:xfrm>
+          <a:prstGeom prst="ellipse">
+            <a:avLst/>
+          </a:prstGeom>
+          <a:solidFill>
+            <a:schemeClr val="bg1">
+              <a:alpha val="0"/>
+            </a:schemeClr>
+          </a:solidFill>
+          <a:ln w="25400">
+            <a:solidFill>
+              <a:srgbClr val="FF0000"/>
+            </a:solidFill>
+          </a:ln>
+        </p:spPr>
+        <p:style>
+          <a:lnRef idx="2">
+            <a:schemeClr val="accent1">
+              <a:shade val="50000"/>
+            </a:schemeClr>
+          </a:lnRef>
+          <a:fillRef idx="1">
+            <a:schemeClr val="accent1"/>
+          </a:fillRef>
+          <a:effectRef idx="0">
+            <a:schemeClr val="accent1"/>
+          </a:effectRef>
+          <a:fontRef idx="minor">
+            <a:schemeClr val="lt1"/>
+          </a:fontRef>
+        </p:style>
+        <p:txBody>
+          <a:bodyPr rtlCol="0" anchor="ctr"/>
+          <a:lstStyle/>
+          <a:p>
+            <a:pPr algn="ctr"/>
+            <a:endParaRPr lang="en-GB"/>
+          </a:p>
+        </p:txBody>
+      </p:sp>
+      <p:sp>
+        <p:nvSpPr>
+          <p:cNvPr id="7" name="Left Arrow 6"/>
+          <p:cNvSpPr/>
+          <p:nvPr/>
+        </p:nvSpPr>
+        <p:spPr>
+          <a:xfrm rot="1978251">
+            <a:off x="7178415" y="2812984"/>
+            <a:ext cx="404079" cy="738335"/>
+          </a:xfrm>
+          <a:prstGeom prst="leftArrow">
+            <a:avLst/>
+          </a:prstGeom>
+        </p:spPr>
+        <p:style>
+          <a:lnRef idx="2">
+            <a:schemeClr val="accent1">
+              <a:shade val="50000"/>
+            </a:schemeClr>
+          </a:lnRef>
+          <a:fillRef idx="1">
+            <a:schemeClr val="accent1"/>
+          </a:fillRef>
+          <a:effectRef idx="0">
+            <a:schemeClr val="accent1"/>
+          </a:effectRef>
+          <a:fontRef idx="minor">
+            <a:schemeClr val="lt1"/>
+          </a:fontRef>
+        </p:style>
+        <p:txBody>
+          <a:bodyPr rtlCol="0" anchor="ctr"/>
+          <a:lstStyle/>
+          <a:p>
+            <a:pPr algn="ctr"/>
+            <a:endParaRPr lang="en-GB"/>
+          </a:p>
+        </p:txBody>
+      </p:sp>
+      <p:sp>
+        <p:nvSpPr>
+          <p:cNvPr id="8" name="TextBox 7"/>
+          <p:cNvSpPr txBox="1"/>
+          <p:nvPr/>
+        </p:nvSpPr>
+        <p:spPr>
+          <a:xfrm>
+            <a:off x="5330092" y="5816593"/>
+            <a:ext cx="2117952" cy="369332"/>
+          </a:xfrm>
+          <a:prstGeom prst="rect">
+            <a:avLst/>
+          </a:prstGeom>
+          <a:noFill/>
+        </p:spPr>
+        <p:txBody>
+          <a:bodyPr wrap="none" rtlCol="0">
+            <a:spAutoFit/>
+          </a:bodyPr>
+          <a:lstStyle/>
+          <a:p>
+            <a:r>
+              <a:rPr lang="en-GB" b="1" dirty="0" err="1" smtClean="0"/>
+              <a:t>IX_experiment</a:t>
+            </a:r>
+            <a:r>
+              <a:rPr lang="en-GB" dirty="0" smtClean="0"/>
+              <a:t> </a:t>
+            </a:r>
+            <a:r>
+              <a:rPr lang="en-GB" dirty="0" smtClean="0"/>
+              <a:t>to go</a:t>
+            </a:r>
+            <a:endParaRPr lang="en-GB" dirty="0"/>
+          </a:p>
+        </p:txBody>
+      </p:sp>
+      <p:cxnSp>
+        <p:nvCxnSpPr>
+          <p:cNvPr id="10" name="Straight Arrow Connector 9"/>
+          <p:cNvCxnSpPr>
+            <a:endCxn id="6" idx="6"/>
+          </p:cNvCxnSpPr>
+          <p:nvPr/>
+        </p:nvCxnSpPr>
+        <p:spPr>
+          <a:xfrm flipH="1" flipV="1">
+            <a:off x="4555838" y="5816593"/>
+            <a:ext cx="616196" cy="65314"/>
+          </a:xfrm>
+          <a:prstGeom prst="straightConnector1">
+            <a:avLst/>
+          </a:prstGeom>
+          <a:ln w="12700">
+            <a:solidFill>
+              <a:srgbClr val="FF0000"/>
+            </a:solidFill>
+            <a:tailEnd type="triangle"/>
+          </a:ln>
+        </p:spPr>
+        <p:style>
+          <a:lnRef idx="1">
+            <a:schemeClr val="accent1"/>
+          </a:lnRef>
+          <a:fillRef idx="0">
+            <a:schemeClr val="accent1"/>
+          </a:fillRef>
+          <a:effectRef idx="0">
+            <a:schemeClr val="accent1"/>
+          </a:effectRef>
+          <a:fontRef idx="minor">
+            <a:schemeClr val="tx1"/>
+          </a:fontRef>
+        </p:style>
+      </p:cxnSp>
     </p:spTree>
     <p:extLst>
       <p:ext uri="{BB962C8B-B14F-4D97-AF65-F5344CB8AC3E}">
-        <p14:creationId xmlns:p14="http://schemas.microsoft.com/office/powerpoint/2010/main" val="3660381104"/>
+        <p14:creationId xmlns:p14="http://schemas.microsoft.com/office/powerpoint/2010/main" val="2259158507"/>
       </p:ext>
     </p:extLst>
   </p:cSld>

</xml_diff>

<commit_message>
Re #803 Changes to presentations corresponding to changes in documentation
</commit_message>
<xml_diff>
--- a/documentation/presentations/SQW&GenericProjectionDesigh.pptx
+++ b/documentation/presentations/SQW&GenericProjectionDesigh.pptx
@@ -4469,7 +4469,7 @@
         <p:spPr>
           <a:xfrm>
             <a:off x="838200" y="365125"/>
-            <a:ext cx="10515600" cy="4994815"/>
+            <a:ext cx="10515600" cy="5911850"/>
           </a:xfrm>
         </p:spPr>
         <p:txBody>
@@ -4498,14 +4498,10 @@
             </a:br>
             <a:r>
               <a:rPr lang="en-GB" dirty="0" smtClean="0"/>
-              <a:t>1) </a:t>
-            </a:r>
-            <a:r>
-              <a:rPr lang="en-GB" smtClean="0"/>
-              <a:t>Rewrite </a:t>
-            </a:r>
-            <a:r>
-              <a:rPr lang="en-GB" smtClean="0"/>
+              <a:t>1) Rewrite </a:t>
+            </a:r>
+            <a:r>
+              <a:rPr lang="en-GB" dirty="0" smtClean="0"/>
               <a:t>DND</a:t>
             </a:r>
             <a:r>
@@ -4631,8 +4627,8 @@
         </p:nvSpPr>
         <p:spPr>
           <a:xfrm>
-            <a:off x="971550" y="3224213"/>
-            <a:ext cx="7767637" cy="338137"/>
+            <a:off x="957263" y="3667126"/>
+            <a:ext cx="7767637" cy="400218"/>
           </a:xfrm>
           <a:prstGeom prst="rect">
             <a:avLst/>

</xml_diff>